<commit_message>
app concept fully fleshed out. due for streamlining by Christine
</commit_message>
<xml_diff>
--- a/Presentation1.pptx
+++ b/Presentation1.pptx
@@ -4,10 +4,14 @@
   <p:sldMasterIdLst>
     <p:sldMasterId id="2147483648" r:id="rId1"/>
   </p:sldMasterIdLst>
+  <p:notesMasterIdLst>
+    <p:notesMasterId r:id="rId6"/>
+  </p:notesMasterIdLst>
   <p:sldIdLst>
     <p:sldId id="256" r:id="rId2"/>
     <p:sldId id="257" r:id="rId3"/>
     <p:sldId id="258" r:id="rId4"/>
+    <p:sldId id="259" r:id="rId5"/>
   </p:sldIdLst>
   <p:sldSz cx="12192000" cy="6858000"/>
   <p:notesSz cx="6858000" cy="9144000"/>
@@ -112,6 +116,628 @@
     </p:ext>
   </p:extLst>
 </p:presentation>
+</file>
+
+<file path=ppt/notesMasters/notesMaster1.xml><?xml version="1.0" encoding="utf-8"?>
+<p:notesMaster xmlns:a="http://schemas.openxmlformats.org/drawingml/2006/main" xmlns:r="http://schemas.openxmlformats.org/officeDocument/2006/relationships" xmlns:p="http://schemas.openxmlformats.org/presentationml/2006/main">
+  <p:cSld>
+    <p:bg>
+      <p:bgRef idx="1001">
+        <a:schemeClr val="bg1"/>
+      </p:bgRef>
+    </p:bg>
+    <p:spTree>
+      <p:nvGrpSpPr>
+        <p:cNvPr id="1" name=""/>
+        <p:cNvGrpSpPr/>
+        <p:nvPr/>
+      </p:nvGrpSpPr>
+      <p:grpSpPr>
+        <a:xfrm>
+          <a:off x="0" y="0"/>
+          <a:ext cx="0" cy="0"/>
+          <a:chOff x="0" y="0"/>
+          <a:chExt cx="0" cy="0"/>
+        </a:xfrm>
+      </p:grpSpPr>
+      <p:sp>
+        <p:nvSpPr>
+          <p:cNvPr id="2" name="Header Placeholder 1"/>
+          <p:cNvSpPr>
+            <a:spLocks noGrp="1"/>
+          </p:cNvSpPr>
+          <p:nvPr>
+            <p:ph type="hdr" sz="quarter"/>
+          </p:nvPr>
+        </p:nvSpPr>
+        <p:spPr>
+          <a:xfrm>
+            <a:off x="0" y="0"/>
+            <a:ext cx="2971800" cy="457200"/>
+          </a:xfrm>
+          <a:prstGeom prst="rect">
+            <a:avLst/>
+          </a:prstGeom>
+        </p:spPr>
+        <p:txBody>
+          <a:bodyPr vert="horz" lIns="91440" tIns="45720" rIns="91440" bIns="45720" rtlCol="0"/>
+          <a:lstStyle>
+            <a:lvl1pPr algn="l">
+              <a:defRPr sz="1200"/>
+            </a:lvl1pPr>
+          </a:lstStyle>
+          <a:p>
+            <a:endParaRPr lang="en-US"/>
+          </a:p>
+        </p:txBody>
+      </p:sp>
+      <p:sp>
+        <p:nvSpPr>
+          <p:cNvPr id="3" name="Date Placeholder 2"/>
+          <p:cNvSpPr>
+            <a:spLocks noGrp="1"/>
+          </p:cNvSpPr>
+          <p:nvPr>
+            <p:ph type="dt" idx="1"/>
+          </p:nvPr>
+        </p:nvSpPr>
+        <p:spPr>
+          <a:xfrm>
+            <a:off x="3884613" y="0"/>
+            <a:ext cx="2971800" cy="457200"/>
+          </a:xfrm>
+          <a:prstGeom prst="rect">
+            <a:avLst/>
+          </a:prstGeom>
+        </p:spPr>
+        <p:txBody>
+          <a:bodyPr vert="horz" lIns="91440" tIns="45720" rIns="91440" bIns="45720" rtlCol="0"/>
+          <a:lstStyle>
+            <a:lvl1pPr algn="r">
+              <a:defRPr sz="1200"/>
+            </a:lvl1pPr>
+          </a:lstStyle>
+          <a:p>
+            <a:fld id="{5167892E-B727-A544-A25A-A6BD23AEA75B}" type="datetimeFigureOut">
+              <a:rPr lang="en-US" smtClean="0"/>
+              <a:t>10/3/15</a:t>
+            </a:fld>
+            <a:endParaRPr lang="en-US"/>
+          </a:p>
+        </p:txBody>
+      </p:sp>
+      <p:sp>
+        <p:nvSpPr>
+          <p:cNvPr id="4" name="Slide Image Placeholder 3"/>
+          <p:cNvSpPr>
+            <a:spLocks noGrp="1" noRot="1" noChangeAspect="1"/>
+          </p:cNvSpPr>
+          <p:nvPr>
+            <p:ph type="sldImg" idx="2"/>
+          </p:nvPr>
+        </p:nvSpPr>
+        <p:spPr>
+          <a:xfrm>
+            <a:off x="381000" y="685800"/>
+            <a:ext cx="6096000" cy="3429000"/>
+          </a:xfrm>
+          <a:prstGeom prst="rect">
+            <a:avLst/>
+          </a:prstGeom>
+          <a:noFill/>
+          <a:ln w="12700">
+            <a:solidFill>
+              <a:prstClr val="black"/>
+            </a:solidFill>
+          </a:ln>
+        </p:spPr>
+        <p:txBody>
+          <a:bodyPr vert="horz" lIns="91440" tIns="45720" rIns="91440" bIns="45720" rtlCol="0" anchor="ctr"/>
+          <a:lstStyle/>
+          <a:p>
+            <a:endParaRPr lang="en-US"/>
+          </a:p>
+        </p:txBody>
+      </p:sp>
+      <p:sp>
+        <p:nvSpPr>
+          <p:cNvPr id="5" name="Notes Placeholder 4"/>
+          <p:cNvSpPr>
+            <a:spLocks noGrp="1"/>
+          </p:cNvSpPr>
+          <p:nvPr>
+            <p:ph type="body" sz="quarter" idx="3"/>
+          </p:nvPr>
+        </p:nvSpPr>
+        <p:spPr>
+          <a:xfrm>
+            <a:off x="685800" y="4343400"/>
+            <a:ext cx="5486400" cy="4114800"/>
+          </a:xfrm>
+          <a:prstGeom prst="rect">
+            <a:avLst/>
+          </a:prstGeom>
+        </p:spPr>
+        <p:txBody>
+          <a:bodyPr vert="horz" lIns="91440" tIns="45720" rIns="91440" bIns="45720" rtlCol="0"/>
+          <a:lstStyle/>
+          <a:p>
+            <a:pPr lvl="0"/>
+            <a:r>
+              <a:rPr lang="en-US" smtClean="0"/>
+              <a:t>Click to edit Master text styles</a:t>
+            </a:r>
+          </a:p>
+          <a:p>
+            <a:pPr lvl="1"/>
+            <a:r>
+              <a:rPr lang="en-US" smtClean="0"/>
+              <a:t>Second level</a:t>
+            </a:r>
+          </a:p>
+          <a:p>
+            <a:pPr lvl="2"/>
+            <a:r>
+              <a:rPr lang="en-US" smtClean="0"/>
+              <a:t>Third level</a:t>
+            </a:r>
+          </a:p>
+          <a:p>
+            <a:pPr lvl="3"/>
+            <a:r>
+              <a:rPr lang="en-US" smtClean="0"/>
+              <a:t>Fourth level</a:t>
+            </a:r>
+          </a:p>
+          <a:p>
+            <a:pPr lvl="4"/>
+            <a:r>
+              <a:rPr lang="en-US" smtClean="0"/>
+              <a:t>Fifth level</a:t>
+            </a:r>
+            <a:endParaRPr lang="en-US"/>
+          </a:p>
+        </p:txBody>
+      </p:sp>
+      <p:sp>
+        <p:nvSpPr>
+          <p:cNvPr id="6" name="Footer Placeholder 5"/>
+          <p:cNvSpPr>
+            <a:spLocks noGrp="1"/>
+          </p:cNvSpPr>
+          <p:nvPr>
+            <p:ph type="ftr" sz="quarter" idx="4"/>
+          </p:nvPr>
+        </p:nvSpPr>
+        <p:spPr>
+          <a:xfrm>
+            <a:off x="0" y="8685213"/>
+            <a:ext cx="2971800" cy="457200"/>
+          </a:xfrm>
+          <a:prstGeom prst="rect">
+            <a:avLst/>
+          </a:prstGeom>
+        </p:spPr>
+        <p:txBody>
+          <a:bodyPr vert="horz" lIns="91440" tIns="45720" rIns="91440" bIns="45720" rtlCol="0" anchor="b"/>
+          <a:lstStyle>
+            <a:lvl1pPr algn="l">
+              <a:defRPr sz="1200"/>
+            </a:lvl1pPr>
+          </a:lstStyle>
+          <a:p>
+            <a:endParaRPr lang="en-US"/>
+          </a:p>
+        </p:txBody>
+      </p:sp>
+      <p:sp>
+        <p:nvSpPr>
+          <p:cNvPr id="7" name="Slide Number Placeholder 6"/>
+          <p:cNvSpPr>
+            <a:spLocks noGrp="1"/>
+          </p:cNvSpPr>
+          <p:nvPr>
+            <p:ph type="sldNum" sz="quarter" idx="5"/>
+          </p:nvPr>
+        </p:nvSpPr>
+        <p:spPr>
+          <a:xfrm>
+            <a:off x="3884613" y="8685213"/>
+            <a:ext cx="2971800" cy="457200"/>
+          </a:xfrm>
+          <a:prstGeom prst="rect">
+            <a:avLst/>
+          </a:prstGeom>
+        </p:spPr>
+        <p:txBody>
+          <a:bodyPr vert="horz" lIns="91440" tIns="45720" rIns="91440" bIns="45720" rtlCol="0" anchor="b"/>
+          <a:lstStyle>
+            <a:lvl1pPr algn="r">
+              <a:defRPr sz="1200"/>
+            </a:lvl1pPr>
+          </a:lstStyle>
+          <a:p>
+            <a:fld id="{5A5A9B6F-1E28-A941-A0BF-C40F2A12F7A9}" type="slidenum">
+              <a:rPr lang="en-US" smtClean="0"/>
+              <a:t>‹#›</a:t>
+            </a:fld>
+            <a:endParaRPr lang="en-US"/>
+          </a:p>
+        </p:txBody>
+      </p:sp>
+    </p:spTree>
+    <p:extLst>
+      <p:ext uri="{BB962C8B-B14F-4D97-AF65-F5344CB8AC3E}">
+        <p14:creationId xmlns:p14="http://schemas.microsoft.com/office/powerpoint/2010/main" val="1312958887"/>
+      </p:ext>
+    </p:extLst>
+  </p:cSld>
+  <p:clrMap bg1="lt1" tx1="dk1" bg2="lt2" tx2="dk2" accent1="accent1" accent2="accent2" accent3="accent3" accent4="accent4" accent5="accent5" accent6="accent6" hlink="hlink" folHlink="folHlink"/>
+  <p:notesStyle>
+    <a:lvl1pPr marL="0" algn="l" defTabSz="457200" rtl="0" eaLnBrk="1" latinLnBrk="0" hangingPunct="1">
+      <a:defRPr sz="1200" kern="1200">
+        <a:solidFill>
+          <a:schemeClr val="tx1"/>
+        </a:solidFill>
+        <a:latin typeface="+mn-lt"/>
+        <a:ea typeface="+mn-ea"/>
+        <a:cs typeface="+mn-cs"/>
+      </a:defRPr>
+    </a:lvl1pPr>
+    <a:lvl2pPr marL="457200" algn="l" defTabSz="457200" rtl="0" eaLnBrk="1" latinLnBrk="0" hangingPunct="1">
+      <a:defRPr sz="1200" kern="1200">
+        <a:solidFill>
+          <a:schemeClr val="tx1"/>
+        </a:solidFill>
+        <a:latin typeface="+mn-lt"/>
+        <a:ea typeface="+mn-ea"/>
+        <a:cs typeface="+mn-cs"/>
+      </a:defRPr>
+    </a:lvl2pPr>
+    <a:lvl3pPr marL="914400" algn="l" defTabSz="457200" rtl="0" eaLnBrk="1" latinLnBrk="0" hangingPunct="1">
+      <a:defRPr sz="1200" kern="1200">
+        <a:solidFill>
+          <a:schemeClr val="tx1"/>
+        </a:solidFill>
+        <a:latin typeface="+mn-lt"/>
+        <a:ea typeface="+mn-ea"/>
+        <a:cs typeface="+mn-cs"/>
+      </a:defRPr>
+    </a:lvl3pPr>
+    <a:lvl4pPr marL="1371600" algn="l" defTabSz="457200" rtl="0" eaLnBrk="1" latinLnBrk="0" hangingPunct="1">
+      <a:defRPr sz="1200" kern="1200">
+        <a:solidFill>
+          <a:schemeClr val="tx1"/>
+        </a:solidFill>
+        <a:latin typeface="+mn-lt"/>
+        <a:ea typeface="+mn-ea"/>
+        <a:cs typeface="+mn-cs"/>
+      </a:defRPr>
+    </a:lvl4pPr>
+    <a:lvl5pPr marL="1828800" algn="l" defTabSz="457200" rtl="0" eaLnBrk="1" latinLnBrk="0" hangingPunct="1">
+      <a:defRPr sz="1200" kern="1200">
+        <a:solidFill>
+          <a:schemeClr val="tx1"/>
+        </a:solidFill>
+        <a:latin typeface="+mn-lt"/>
+        <a:ea typeface="+mn-ea"/>
+        <a:cs typeface="+mn-cs"/>
+      </a:defRPr>
+    </a:lvl5pPr>
+    <a:lvl6pPr marL="2286000" algn="l" defTabSz="457200" rtl="0" eaLnBrk="1" latinLnBrk="0" hangingPunct="1">
+      <a:defRPr sz="1200" kern="1200">
+        <a:solidFill>
+          <a:schemeClr val="tx1"/>
+        </a:solidFill>
+        <a:latin typeface="+mn-lt"/>
+        <a:ea typeface="+mn-ea"/>
+        <a:cs typeface="+mn-cs"/>
+      </a:defRPr>
+    </a:lvl6pPr>
+    <a:lvl7pPr marL="2743200" algn="l" defTabSz="457200" rtl="0" eaLnBrk="1" latinLnBrk="0" hangingPunct="1">
+      <a:defRPr sz="1200" kern="1200">
+        <a:solidFill>
+          <a:schemeClr val="tx1"/>
+        </a:solidFill>
+        <a:latin typeface="+mn-lt"/>
+        <a:ea typeface="+mn-ea"/>
+        <a:cs typeface="+mn-cs"/>
+      </a:defRPr>
+    </a:lvl7pPr>
+    <a:lvl8pPr marL="3200400" algn="l" defTabSz="457200" rtl="0" eaLnBrk="1" latinLnBrk="0" hangingPunct="1">
+      <a:defRPr sz="1200" kern="1200">
+        <a:solidFill>
+          <a:schemeClr val="tx1"/>
+        </a:solidFill>
+        <a:latin typeface="+mn-lt"/>
+        <a:ea typeface="+mn-ea"/>
+        <a:cs typeface="+mn-cs"/>
+      </a:defRPr>
+    </a:lvl8pPr>
+    <a:lvl9pPr marL="3657600" algn="l" defTabSz="457200" rtl="0" eaLnBrk="1" latinLnBrk="0" hangingPunct="1">
+      <a:defRPr sz="1200" kern="1200">
+        <a:solidFill>
+          <a:schemeClr val="tx1"/>
+        </a:solidFill>
+        <a:latin typeface="+mn-lt"/>
+        <a:ea typeface="+mn-ea"/>
+        <a:cs typeface="+mn-cs"/>
+      </a:defRPr>
+    </a:lvl9pPr>
+  </p:notesStyle>
+</p:notesMaster>
+</file>
+
+<file path=ppt/notesSlides/notesSlide1.xml><?xml version="1.0" encoding="utf-8"?>
+<p:notes xmlns:a="http://schemas.openxmlformats.org/drawingml/2006/main" xmlns:r="http://schemas.openxmlformats.org/officeDocument/2006/relationships" xmlns:p="http://schemas.openxmlformats.org/presentationml/2006/main">
+  <p:cSld>
+    <p:spTree>
+      <p:nvGrpSpPr>
+        <p:cNvPr id="1" name=""/>
+        <p:cNvGrpSpPr/>
+        <p:nvPr/>
+      </p:nvGrpSpPr>
+      <p:grpSpPr>
+        <a:xfrm>
+          <a:off x="0" y="0"/>
+          <a:ext cx="0" cy="0"/>
+          <a:chOff x="0" y="0"/>
+          <a:chExt cx="0" cy="0"/>
+        </a:xfrm>
+      </p:grpSpPr>
+      <p:sp>
+        <p:nvSpPr>
+          <p:cNvPr id="2" name="Slide Image Placeholder 1"/>
+          <p:cNvSpPr>
+            <a:spLocks noGrp="1" noRot="1" noChangeAspect="1"/>
+          </p:cNvSpPr>
+          <p:nvPr>
+            <p:ph type="sldImg"/>
+          </p:nvPr>
+        </p:nvSpPr>
+        <p:spPr/>
+      </p:sp>
+      <p:sp>
+        <p:nvSpPr>
+          <p:cNvPr id="3" name="Notes Placeholder 2"/>
+          <p:cNvSpPr>
+            <a:spLocks noGrp="1"/>
+          </p:cNvSpPr>
+          <p:nvPr>
+            <p:ph type="body" idx="1"/>
+          </p:nvPr>
+        </p:nvSpPr>
+        <p:spPr/>
+        <p:txBody>
+          <a:bodyPr/>
+          <a:lstStyle/>
+          <a:p>
+            <a:r>
+              <a:rPr lang="en-US" dirty="0" smtClean="0"/>
+              <a:t>When a user opens the app, they</a:t>
+            </a:r>
+            <a:r>
+              <a:rPr lang="en-US" baseline="0" dirty="0" smtClean="0"/>
+              <a:t> may either login or create a new account. Their phone number is used to send text message notifications.</a:t>
+            </a:r>
+            <a:endParaRPr lang="en-US" dirty="0"/>
+          </a:p>
+        </p:txBody>
+      </p:sp>
+      <p:sp>
+        <p:nvSpPr>
+          <p:cNvPr id="4" name="Slide Number Placeholder 3"/>
+          <p:cNvSpPr>
+            <a:spLocks noGrp="1"/>
+          </p:cNvSpPr>
+          <p:nvPr>
+            <p:ph type="sldNum" sz="quarter" idx="10"/>
+          </p:nvPr>
+        </p:nvSpPr>
+        <p:spPr/>
+        <p:txBody>
+          <a:bodyPr/>
+          <a:lstStyle/>
+          <a:p>
+            <a:fld id="{5A5A9B6F-1E28-A941-A0BF-C40F2A12F7A9}" type="slidenum">
+              <a:rPr lang="en-US" smtClean="0"/>
+              <a:t>1</a:t>
+            </a:fld>
+            <a:endParaRPr lang="en-US"/>
+          </a:p>
+        </p:txBody>
+      </p:sp>
+    </p:spTree>
+    <p:extLst>
+      <p:ext uri="{BB962C8B-B14F-4D97-AF65-F5344CB8AC3E}">
+        <p14:creationId xmlns:p14="http://schemas.microsoft.com/office/powerpoint/2010/main" val="3542569072"/>
+      </p:ext>
+    </p:extLst>
+  </p:cSld>
+  <p:clrMapOvr>
+    <a:masterClrMapping/>
+  </p:clrMapOvr>
+</p:notes>
+</file>
+
+<file path=ppt/notesSlides/notesSlide2.xml><?xml version="1.0" encoding="utf-8"?>
+<p:notes xmlns:a="http://schemas.openxmlformats.org/drawingml/2006/main" xmlns:r="http://schemas.openxmlformats.org/officeDocument/2006/relationships" xmlns:p="http://schemas.openxmlformats.org/presentationml/2006/main">
+  <p:cSld>
+    <p:spTree>
+      <p:nvGrpSpPr>
+        <p:cNvPr id="1" name=""/>
+        <p:cNvGrpSpPr/>
+        <p:nvPr/>
+      </p:nvGrpSpPr>
+      <p:grpSpPr>
+        <a:xfrm>
+          <a:off x="0" y="0"/>
+          <a:ext cx="0" cy="0"/>
+          <a:chOff x="0" y="0"/>
+          <a:chExt cx="0" cy="0"/>
+        </a:xfrm>
+      </p:grpSpPr>
+      <p:sp>
+        <p:nvSpPr>
+          <p:cNvPr id="2" name="Slide Image Placeholder 1"/>
+          <p:cNvSpPr>
+            <a:spLocks noGrp="1" noRot="1" noChangeAspect="1"/>
+          </p:cNvSpPr>
+          <p:nvPr>
+            <p:ph type="sldImg"/>
+          </p:nvPr>
+        </p:nvSpPr>
+        <p:spPr/>
+      </p:sp>
+      <p:sp>
+        <p:nvSpPr>
+          <p:cNvPr id="3" name="Notes Placeholder 2"/>
+          <p:cNvSpPr>
+            <a:spLocks noGrp="1"/>
+          </p:cNvSpPr>
+          <p:nvPr>
+            <p:ph type="body" idx="1"/>
+          </p:nvPr>
+        </p:nvSpPr>
+        <p:spPr/>
+        <p:txBody>
+          <a:bodyPr/>
+          <a:lstStyle/>
+          <a:p>
+            <a:r>
+              <a:rPr lang="en-US" dirty="0" smtClean="0"/>
+              <a:t>People using this app are either honorable dog owners or honorable regular denizens of earth. If they happen to be a</a:t>
+            </a:r>
+            <a:r>
+              <a:rPr lang="en-US" baseline="0" dirty="0" smtClean="0"/>
+              <a:t> dog owner, they will be prompted to set up their dog’s profile immediately.</a:t>
+            </a:r>
+            <a:endParaRPr lang="en-US" dirty="0"/>
+          </a:p>
+        </p:txBody>
+      </p:sp>
+      <p:sp>
+        <p:nvSpPr>
+          <p:cNvPr id="4" name="Slide Number Placeholder 3"/>
+          <p:cNvSpPr>
+            <a:spLocks noGrp="1"/>
+          </p:cNvSpPr>
+          <p:nvPr>
+            <p:ph type="sldNum" sz="quarter" idx="10"/>
+          </p:nvPr>
+        </p:nvSpPr>
+        <p:spPr/>
+        <p:txBody>
+          <a:bodyPr/>
+          <a:lstStyle/>
+          <a:p>
+            <a:fld id="{5A5A9B6F-1E28-A941-A0BF-C40F2A12F7A9}" type="slidenum">
+              <a:rPr lang="en-US" smtClean="0"/>
+              <a:t>2</a:t>
+            </a:fld>
+            <a:endParaRPr lang="en-US"/>
+          </a:p>
+        </p:txBody>
+      </p:sp>
+    </p:spTree>
+    <p:extLst>
+      <p:ext uri="{BB962C8B-B14F-4D97-AF65-F5344CB8AC3E}">
+        <p14:creationId xmlns:p14="http://schemas.microsoft.com/office/powerpoint/2010/main" val="477665738"/>
+      </p:ext>
+    </p:extLst>
+  </p:cSld>
+  <p:clrMapOvr>
+    <a:masterClrMapping/>
+  </p:clrMapOvr>
+</p:notes>
+</file>
+
+<file path=ppt/notesSlides/notesSlide3.xml><?xml version="1.0" encoding="utf-8"?>
+<p:notes xmlns:a="http://schemas.openxmlformats.org/drawingml/2006/main" xmlns:r="http://schemas.openxmlformats.org/officeDocument/2006/relationships" xmlns:p="http://schemas.openxmlformats.org/presentationml/2006/main">
+  <p:cSld>
+    <p:spTree>
+      <p:nvGrpSpPr>
+        <p:cNvPr id="1" name=""/>
+        <p:cNvGrpSpPr/>
+        <p:nvPr/>
+      </p:nvGrpSpPr>
+      <p:grpSpPr>
+        <a:xfrm>
+          <a:off x="0" y="0"/>
+          <a:ext cx="0" cy="0"/>
+          <a:chOff x="0" y="0"/>
+          <a:chExt cx="0" cy="0"/>
+        </a:xfrm>
+      </p:grpSpPr>
+      <p:sp>
+        <p:nvSpPr>
+          <p:cNvPr id="2" name="Slide Image Placeholder 1"/>
+          <p:cNvSpPr>
+            <a:spLocks noGrp="1" noRot="1" noChangeAspect="1"/>
+          </p:cNvSpPr>
+          <p:nvPr>
+            <p:ph type="sldImg"/>
+          </p:nvPr>
+        </p:nvSpPr>
+        <p:spPr/>
+      </p:sp>
+      <p:sp>
+        <p:nvSpPr>
+          <p:cNvPr id="3" name="Notes Placeholder 2"/>
+          <p:cNvSpPr>
+            <a:spLocks noGrp="1"/>
+          </p:cNvSpPr>
+          <p:nvPr>
+            <p:ph type="body" idx="1"/>
+          </p:nvPr>
+        </p:nvSpPr>
+        <p:spPr/>
+        <p:txBody>
+          <a:bodyPr/>
+          <a:lstStyle/>
+          <a:p>
+            <a:r>
+              <a:rPr lang="en-US" baseline="0" dirty="0" smtClean="0"/>
+              <a:t>This is what users will typically see when they enter the app. The Pet My Pet logo will be relocated to a small bar on the top to make room for the dog listing, along with a settings button for dog owners . When users open the app, the “Find dogs in your area” button will open a listing of dogs in their vicinity, showing the dog’s profile picture, their name under it, and next to that, their owner’s name, the distance of the dog away from the user, and the amount of “playtime” remaining. The “Start playtime button” is meant for the use of dog owners. Pressing it will activate a window that asks them to enter the amount of play time they plan to make their dog available to other users. If the user is not yet a dog owner, then it will show an option to become a registered dog owner, after which being pressed will take them through the process of setting up their dog’s profile.</a:t>
+            </a:r>
+            <a:endParaRPr lang="en-US" dirty="0"/>
+          </a:p>
+        </p:txBody>
+      </p:sp>
+      <p:sp>
+        <p:nvSpPr>
+          <p:cNvPr id="4" name="Slide Number Placeholder 3"/>
+          <p:cNvSpPr>
+            <a:spLocks noGrp="1"/>
+          </p:cNvSpPr>
+          <p:nvPr>
+            <p:ph type="sldNum" sz="quarter" idx="10"/>
+          </p:nvPr>
+        </p:nvSpPr>
+        <p:spPr/>
+        <p:txBody>
+          <a:bodyPr/>
+          <a:lstStyle/>
+          <a:p>
+            <a:fld id="{5A5A9B6F-1E28-A941-A0BF-C40F2A12F7A9}" type="slidenum">
+              <a:rPr lang="en-US" smtClean="0"/>
+              <a:t>4</a:t>
+            </a:fld>
+            <a:endParaRPr lang="en-US"/>
+          </a:p>
+        </p:txBody>
+      </p:sp>
+    </p:spTree>
+    <p:extLst>
+      <p:ext uri="{BB962C8B-B14F-4D97-AF65-F5344CB8AC3E}">
+        <p14:creationId xmlns:p14="http://schemas.microsoft.com/office/powerpoint/2010/main" val="3594850637"/>
+      </p:ext>
+    </p:extLst>
+  </p:cSld>
+  <p:clrMapOvr>
+    <a:masterClrMapping/>
+  </p:clrMapOvr>
+</p:notes>
 </file>
 
 <file path=ppt/slideLayouts/slideLayout1.xml><?xml version="1.0" encoding="utf-8"?>
@@ -3038,7 +3664,7 @@
           <p:nvPr/>
         </p:nvPicPr>
         <p:blipFill>
-          <a:blip r:embed="rId2"/>
+          <a:blip r:embed="rId3"/>
           <a:stretch>
             <a:fillRect/>
           </a:stretch>
@@ -3710,7 +4336,7 @@
           <p:nvPr/>
         </p:nvPicPr>
         <p:blipFill>
-          <a:blip r:embed="rId2"/>
+          <a:blip r:embed="rId3"/>
           <a:stretch>
             <a:fillRect/>
           </a:stretch>
@@ -3822,7 +4448,7 @@
           <p:nvPr/>
         </p:nvPicPr>
         <p:blipFill>
-          <a:blip r:embed="rId2"/>
+          <a:blip r:embed="rId3"/>
           <a:stretch>
             <a:fillRect/>
           </a:stretch>
@@ -3904,7 +4530,7 @@
           <p:nvPr/>
         </p:nvPicPr>
         <p:blipFill>
-          <a:blip r:embed="rId2"/>
+          <a:blip r:embed="rId3"/>
           <a:stretch>
             <a:fillRect/>
           </a:stretch>
@@ -3927,8 +4553,8 @@
         </p:nvSpPr>
         <p:spPr>
           <a:xfrm>
-            <a:off x="1003215" y="3137525"/>
-            <a:ext cx="4301019" cy="2016980"/>
+            <a:off x="1003215" y="2849384"/>
+            <a:ext cx="4301019" cy="4727631"/>
           </a:xfrm>
           <a:prstGeom prst="roundRect">
             <a:avLst/>
@@ -3971,7 +4597,7 @@
         </p:nvSpPr>
         <p:spPr>
           <a:xfrm>
-            <a:off x="1376753" y="3350962"/>
+            <a:off x="1376753" y="3190884"/>
             <a:ext cx="3500581" cy="369332"/>
           </a:xfrm>
           <a:prstGeom prst="rect">
@@ -4014,7 +4640,7 @@
         </p:nvSpPr>
         <p:spPr>
           <a:xfrm>
-            <a:off x="1212141" y="4304817"/>
+            <a:off x="1212141" y="3899286"/>
             <a:ext cx="1648090" cy="520655"/>
           </a:xfrm>
           <a:prstGeom prst="roundRect">
@@ -4079,7 +4705,7 @@
         </p:nvSpPr>
         <p:spPr>
           <a:xfrm>
-            <a:off x="3317609" y="4297139"/>
+            <a:off x="3317609" y="3891608"/>
             <a:ext cx="1648090" cy="520655"/>
           </a:xfrm>
           <a:prstGeom prst="roundRect">
@@ -4145,7 +4771,7 @@
         <p:spPr>
           <a:xfrm>
             <a:off x="6705317" y="2852378"/>
-            <a:ext cx="4301019" cy="4863371"/>
+            <a:ext cx="4301019" cy="4745982"/>
           </a:xfrm>
           <a:prstGeom prst="roundRect">
             <a:avLst/>
@@ -4499,7 +5125,7 @@
         <p:spPr>
           <a:xfrm>
             <a:off x="6705317" y="2852378"/>
-            <a:ext cx="4301019" cy="4863371"/>
+            <a:ext cx="4301019" cy="4745982"/>
           </a:xfrm>
           <a:prstGeom prst="roundRect">
             <a:avLst/>
@@ -4644,7 +5270,7 @@
         <p:spPr>
           <a:xfrm>
             <a:off x="1016873" y="2852378"/>
-            <a:ext cx="4301019" cy="4863371"/>
+            <a:ext cx="4301019" cy="4724638"/>
           </a:xfrm>
           <a:prstGeom prst="roundRect">
             <a:avLst/>
@@ -5475,6 +6101,1283 @@
     <p:extLst>
       <p:ext uri="{BB962C8B-B14F-4D97-AF65-F5344CB8AC3E}">
         <p14:creationId xmlns:p14="http://schemas.microsoft.com/office/powerpoint/2010/main" val="2527372310"/>
+      </p:ext>
+    </p:extLst>
+  </p:cSld>
+  <p:clrMapOvr>
+    <a:masterClrMapping/>
+  </p:clrMapOvr>
+</p:sld>
+</file>
+
+<file path=ppt/slides/slide4.xml><?xml version="1.0" encoding="utf-8"?>
+<p:sld xmlns:a="http://schemas.openxmlformats.org/drawingml/2006/main" xmlns:r="http://schemas.openxmlformats.org/officeDocument/2006/relationships" xmlns:p="http://schemas.openxmlformats.org/presentationml/2006/main">
+  <p:cSld>
+    <p:spTree>
+      <p:nvGrpSpPr>
+        <p:cNvPr id="1" name=""/>
+        <p:cNvGrpSpPr/>
+        <p:nvPr/>
+      </p:nvGrpSpPr>
+      <p:grpSpPr>
+        <a:xfrm>
+          <a:off x="0" y="0"/>
+          <a:ext cx="0" cy="0"/>
+          <a:chOff x="0" y="0"/>
+          <a:chExt cx="0" cy="0"/>
+        </a:xfrm>
+      </p:grpSpPr>
+      <p:sp>
+        <p:nvSpPr>
+          <p:cNvPr id="40" name="Rectangle 39"/>
+          <p:cNvSpPr/>
+          <p:nvPr/>
+        </p:nvSpPr>
+        <p:spPr>
+          <a:xfrm>
+            <a:off x="6396372" y="0"/>
+            <a:ext cx="5029200" cy="7772400"/>
+          </a:xfrm>
+          <a:prstGeom prst="rect">
+            <a:avLst/>
+          </a:prstGeom>
+          <a:solidFill>
+            <a:schemeClr val="accent6">
+              <a:lumMod val="20000"/>
+              <a:lumOff val="80000"/>
+            </a:schemeClr>
+          </a:solidFill>
+          <a:ln w="28575">
+            <a:solidFill>
+              <a:schemeClr val="accent6">
+                <a:lumMod val="60000"/>
+                <a:lumOff val="40000"/>
+              </a:schemeClr>
+            </a:solidFill>
+          </a:ln>
+        </p:spPr>
+        <p:style>
+          <a:lnRef idx="2">
+            <a:schemeClr val="accent6"/>
+          </a:lnRef>
+          <a:fillRef idx="1">
+            <a:schemeClr val="lt1"/>
+          </a:fillRef>
+          <a:effectRef idx="0">
+            <a:schemeClr val="accent6"/>
+          </a:effectRef>
+          <a:fontRef idx="minor">
+            <a:schemeClr val="dk1"/>
+          </a:fontRef>
+        </p:style>
+        <p:txBody>
+          <a:bodyPr rtlCol="0" anchor="ctr"/>
+          <a:lstStyle/>
+          <a:p>
+            <a:pPr algn="ctr"/>
+            <a:endParaRPr lang="en-US" dirty="0">
+              <a:ln w="28575">
+                <a:solidFill>
+                  <a:schemeClr val="tx1"/>
+                </a:solidFill>
+              </a:ln>
+            </a:endParaRPr>
+          </a:p>
+        </p:txBody>
+      </p:sp>
+      <p:sp>
+        <p:nvSpPr>
+          <p:cNvPr id="38" name="Rectangle 37"/>
+          <p:cNvSpPr/>
+          <p:nvPr/>
+        </p:nvSpPr>
+        <p:spPr>
+          <a:xfrm>
+            <a:off x="630236" y="0"/>
+            <a:ext cx="5029200" cy="7772400"/>
+          </a:xfrm>
+          <a:prstGeom prst="rect">
+            <a:avLst/>
+          </a:prstGeom>
+          <a:solidFill>
+            <a:schemeClr val="accent6">
+              <a:lumMod val="20000"/>
+              <a:lumOff val="80000"/>
+            </a:schemeClr>
+          </a:solidFill>
+          <a:ln w="28575">
+            <a:solidFill>
+              <a:schemeClr val="accent6">
+                <a:lumMod val="60000"/>
+                <a:lumOff val="40000"/>
+              </a:schemeClr>
+            </a:solidFill>
+          </a:ln>
+        </p:spPr>
+        <p:style>
+          <a:lnRef idx="2">
+            <a:schemeClr val="accent6"/>
+          </a:lnRef>
+          <a:fillRef idx="1">
+            <a:schemeClr val="lt1"/>
+          </a:fillRef>
+          <a:effectRef idx="0">
+            <a:schemeClr val="accent6"/>
+          </a:effectRef>
+          <a:fontRef idx="minor">
+            <a:schemeClr val="dk1"/>
+          </a:fontRef>
+        </p:style>
+        <p:txBody>
+          <a:bodyPr rtlCol="0" anchor="ctr"/>
+          <a:lstStyle/>
+          <a:p>
+            <a:pPr algn="ctr"/>
+            <a:endParaRPr lang="en-US" dirty="0">
+              <a:ln w="28575">
+                <a:solidFill>
+                  <a:schemeClr val="tx1"/>
+                </a:solidFill>
+              </a:ln>
+            </a:endParaRPr>
+          </a:p>
+        </p:txBody>
+      </p:sp>
+      <p:sp>
+        <p:nvSpPr>
+          <p:cNvPr id="15" name="Rounded Rectangle 14"/>
+          <p:cNvSpPr/>
+          <p:nvPr/>
+        </p:nvSpPr>
+        <p:spPr>
+          <a:xfrm>
+            <a:off x="1016873" y="889000"/>
+            <a:ext cx="4301019" cy="5855612"/>
+          </a:xfrm>
+          <a:prstGeom prst="roundRect">
+            <a:avLst/>
+          </a:prstGeom>
+          <a:solidFill>
+            <a:schemeClr val="bg1"/>
+          </a:solidFill>
+          <a:ln>
+            <a:noFill/>
+          </a:ln>
+        </p:spPr>
+        <p:style>
+          <a:lnRef idx="1">
+            <a:schemeClr val="accent1"/>
+          </a:lnRef>
+          <a:fillRef idx="3">
+            <a:schemeClr val="accent1"/>
+          </a:fillRef>
+          <a:effectRef idx="2">
+            <a:schemeClr val="accent1"/>
+          </a:effectRef>
+          <a:fontRef idx="minor">
+            <a:schemeClr val="lt1"/>
+          </a:fontRef>
+        </p:style>
+        <p:txBody>
+          <a:bodyPr rtlCol="0" anchor="ctr"/>
+          <a:lstStyle/>
+          <a:p>
+            <a:pPr algn="ctr"/>
+            <a:endParaRPr lang="en-US"/>
+          </a:p>
+        </p:txBody>
+      </p:sp>
+      <p:sp>
+        <p:nvSpPr>
+          <p:cNvPr id="4" name="Rectangle 3"/>
+          <p:cNvSpPr/>
+          <p:nvPr/>
+        </p:nvSpPr>
+        <p:spPr>
+          <a:xfrm>
+            <a:off x="629678" y="6947377"/>
+            <a:ext cx="2508038" cy="821733"/>
+          </a:xfrm>
+          <a:prstGeom prst="rect">
+            <a:avLst/>
+          </a:prstGeom>
+          <a:solidFill>
+            <a:schemeClr val="accent6">
+              <a:lumMod val="60000"/>
+              <a:lumOff val="40000"/>
+            </a:schemeClr>
+          </a:solidFill>
+          <a:ln>
+            <a:solidFill>
+              <a:schemeClr val="accent6">
+                <a:lumMod val="50000"/>
+              </a:schemeClr>
+            </a:solidFill>
+          </a:ln>
+        </p:spPr>
+        <p:style>
+          <a:lnRef idx="1">
+            <a:schemeClr val="accent1"/>
+          </a:lnRef>
+          <a:fillRef idx="3">
+            <a:schemeClr val="accent1"/>
+          </a:fillRef>
+          <a:effectRef idx="2">
+            <a:schemeClr val="accent1"/>
+          </a:effectRef>
+          <a:fontRef idx="minor">
+            <a:schemeClr val="lt1"/>
+          </a:fontRef>
+        </p:style>
+        <p:txBody>
+          <a:bodyPr rot="0" spcFirstLastPara="0" vertOverflow="overflow" horzOverflow="overflow" vert="horz" wrap="square" lIns="91440" tIns="45720" rIns="91440" bIns="45720" numCol="1" spcCol="0" rtlCol="0" fromWordArt="0" anchor="ctr" anchorCtr="0" forceAA="0" compatLnSpc="1">
+            <a:prstTxWarp prst="textNoShape">
+              <a:avLst/>
+            </a:prstTxWarp>
+            <a:noAutofit/>
+          </a:bodyPr>
+          <a:lstStyle/>
+          <a:p>
+            <a:pPr algn="ctr"/>
+            <a:endParaRPr lang="en-US"/>
+          </a:p>
+        </p:txBody>
+      </p:sp>
+      <p:sp>
+        <p:nvSpPr>
+          <p:cNvPr id="18" name="TextBox 17"/>
+          <p:cNvSpPr txBox="1"/>
+          <p:nvPr/>
+        </p:nvSpPr>
+        <p:spPr>
+          <a:xfrm>
+            <a:off x="632665" y="7185152"/>
+            <a:ext cx="2515724" cy="369332"/>
+          </a:xfrm>
+          <a:prstGeom prst="rect">
+            <a:avLst/>
+          </a:prstGeom>
+          <a:noFill/>
+        </p:spPr>
+        <p:txBody>
+          <a:bodyPr wrap="square" rtlCol="0">
+            <a:spAutoFit/>
+          </a:bodyPr>
+          <a:lstStyle/>
+          <a:p>
+            <a:pPr algn="ctr"/>
+            <a:r>
+              <a:rPr lang="en-US" dirty="0" smtClean="0">
+                <a:solidFill>
+                  <a:schemeClr val="accent6">
+                    <a:lumMod val="50000"/>
+                  </a:schemeClr>
+                </a:solidFill>
+              </a:rPr>
+              <a:t>Find dogs in your area</a:t>
+            </a:r>
+            <a:endParaRPr lang="en-US" dirty="0">
+              <a:solidFill>
+                <a:schemeClr val="accent6">
+                  <a:lumMod val="50000"/>
+                </a:schemeClr>
+              </a:solidFill>
+            </a:endParaRPr>
+          </a:p>
+        </p:txBody>
+      </p:sp>
+      <p:sp>
+        <p:nvSpPr>
+          <p:cNvPr id="20" name="Rectangle 19"/>
+          <p:cNvSpPr/>
+          <p:nvPr/>
+        </p:nvSpPr>
+        <p:spPr>
+          <a:xfrm>
+            <a:off x="3151375" y="6950371"/>
+            <a:ext cx="2508038" cy="821733"/>
+          </a:xfrm>
+          <a:prstGeom prst="rect">
+            <a:avLst/>
+          </a:prstGeom>
+          <a:solidFill>
+            <a:schemeClr val="bg1">
+              <a:lumMod val="95000"/>
+            </a:schemeClr>
+          </a:solidFill>
+          <a:ln>
+            <a:solidFill>
+              <a:schemeClr val="accent6">
+                <a:lumMod val="60000"/>
+                <a:lumOff val="40000"/>
+              </a:schemeClr>
+            </a:solidFill>
+          </a:ln>
+        </p:spPr>
+        <p:style>
+          <a:lnRef idx="1">
+            <a:schemeClr val="accent1"/>
+          </a:lnRef>
+          <a:fillRef idx="3">
+            <a:schemeClr val="accent1"/>
+          </a:fillRef>
+          <a:effectRef idx="2">
+            <a:schemeClr val="accent1"/>
+          </a:effectRef>
+          <a:fontRef idx="minor">
+            <a:schemeClr val="lt1"/>
+          </a:fontRef>
+        </p:style>
+        <p:txBody>
+          <a:bodyPr rot="0" spcFirstLastPara="0" vertOverflow="overflow" horzOverflow="overflow" vert="horz" wrap="square" lIns="91440" tIns="45720" rIns="91440" bIns="45720" numCol="1" spcCol="0" rtlCol="0" fromWordArt="0" anchor="ctr" anchorCtr="0" forceAA="0" compatLnSpc="1">
+            <a:prstTxWarp prst="textNoShape">
+              <a:avLst/>
+            </a:prstTxWarp>
+            <a:noAutofit/>
+          </a:bodyPr>
+          <a:lstStyle/>
+          <a:p>
+            <a:pPr algn="ctr"/>
+            <a:endParaRPr lang="en-US"/>
+          </a:p>
+        </p:txBody>
+      </p:sp>
+      <p:sp>
+        <p:nvSpPr>
+          <p:cNvPr id="19" name="TextBox 18"/>
+          <p:cNvSpPr txBox="1"/>
+          <p:nvPr/>
+        </p:nvSpPr>
+        <p:spPr>
+          <a:xfrm>
+            <a:off x="3140703" y="7185152"/>
+            <a:ext cx="2515724" cy="369332"/>
+          </a:xfrm>
+          <a:prstGeom prst="rect">
+            <a:avLst/>
+          </a:prstGeom>
+          <a:noFill/>
+        </p:spPr>
+        <p:txBody>
+          <a:bodyPr wrap="square" rtlCol="0">
+            <a:spAutoFit/>
+          </a:bodyPr>
+          <a:lstStyle/>
+          <a:p>
+            <a:pPr algn="ctr"/>
+            <a:r>
+              <a:rPr lang="en-US" dirty="0" smtClean="0">
+                <a:solidFill>
+                  <a:schemeClr val="accent6">
+                    <a:lumMod val="50000"/>
+                  </a:schemeClr>
+                </a:solidFill>
+              </a:rPr>
+              <a:t>Start playtime</a:t>
+            </a:r>
+            <a:endParaRPr lang="en-US" dirty="0">
+              <a:solidFill>
+                <a:schemeClr val="accent6">
+                  <a:lumMod val="50000"/>
+                </a:schemeClr>
+              </a:solidFill>
+            </a:endParaRPr>
+          </a:p>
+        </p:txBody>
+      </p:sp>
+      <p:sp>
+        <p:nvSpPr>
+          <p:cNvPr id="23" name="Rectangle 22"/>
+          <p:cNvSpPr/>
+          <p:nvPr/>
+        </p:nvSpPr>
+        <p:spPr>
+          <a:xfrm>
+            <a:off x="6398801" y="6953366"/>
+            <a:ext cx="2508038" cy="821733"/>
+          </a:xfrm>
+          <a:prstGeom prst="rect">
+            <a:avLst/>
+          </a:prstGeom>
+          <a:solidFill>
+            <a:schemeClr val="bg1">
+              <a:lumMod val="95000"/>
+            </a:schemeClr>
+          </a:solidFill>
+          <a:ln>
+            <a:solidFill>
+              <a:schemeClr val="accent6">
+                <a:lumMod val="60000"/>
+                <a:lumOff val="40000"/>
+              </a:schemeClr>
+            </a:solidFill>
+          </a:ln>
+        </p:spPr>
+        <p:style>
+          <a:lnRef idx="1">
+            <a:schemeClr val="accent1"/>
+          </a:lnRef>
+          <a:fillRef idx="3">
+            <a:schemeClr val="accent1"/>
+          </a:fillRef>
+          <a:effectRef idx="2">
+            <a:schemeClr val="accent1"/>
+          </a:effectRef>
+          <a:fontRef idx="minor">
+            <a:schemeClr val="lt1"/>
+          </a:fontRef>
+        </p:style>
+        <p:txBody>
+          <a:bodyPr rot="0" spcFirstLastPara="0" vertOverflow="overflow" horzOverflow="overflow" vert="horz" wrap="square" lIns="91440" tIns="45720" rIns="91440" bIns="45720" numCol="1" spcCol="0" rtlCol="0" fromWordArt="0" anchor="ctr" anchorCtr="0" forceAA="0" compatLnSpc="1">
+            <a:prstTxWarp prst="textNoShape">
+              <a:avLst/>
+            </a:prstTxWarp>
+            <a:noAutofit/>
+          </a:bodyPr>
+          <a:lstStyle/>
+          <a:p>
+            <a:pPr algn="ctr"/>
+            <a:endParaRPr lang="en-US"/>
+          </a:p>
+        </p:txBody>
+      </p:sp>
+      <p:sp>
+        <p:nvSpPr>
+          <p:cNvPr id="22" name="TextBox 21"/>
+          <p:cNvSpPr txBox="1"/>
+          <p:nvPr/>
+        </p:nvSpPr>
+        <p:spPr>
+          <a:xfrm>
+            <a:off x="6388129" y="7188146"/>
+            <a:ext cx="2515724" cy="369332"/>
+          </a:xfrm>
+          <a:prstGeom prst="rect">
+            <a:avLst/>
+          </a:prstGeom>
+          <a:noFill/>
+        </p:spPr>
+        <p:txBody>
+          <a:bodyPr wrap="square" rtlCol="0">
+            <a:spAutoFit/>
+          </a:bodyPr>
+          <a:lstStyle/>
+          <a:p>
+            <a:pPr algn="ctr"/>
+            <a:r>
+              <a:rPr lang="en-US" dirty="0" smtClean="0">
+                <a:solidFill>
+                  <a:schemeClr val="accent6">
+                    <a:lumMod val="50000"/>
+                  </a:schemeClr>
+                </a:solidFill>
+              </a:rPr>
+              <a:t>Find dogs in your area</a:t>
+            </a:r>
+            <a:endParaRPr lang="en-US" dirty="0">
+              <a:solidFill>
+                <a:schemeClr val="accent6">
+                  <a:lumMod val="50000"/>
+                </a:schemeClr>
+              </a:solidFill>
+            </a:endParaRPr>
+          </a:p>
+        </p:txBody>
+      </p:sp>
+      <p:sp>
+        <p:nvSpPr>
+          <p:cNvPr id="25" name="Rectangle 24"/>
+          <p:cNvSpPr/>
+          <p:nvPr/>
+        </p:nvSpPr>
+        <p:spPr>
+          <a:xfrm>
+            <a:off x="8925198" y="6950371"/>
+            <a:ext cx="2508038" cy="821733"/>
+          </a:xfrm>
+          <a:prstGeom prst="rect">
+            <a:avLst/>
+          </a:prstGeom>
+          <a:solidFill>
+            <a:schemeClr val="accent6">
+              <a:lumMod val="60000"/>
+              <a:lumOff val="40000"/>
+            </a:schemeClr>
+          </a:solidFill>
+          <a:ln>
+            <a:solidFill>
+              <a:schemeClr val="accent6">
+                <a:lumMod val="50000"/>
+              </a:schemeClr>
+            </a:solidFill>
+          </a:ln>
+        </p:spPr>
+        <p:style>
+          <a:lnRef idx="1">
+            <a:schemeClr val="accent1"/>
+          </a:lnRef>
+          <a:fillRef idx="3">
+            <a:schemeClr val="accent1"/>
+          </a:fillRef>
+          <a:effectRef idx="2">
+            <a:schemeClr val="accent1"/>
+          </a:effectRef>
+          <a:fontRef idx="minor">
+            <a:schemeClr val="lt1"/>
+          </a:fontRef>
+        </p:style>
+        <p:txBody>
+          <a:bodyPr rot="0" spcFirstLastPara="0" vertOverflow="overflow" horzOverflow="overflow" vert="horz" wrap="square" lIns="91440" tIns="45720" rIns="91440" bIns="45720" numCol="1" spcCol="0" rtlCol="0" fromWordArt="0" anchor="ctr" anchorCtr="0" forceAA="0" compatLnSpc="1">
+            <a:prstTxWarp prst="textNoShape">
+              <a:avLst/>
+            </a:prstTxWarp>
+            <a:noAutofit/>
+          </a:bodyPr>
+          <a:lstStyle/>
+          <a:p>
+            <a:pPr algn="ctr"/>
+            <a:endParaRPr lang="en-US"/>
+          </a:p>
+        </p:txBody>
+      </p:sp>
+      <p:sp>
+        <p:nvSpPr>
+          <p:cNvPr id="29" name="Rounded Rectangle 28"/>
+          <p:cNvSpPr/>
+          <p:nvPr/>
+        </p:nvSpPr>
+        <p:spPr>
+          <a:xfrm>
+            <a:off x="4876800" y="1295400"/>
+            <a:ext cx="279400" cy="5054600"/>
+          </a:xfrm>
+          <a:prstGeom prst="roundRect">
+            <a:avLst/>
+          </a:prstGeom>
+          <a:solidFill>
+            <a:schemeClr val="accent6">
+              <a:lumMod val="40000"/>
+              <a:lumOff val="60000"/>
+            </a:schemeClr>
+          </a:solidFill>
+          <a:ln>
+            <a:noFill/>
+          </a:ln>
+        </p:spPr>
+        <p:style>
+          <a:lnRef idx="1">
+            <a:schemeClr val="accent1"/>
+          </a:lnRef>
+          <a:fillRef idx="3">
+            <a:schemeClr val="accent1"/>
+          </a:fillRef>
+          <a:effectRef idx="2">
+            <a:schemeClr val="accent1"/>
+          </a:effectRef>
+          <a:fontRef idx="minor">
+            <a:schemeClr val="lt1"/>
+          </a:fontRef>
+        </p:style>
+        <p:txBody>
+          <a:bodyPr rot="0" spcFirstLastPara="0" vertOverflow="overflow" horzOverflow="overflow" vert="horz" wrap="square" lIns="91440" tIns="45720" rIns="91440" bIns="45720" numCol="1" spcCol="0" rtlCol="0" fromWordArt="0" anchor="ctr" anchorCtr="0" forceAA="0" compatLnSpc="1">
+            <a:prstTxWarp prst="textNoShape">
+              <a:avLst/>
+            </a:prstTxWarp>
+            <a:noAutofit/>
+          </a:bodyPr>
+          <a:lstStyle/>
+          <a:p>
+            <a:pPr algn="ctr"/>
+            <a:endParaRPr lang="en-US"/>
+          </a:p>
+        </p:txBody>
+      </p:sp>
+      <p:sp>
+        <p:nvSpPr>
+          <p:cNvPr id="24" name="TextBox 23"/>
+          <p:cNvSpPr txBox="1"/>
+          <p:nvPr/>
+        </p:nvSpPr>
+        <p:spPr>
+          <a:xfrm>
+            <a:off x="8896167" y="7188146"/>
+            <a:ext cx="2515724" cy="369332"/>
+          </a:xfrm>
+          <a:prstGeom prst="rect">
+            <a:avLst/>
+          </a:prstGeom>
+          <a:noFill/>
+        </p:spPr>
+        <p:txBody>
+          <a:bodyPr wrap="square" rtlCol="0">
+            <a:spAutoFit/>
+          </a:bodyPr>
+          <a:lstStyle/>
+          <a:p>
+            <a:pPr algn="ctr"/>
+            <a:r>
+              <a:rPr lang="en-US" dirty="0" smtClean="0">
+                <a:solidFill>
+                  <a:schemeClr val="accent6">
+                    <a:lumMod val="50000"/>
+                  </a:schemeClr>
+                </a:solidFill>
+              </a:rPr>
+              <a:t>Start play time</a:t>
+            </a:r>
+            <a:endParaRPr lang="en-US" dirty="0">
+              <a:solidFill>
+                <a:schemeClr val="accent6">
+                  <a:lumMod val="50000"/>
+                </a:schemeClr>
+              </a:solidFill>
+            </a:endParaRPr>
+          </a:p>
+        </p:txBody>
+      </p:sp>
+      <p:sp>
+        <p:nvSpPr>
+          <p:cNvPr id="9" name="Rounded Rectangle 8"/>
+          <p:cNvSpPr/>
+          <p:nvPr/>
+        </p:nvSpPr>
+        <p:spPr>
+          <a:xfrm>
+            <a:off x="4940300" y="3822700"/>
+            <a:ext cx="152400" cy="1206500"/>
+          </a:xfrm>
+          <a:prstGeom prst="roundRect">
+            <a:avLst/>
+          </a:prstGeom>
+          <a:solidFill>
+            <a:schemeClr val="accent6">
+              <a:lumMod val="60000"/>
+              <a:lumOff val="40000"/>
+            </a:schemeClr>
+          </a:solidFill>
+          <a:ln>
+            <a:noFill/>
+          </a:ln>
+        </p:spPr>
+        <p:style>
+          <a:lnRef idx="1">
+            <a:schemeClr val="accent1"/>
+          </a:lnRef>
+          <a:fillRef idx="3">
+            <a:schemeClr val="accent1"/>
+          </a:fillRef>
+          <a:effectRef idx="2">
+            <a:schemeClr val="accent1"/>
+          </a:effectRef>
+          <a:fontRef idx="minor">
+            <a:schemeClr val="lt1"/>
+          </a:fontRef>
+        </p:style>
+        <p:txBody>
+          <a:bodyPr rot="0" spcFirstLastPara="0" vertOverflow="overflow" horzOverflow="overflow" vert="horz" wrap="square" lIns="91440" tIns="45720" rIns="91440" bIns="45720" numCol="1" spcCol="0" rtlCol="0" fromWordArt="0" anchor="ctr" anchorCtr="0" forceAA="0" compatLnSpc="1">
+            <a:prstTxWarp prst="textNoShape">
+              <a:avLst/>
+            </a:prstTxWarp>
+            <a:noAutofit/>
+          </a:bodyPr>
+          <a:lstStyle/>
+          <a:p>
+            <a:pPr algn="ctr"/>
+            <a:endParaRPr lang="en-US"/>
+          </a:p>
+        </p:txBody>
+      </p:sp>
+      <p:sp>
+        <p:nvSpPr>
+          <p:cNvPr id="30" name="Rounded Rectangle 29"/>
+          <p:cNvSpPr/>
+          <p:nvPr/>
+        </p:nvSpPr>
+        <p:spPr>
+          <a:xfrm>
+            <a:off x="6769973" y="889000"/>
+            <a:ext cx="4301019" cy="5854700"/>
+          </a:xfrm>
+          <a:prstGeom prst="roundRect">
+            <a:avLst/>
+          </a:prstGeom>
+          <a:solidFill>
+            <a:schemeClr val="bg1"/>
+          </a:solidFill>
+          <a:ln>
+            <a:noFill/>
+          </a:ln>
+        </p:spPr>
+        <p:style>
+          <a:lnRef idx="1">
+            <a:schemeClr val="accent1"/>
+          </a:lnRef>
+          <a:fillRef idx="3">
+            <a:schemeClr val="accent1"/>
+          </a:fillRef>
+          <a:effectRef idx="2">
+            <a:schemeClr val="accent1"/>
+          </a:effectRef>
+          <a:fontRef idx="minor">
+            <a:schemeClr val="lt1"/>
+          </a:fontRef>
+        </p:style>
+        <p:txBody>
+          <a:bodyPr rtlCol="0" anchor="ctr"/>
+          <a:lstStyle/>
+          <a:p>
+            <a:pPr algn="ctr"/>
+            <a:endParaRPr lang="en-US"/>
+          </a:p>
+        </p:txBody>
+      </p:sp>
+      <p:pic>
+        <p:nvPicPr>
+          <p:cNvPr id="10" name="Picture 9"/>
+          <p:cNvPicPr>
+            <a:picLocks noChangeAspect="1"/>
+          </p:cNvPicPr>
+          <p:nvPr/>
+        </p:nvPicPr>
+        <p:blipFill>
+          <a:blip r:embed="rId3"/>
+          <a:stretch>
+            <a:fillRect/>
+          </a:stretch>
+        </p:blipFill>
+        <p:spPr>
+          <a:xfrm>
+            <a:off x="1382732" y="3263900"/>
+            <a:ext cx="1055667" cy="838200"/>
+          </a:xfrm>
+          <a:prstGeom prst="rect">
+            <a:avLst/>
+          </a:prstGeom>
+        </p:spPr>
+      </p:pic>
+      <p:pic>
+        <p:nvPicPr>
+          <p:cNvPr id="13" name="Picture 12"/>
+          <p:cNvPicPr>
+            <a:picLocks noChangeAspect="1"/>
+          </p:cNvPicPr>
+          <p:nvPr/>
+        </p:nvPicPr>
+        <p:blipFill>
+          <a:blip r:embed="rId4"/>
+          <a:stretch>
+            <a:fillRect/>
+          </a:stretch>
+        </p:blipFill>
+        <p:spPr>
+          <a:xfrm>
+            <a:off x="685800" y="3657600"/>
+            <a:ext cx="2438400" cy="2438400"/>
+          </a:xfrm>
+          <a:prstGeom prst="rect">
+            <a:avLst/>
+          </a:prstGeom>
+        </p:spPr>
+      </p:pic>
+      <p:pic>
+        <p:nvPicPr>
+          <p:cNvPr id="16" name="Picture 15"/>
+          <p:cNvPicPr>
+            <a:picLocks noChangeAspect="1"/>
+          </p:cNvPicPr>
+          <p:nvPr/>
+        </p:nvPicPr>
+        <p:blipFill rotWithShape="1">
+          <a:blip r:embed="rId5"/>
+          <a:srcRect t="-1" b="33694"/>
+          <a:stretch/>
+        </p:blipFill>
+        <p:spPr>
+          <a:xfrm>
+            <a:off x="1460500" y="5739562"/>
+            <a:ext cx="850900" cy="539496"/>
+          </a:xfrm>
+          <a:prstGeom prst="rect">
+            <a:avLst/>
+          </a:prstGeom>
+          <a:scene3d>
+            <a:camera prst="orthographicFront">
+              <a:rot lat="0" lon="10800000" rev="0"/>
+            </a:camera>
+            <a:lightRig rig="threePt" dir="t"/>
+          </a:scene3d>
+        </p:spPr>
+      </p:pic>
+      <p:sp>
+        <p:nvSpPr>
+          <p:cNvPr id="17" name="TextBox 16"/>
+          <p:cNvSpPr txBox="1"/>
+          <p:nvPr/>
+        </p:nvSpPr>
+        <p:spPr>
+          <a:xfrm>
+            <a:off x="1384300" y="4102100"/>
+            <a:ext cx="1016000" cy="369332"/>
+          </a:xfrm>
+          <a:prstGeom prst="rect">
+            <a:avLst/>
+          </a:prstGeom>
+          <a:noFill/>
+        </p:spPr>
+        <p:txBody>
+          <a:bodyPr wrap="square" rtlCol="0">
+            <a:spAutoFit/>
+          </a:bodyPr>
+          <a:lstStyle/>
+          <a:p>
+            <a:pPr algn="ctr"/>
+            <a:r>
+              <a:rPr lang="en-US" dirty="0">
+                <a:solidFill>
+                  <a:schemeClr val="accent6">
+                    <a:lumMod val="50000"/>
+                  </a:schemeClr>
+                </a:solidFill>
+              </a:rPr>
+              <a:t>L</a:t>
+            </a:r>
+            <a:r>
+              <a:rPr lang="en-US" dirty="0" smtClean="0">
+                <a:solidFill>
+                  <a:schemeClr val="accent6">
+                    <a:lumMod val="50000"/>
+                  </a:schemeClr>
+                </a:solidFill>
+              </a:rPr>
+              <a:t>ucky</a:t>
+            </a:r>
+            <a:endParaRPr lang="en-US" dirty="0">
+              <a:solidFill>
+                <a:schemeClr val="accent6">
+                  <a:lumMod val="50000"/>
+                </a:schemeClr>
+              </a:solidFill>
+            </a:endParaRPr>
+          </a:p>
+        </p:txBody>
+      </p:sp>
+      <p:sp>
+        <p:nvSpPr>
+          <p:cNvPr id="42" name="TextBox 41"/>
+          <p:cNvSpPr txBox="1"/>
+          <p:nvPr/>
+        </p:nvSpPr>
+        <p:spPr>
+          <a:xfrm>
+            <a:off x="1397000" y="5321300"/>
+            <a:ext cx="1016000" cy="369332"/>
+          </a:xfrm>
+          <a:prstGeom prst="rect">
+            <a:avLst/>
+          </a:prstGeom>
+          <a:noFill/>
+        </p:spPr>
+        <p:txBody>
+          <a:bodyPr wrap="square" rtlCol="0">
+            <a:spAutoFit/>
+          </a:bodyPr>
+          <a:lstStyle/>
+          <a:p>
+            <a:pPr algn="ctr"/>
+            <a:r>
+              <a:rPr lang="en-US" dirty="0" smtClean="0">
+                <a:solidFill>
+                  <a:srgbClr val="385723"/>
+                </a:solidFill>
+              </a:rPr>
+              <a:t>Ducky</a:t>
+            </a:r>
+            <a:endParaRPr lang="en-US" dirty="0">
+              <a:solidFill>
+                <a:srgbClr val="385723"/>
+              </a:solidFill>
+            </a:endParaRPr>
+          </a:p>
+        </p:txBody>
+      </p:sp>
+      <p:sp>
+        <p:nvSpPr>
+          <p:cNvPr id="26" name="TextBox 25"/>
+          <p:cNvSpPr txBox="1"/>
+          <p:nvPr/>
+        </p:nvSpPr>
+        <p:spPr>
+          <a:xfrm>
+            <a:off x="2540000" y="3263900"/>
+            <a:ext cx="2260600" cy="923330"/>
+          </a:xfrm>
+          <a:prstGeom prst="rect">
+            <a:avLst/>
+          </a:prstGeom>
+          <a:noFill/>
+        </p:spPr>
+        <p:txBody>
+          <a:bodyPr wrap="square" rtlCol="0">
+            <a:spAutoFit/>
+          </a:bodyPr>
+          <a:lstStyle/>
+          <a:p>
+            <a:r>
+              <a:rPr lang="en-US" dirty="0" smtClean="0">
+                <a:solidFill>
+                  <a:srgbClr val="385723"/>
+                </a:solidFill>
+              </a:rPr>
+              <a:t>Owner: Nan</a:t>
+            </a:r>
+          </a:p>
+          <a:p>
+            <a:r>
+              <a:rPr lang="en-US" dirty="0" smtClean="0">
+                <a:solidFill>
+                  <a:srgbClr val="385723"/>
+                </a:solidFill>
+              </a:rPr>
+              <a:t>Distance: 100 </a:t>
+            </a:r>
+            <a:r>
+              <a:rPr lang="en-US" dirty="0" err="1" smtClean="0">
+                <a:solidFill>
+                  <a:srgbClr val="385723"/>
+                </a:solidFill>
+              </a:rPr>
+              <a:t>ft</a:t>
+            </a:r>
+            <a:endParaRPr lang="en-US" dirty="0" smtClean="0">
+              <a:solidFill>
+                <a:srgbClr val="385723"/>
+              </a:solidFill>
+            </a:endParaRPr>
+          </a:p>
+          <a:p>
+            <a:r>
+              <a:rPr lang="en-US" dirty="0" smtClean="0">
+                <a:solidFill>
+                  <a:srgbClr val="385723"/>
+                </a:solidFill>
+              </a:rPr>
+              <a:t>Playtime Left: 25 min</a:t>
+            </a:r>
+            <a:endParaRPr lang="en-US" dirty="0">
+              <a:solidFill>
+                <a:srgbClr val="385723"/>
+              </a:solidFill>
+            </a:endParaRPr>
+          </a:p>
+        </p:txBody>
+      </p:sp>
+      <p:sp>
+        <p:nvSpPr>
+          <p:cNvPr id="43" name="TextBox 42"/>
+          <p:cNvSpPr txBox="1"/>
+          <p:nvPr/>
+        </p:nvSpPr>
+        <p:spPr>
+          <a:xfrm>
+            <a:off x="2540000" y="4470400"/>
+            <a:ext cx="2260600" cy="923330"/>
+          </a:xfrm>
+          <a:prstGeom prst="rect">
+            <a:avLst/>
+          </a:prstGeom>
+          <a:noFill/>
+        </p:spPr>
+        <p:txBody>
+          <a:bodyPr wrap="square" rtlCol="0">
+            <a:spAutoFit/>
+          </a:bodyPr>
+          <a:lstStyle/>
+          <a:p>
+            <a:r>
+              <a:rPr lang="en-US" dirty="0" smtClean="0">
+                <a:solidFill>
+                  <a:srgbClr val="385723"/>
+                </a:solidFill>
+              </a:rPr>
+              <a:t>Owner: Dan</a:t>
+            </a:r>
+          </a:p>
+          <a:p>
+            <a:r>
+              <a:rPr lang="en-US" dirty="0" smtClean="0">
+                <a:solidFill>
+                  <a:srgbClr val="385723"/>
+                </a:solidFill>
+              </a:rPr>
+              <a:t>Distance: 500 </a:t>
+            </a:r>
+            <a:r>
+              <a:rPr lang="en-US" dirty="0" err="1" smtClean="0">
+                <a:solidFill>
+                  <a:srgbClr val="385723"/>
+                </a:solidFill>
+              </a:rPr>
+              <a:t>ft</a:t>
+            </a:r>
+            <a:endParaRPr lang="en-US" dirty="0" smtClean="0">
+              <a:solidFill>
+                <a:srgbClr val="385723"/>
+              </a:solidFill>
+            </a:endParaRPr>
+          </a:p>
+          <a:p>
+            <a:r>
+              <a:rPr lang="en-US" dirty="0" smtClean="0">
+                <a:solidFill>
+                  <a:srgbClr val="385723"/>
+                </a:solidFill>
+              </a:rPr>
+              <a:t>Playtime Left: 160 min</a:t>
+            </a:r>
+            <a:endParaRPr lang="en-US" dirty="0">
+              <a:solidFill>
+                <a:srgbClr val="385723"/>
+              </a:solidFill>
+            </a:endParaRPr>
+          </a:p>
+        </p:txBody>
+      </p:sp>
+      <p:sp>
+        <p:nvSpPr>
+          <p:cNvPr id="44" name="TextBox 43"/>
+          <p:cNvSpPr txBox="1"/>
+          <p:nvPr/>
+        </p:nvSpPr>
+        <p:spPr>
+          <a:xfrm>
+            <a:off x="2540000" y="5689600"/>
+            <a:ext cx="2260600" cy="646331"/>
+          </a:xfrm>
+          <a:prstGeom prst="rect">
+            <a:avLst/>
+          </a:prstGeom>
+          <a:noFill/>
+        </p:spPr>
+        <p:txBody>
+          <a:bodyPr wrap="square" rtlCol="0">
+            <a:spAutoFit/>
+          </a:bodyPr>
+          <a:lstStyle/>
+          <a:p>
+            <a:r>
+              <a:rPr lang="en-US" dirty="0" smtClean="0">
+                <a:solidFill>
+                  <a:srgbClr val="385723"/>
+                </a:solidFill>
+              </a:rPr>
+              <a:t>Owner: Fran</a:t>
+            </a:r>
+          </a:p>
+          <a:p>
+            <a:r>
+              <a:rPr lang="en-US" dirty="0" smtClean="0">
+                <a:solidFill>
+                  <a:srgbClr val="385723"/>
+                </a:solidFill>
+              </a:rPr>
+              <a:t>Distance: 600 </a:t>
+            </a:r>
+            <a:r>
+              <a:rPr lang="en-US" dirty="0" err="1" smtClean="0">
+                <a:solidFill>
+                  <a:srgbClr val="385723"/>
+                </a:solidFill>
+              </a:rPr>
+              <a:t>ft</a:t>
+            </a:r>
+            <a:endParaRPr lang="en-US" dirty="0" smtClean="0">
+              <a:solidFill>
+                <a:srgbClr val="385723"/>
+              </a:solidFill>
+            </a:endParaRPr>
+          </a:p>
+        </p:txBody>
+      </p:sp>
+      <p:sp>
+        <p:nvSpPr>
+          <p:cNvPr id="45" name="TextBox 44"/>
+          <p:cNvSpPr txBox="1"/>
+          <p:nvPr/>
+        </p:nvSpPr>
+        <p:spPr>
+          <a:xfrm>
+            <a:off x="7174373" y="1363051"/>
+            <a:ext cx="3500581" cy="369332"/>
+          </a:xfrm>
+          <a:prstGeom prst="rect">
+            <a:avLst/>
+          </a:prstGeom>
+          <a:noFill/>
+        </p:spPr>
+        <p:txBody>
+          <a:bodyPr wrap="square" rtlCol="0">
+            <a:spAutoFit/>
+          </a:bodyPr>
+          <a:lstStyle/>
+          <a:p>
+            <a:pPr algn="ctr"/>
+            <a:r>
+              <a:rPr lang="en-US" dirty="0" smtClean="0">
+                <a:solidFill>
+                  <a:schemeClr val="accent6">
+                    <a:lumMod val="50000"/>
+                  </a:schemeClr>
+                </a:solidFill>
+              </a:rPr>
+              <a:t>How long would you like to play?</a:t>
+            </a:r>
+            <a:endParaRPr lang="en-US" dirty="0">
+              <a:solidFill>
+                <a:schemeClr val="accent6">
+                  <a:lumMod val="50000"/>
+                </a:schemeClr>
+              </a:solidFill>
+            </a:endParaRPr>
+          </a:p>
+        </p:txBody>
+      </p:sp>
+      <p:sp>
+        <p:nvSpPr>
+          <p:cNvPr id="46" name="Rounded Rectangle 45"/>
+          <p:cNvSpPr/>
+          <p:nvPr/>
+        </p:nvSpPr>
+        <p:spPr>
+          <a:xfrm>
+            <a:off x="7006775" y="1925334"/>
+            <a:ext cx="3822700" cy="485807"/>
+          </a:xfrm>
+          <a:prstGeom prst="roundRect">
+            <a:avLst/>
+          </a:prstGeom>
+          <a:solidFill>
+            <a:schemeClr val="bg1"/>
+          </a:solidFill>
+          <a:ln>
+            <a:solidFill>
+              <a:schemeClr val="accent6">
+                <a:lumMod val="60000"/>
+                <a:lumOff val="40000"/>
+              </a:schemeClr>
+            </a:solidFill>
+          </a:ln>
+        </p:spPr>
+        <p:style>
+          <a:lnRef idx="2">
+            <a:schemeClr val="accent1">
+              <a:shade val="50000"/>
+            </a:schemeClr>
+          </a:lnRef>
+          <a:fillRef idx="1">
+            <a:schemeClr val="accent1"/>
+          </a:fillRef>
+          <a:effectRef idx="0">
+            <a:schemeClr val="accent1"/>
+          </a:effectRef>
+          <a:fontRef idx="minor">
+            <a:schemeClr val="lt1"/>
+          </a:fontRef>
+        </p:style>
+        <p:txBody>
+          <a:bodyPr rtlCol="0" anchor="ctr"/>
+          <a:lstStyle/>
+          <a:p>
+            <a:r>
+              <a:rPr lang="en-US" dirty="0" smtClean="0">
+                <a:solidFill>
+                  <a:schemeClr val="accent6">
+                    <a:lumMod val="60000"/>
+                    <a:lumOff val="40000"/>
+                  </a:schemeClr>
+                </a:solidFill>
+              </a:rPr>
+              <a:t>Enter desired playtime in minutes</a:t>
+            </a:r>
+            <a:endParaRPr lang="en-US" dirty="0">
+              <a:solidFill>
+                <a:schemeClr val="accent6">
+                  <a:lumMod val="60000"/>
+                  <a:lumOff val="40000"/>
+                </a:schemeClr>
+              </a:solidFill>
+            </a:endParaRPr>
+          </a:p>
+        </p:txBody>
+      </p:sp>
+      <p:sp>
+        <p:nvSpPr>
+          <p:cNvPr id="47" name="Rounded Rectangle 46"/>
+          <p:cNvSpPr/>
+          <p:nvPr/>
+        </p:nvSpPr>
+        <p:spPr>
+          <a:xfrm>
+            <a:off x="8084697" y="2698099"/>
+            <a:ext cx="1648090" cy="520655"/>
+          </a:xfrm>
+          <a:prstGeom prst="roundRect">
+            <a:avLst/>
+          </a:prstGeom>
+          <a:solidFill>
+            <a:schemeClr val="accent6">
+              <a:lumMod val="60000"/>
+              <a:lumOff val="40000"/>
+            </a:schemeClr>
+          </a:solidFill>
+          <a:ln>
+            <a:noFill/>
+          </a:ln>
+        </p:spPr>
+        <p:style>
+          <a:lnRef idx="2">
+            <a:schemeClr val="accent1">
+              <a:shade val="50000"/>
+            </a:schemeClr>
+          </a:lnRef>
+          <a:fillRef idx="1">
+            <a:schemeClr val="accent1"/>
+          </a:fillRef>
+          <a:effectRef idx="0">
+            <a:schemeClr val="accent1"/>
+          </a:effectRef>
+          <a:fontRef idx="minor">
+            <a:schemeClr val="lt1"/>
+          </a:fontRef>
+        </p:style>
+        <p:txBody>
+          <a:bodyPr rtlCol="0" anchor="ctr"/>
+          <a:lstStyle/>
+          <a:p>
+            <a:pPr algn="ctr"/>
+            <a:r>
+              <a:rPr lang="en-US" dirty="0" smtClean="0">
+                <a:solidFill>
+                  <a:schemeClr val="accent6">
+                    <a:lumMod val="50000"/>
+                  </a:schemeClr>
+                </a:solidFill>
+              </a:rPr>
+              <a:t>Enter</a:t>
+            </a:r>
+            <a:endParaRPr lang="en-US" dirty="0">
+              <a:solidFill>
+                <a:schemeClr val="accent6">
+                  <a:lumMod val="50000"/>
+                </a:schemeClr>
+              </a:solidFill>
+            </a:endParaRPr>
+          </a:p>
+        </p:txBody>
+      </p:sp>
+    </p:spTree>
+    <p:extLst>
+      <p:ext uri="{BB962C8B-B14F-4D97-AF65-F5344CB8AC3E}">
+        <p14:creationId xmlns:p14="http://schemas.microsoft.com/office/powerpoint/2010/main" val="1101328026"/>
       </p:ext>
     </p:extLst>
   </p:cSld>
@@ -5778,4 +7681,324 @@
     </a:ext>
   </a:extLst>
 </a:theme>
+</file>
+
+<file path=ppt/theme/theme2.xml><?xml version="1.0" encoding="utf-8"?>
+<a:theme xmlns:a="http://schemas.openxmlformats.org/drawingml/2006/main" name="Office Theme">
+  <a:themeElements>
+    <a:clrScheme name="Office">
+      <a:dk1>
+        <a:sysClr val="windowText" lastClr="000000"/>
+      </a:dk1>
+      <a:lt1>
+        <a:sysClr val="window" lastClr="FFFFFF"/>
+      </a:lt1>
+      <a:dk2>
+        <a:srgbClr val="1F497D"/>
+      </a:dk2>
+      <a:lt2>
+        <a:srgbClr val="EEECE1"/>
+      </a:lt2>
+      <a:accent1>
+        <a:srgbClr val="4F81BD"/>
+      </a:accent1>
+      <a:accent2>
+        <a:srgbClr val="C0504D"/>
+      </a:accent2>
+      <a:accent3>
+        <a:srgbClr val="9BBB59"/>
+      </a:accent3>
+      <a:accent4>
+        <a:srgbClr val="8064A2"/>
+      </a:accent4>
+      <a:accent5>
+        <a:srgbClr val="4BACC6"/>
+      </a:accent5>
+      <a:accent6>
+        <a:srgbClr val="F79646"/>
+      </a:accent6>
+      <a:hlink>
+        <a:srgbClr val="0000FF"/>
+      </a:hlink>
+      <a:folHlink>
+        <a:srgbClr val="800080"/>
+      </a:folHlink>
+    </a:clrScheme>
+    <a:fontScheme name="Office">
+      <a:majorFont>
+        <a:latin typeface="Calibri"/>
+        <a:ea typeface=""/>
+        <a:cs typeface=""/>
+        <a:font script="Jpan" typeface="ＭＳ Ｐゴシック"/>
+        <a:font script="Hang" typeface="맑은 고딕"/>
+        <a:font script="Hans" typeface="宋体"/>
+        <a:font script="Hant" typeface="新細明體"/>
+        <a:font script="Arab" typeface="Times New Roman"/>
+        <a:font script="Hebr" typeface="Times New Roman"/>
+        <a:font script="Thai" typeface="Angsana New"/>
+        <a:font script="Ethi" typeface="Nyala"/>
+        <a:font script="Beng" typeface="Vrinda"/>
+        <a:font script="Gujr" typeface="Shruti"/>
+        <a:font script="Khmr" typeface="MoolBoran"/>
+        <a:font script="Knda" typeface="Tunga"/>
+        <a:font script="Guru" typeface="Raavi"/>
+        <a:font script="Cans" typeface="Euphemia"/>
+        <a:font script="Cher" typeface="Plantagenet Cherokee"/>
+        <a:font script="Yiii" typeface="Microsoft Yi Baiti"/>
+        <a:font script="Tibt" typeface="Microsoft Himalaya"/>
+        <a:font script="Thaa" typeface="MV Boli"/>
+        <a:font script="Deva" typeface="Mangal"/>
+        <a:font script="Telu" typeface="Gautami"/>
+        <a:font script="Taml" typeface="Latha"/>
+        <a:font script="Syrc" typeface="Estrangelo Edessa"/>
+        <a:font script="Orya" typeface="Kalinga"/>
+        <a:font script="Mlym" typeface="Kartika"/>
+        <a:font script="Laoo" typeface="DokChampa"/>
+        <a:font script="Sinh" typeface="Iskoola Pota"/>
+        <a:font script="Mong" typeface="Mongolian Baiti"/>
+        <a:font script="Viet" typeface="Times New Roman"/>
+        <a:font script="Uigh" typeface="Microsoft Uighur"/>
+        <a:font script="Geor" typeface="Sylfaen"/>
+      </a:majorFont>
+      <a:minorFont>
+        <a:latin typeface="Calibri"/>
+        <a:ea typeface=""/>
+        <a:cs typeface=""/>
+        <a:font script="Jpan" typeface="ＭＳ Ｐゴシック"/>
+        <a:font script="Hang" typeface="맑은 고딕"/>
+        <a:font script="Hans" typeface="宋体"/>
+        <a:font script="Hant" typeface="新細明體"/>
+        <a:font script="Arab" typeface="Arial"/>
+        <a:font script="Hebr" typeface="Arial"/>
+        <a:font script="Thai" typeface="Cordia New"/>
+        <a:font script="Ethi" typeface="Nyala"/>
+        <a:font script="Beng" typeface="Vrinda"/>
+        <a:font script="Gujr" typeface="Shruti"/>
+        <a:font script="Khmr" typeface="DaunPenh"/>
+        <a:font script="Knda" typeface="Tunga"/>
+        <a:font script="Guru" typeface="Raavi"/>
+        <a:font script="Cans" typeface="Euphemia"/>
+        <a:font script="Cher" typeface="Plantagenet Cherokee"/>
+        <a:font script="Yiii" typeface="Microsoft Yi Baiti"/>
+        <a:font script="Tibt" typeface="Microsoft Himalaya"/>
+        <a:font script="Thaa" typeface="MV Boli"/>
+        <a:font script="Deva" typeface="Mangal"/>
+        <a:font script="Telu" typeface="Gautami"/>
+        <a:font script="Taml" typeface="Latha"/>
+        <a:font script="Syrc" typeface="Estrangelo Edessa"/>
+        <a:font script="Orya" typeface="Kalinga"/>
+        <a:font script="Mlym" typeface="Kartika"/>
+        <a:font script="Laoo" typeface="DokChampa"/>
+        <a:font script="Sinh" typeface="Iskoola Pota"/>
+        <a:font script="Mong" typeface="Mongolian Baiti"/>
+        <a:font script="Viet" typeface="Arial"/>
+        <a:font script="Uigh" typeface="Microsoft Uighur"/>
+        <a:font script="Geor" typeface="Sylfaen"/>
+      </a:minorFont>
+    </a:fontScheme>
+    <a:fmtScheme name="Office">
+      <a:fillStyleLst>
+        <a:solidFill>
+          <a:schemeClr val="phClr"/>
+        </a:solidFill>
+        <a:gradFill rotWithShape="1">
+          <a:gsLst>
+            <a:gs pos="0">
+              <a:schemeClr val="phClr">
+                <a:tint val="50000"/>
+                <a:satMod val="300000"/>
+              </a:schemeClr>
+            </a:gs>
+            <a:gs pos="35000">
+              <a:schemeClr val="phClr">
+                <a:tint val="37000"/>
+                <a:satMod val="300000"/>
+              </a:schemeClr>
+            </a:gs>
+            <a:gs pos="100000">
+              <a:schemeClr val="phClr">
+                <a:tint val="15000"/>
+                <a:satMod val="350000"/>
+              </a:schemeClr>
+            </a:gs>
+          </a:gsLst>
+          <a:lin ang="16200000" scaled="1"/>
+        </a:gradFill>
+        <a:gradFill rotWithShape="1">
+          <a:gsLst>
+            <a:gs pos="0">
+              <a:schemeClr val="phClr">
+                <a:tint val="100000"/>
+                <a:shade val="100000"/>
+                <a:satMod val="130000"/>
+              </a:schemeClr>
+            </a:gs>
+            <a:gs pos="100000">
+              <a:schemeClr val="phClr">
+                <a:tint val="50000"/>
+                <a:shade val="100000"/>
+                <a:satMod val="350000"/>
+              </a:schemeClr>
+            </a:gs>
+          </a:gsLst>
+          <a:lin ang="16200000" scaled="0"/>
+        </a:gradFill>
+      </a:fillStyleLst>
+      <a:lnStyleLst>
+        <a:ln w="9525" cap="flat" cmpd="sng" algn="ctr">
+          <a:solidFill>
+            <a:schemeClr val="phClr">
+              <a:shade val="95000"/>
+              <a:satMod val="105000"/>
+            </a:schemeClr>
+          </a:solidFill>
+          <a:prstDash val="solid"/>
+        </a:ln>
+        <a:ln w="25400" cap="flat" cmpd="sng" algn="ctr">
+          <a:solidFill>
+            <a:schemeClr val="phClr"/>
+          </a:solidFill>
+          <a:prstDash val="solid"/>
+        </a:ln>
+        <a:ln w="38100" cap="flat" cmpd="sng" algn="ctr">
+          <a:solidFill>
+            <a:schemeClr val="phClr"/>
+          </a:solidFill>
+          <a:prstDash val="solid"/>
+        </a:ln>
+      </a:lnStyleLst>
+      <a:effectStyleLst>
+        <a:effectStyle>
+          <a:effectLst>
+            <a:outerShdw blurRad="40000" dist="20000" dir="5400000" rotWithShape="0">
+              <a:srgbClr val="000000">
+                <a:alpha val="38000"/>
+              </a:srgbClr>
+            </a:outerShdw>
+          </a:effectLst>
+        </a:effectStyle>
+        <a:effectStyle>
+          <a:effectLst>
+            <a:outerShdw blurRad="40000" dist="23000" dir="5400000" rotWithShape="0">
+              <a:srgbClr val="000000">
+                <a:alpha val="35000"/>
+              </a:srgbClr>
+            </a:outerShdw>
+          </a:effectLst>
+        </a:effectStyle>
+        <a:effectStyle>
+          <a:effectLst>
+            <a:outerShdw blurRad="40000" dist="23000" dir="5400000" rotWithShape="0">
+              <a:srgbClr val="000000">
+                <a:alpha val="35000"/>
+              </a:srgbClr>
+            </a:outerShdw>
+          </a:effectLst>
+          <a:scene3d>
+            <a:camera prst="orthographicFront">
+              <a:rot lat="0" lon="0" rev="0"/>
+            </a:camera>
+            <a:lightRig rig="threePt" dir="t">
+              <a:rot lat="0" lon="0" rev="1200000"/>
+            </a:lightRig>
+          </a:scene3d>
+          <a:sp3d>
+            <a:bevelT w="63500" h="25400"/>
+          </a:sp3d>
+        </a:effectStyle>
+      </a:effectStyleLst>
+      <a:bgFillStyleLst>
+        <a:solidFill>
+          <a:schemeClr val="phClr"/>
+        </a:solidFill>
+        <a:gradFill rotWithShape="1">
+          <a:gsLst>
+            <a:gs pos="0">
+              <a:schemeClr val="phClr">
+                <a:tint val="40000"/>
+                <a:satMod val="350000"/>
+              </a:schemeClr>
+            </a:gs>
+            <a:gs pos="40000">
+              <a:schemeClr val="phClr">
+                <a:tint val="45000"/>
+                <a:shade val="99000"/>
+                <a:satMod val="350000"/>
+              </a:schemeClr>
+            </a:gs>
+            <a:gs pos="100000">
+              <a:schemeClr val="phClr">
+                <a:shade val="20000"/>
+                <a:satMod val="255000"/>
+              </a:schemeClr>
+            </a:gs>
+          </a:gsLst>
+          <a:path path="circle">
+            <a:fillToRect l="50000" t="-80000" r="50000" b="180000"/>
+          </a:path>
+        </a:gradFill>
+        <a:gradFill rotWithShape="1">
+          <a:gsLst>
+            <a:gs pos="0">
+              <a:schemeClr val="phClr">
+                <a:tint val="80000"/>
+                <a:satMod val="300000"/>
+              </a:schemeClr>
+            </a:gs>
+            <a:gs pos="100000">
+              <a:schemeClr val="phClr">
+                <a:shade val="30000"/>
+                <a:satMod val="200000"/>
+              </a:schemeClr>
+            </a:gs>
+          </a:gsLst>
+          <a:path path="circle">
+            <a:fillToRect l="50000" t="50000" r="50000" b="50000"/>
+          </a:path>
+        </a:gradFill>
+      </a:bgFillStyleLst>
+    </a:fmtScheme>
+  </a:themeElements>
+  <a:objectDefaults>
+    <a:spDef>
+      <a:spPr/>
+      <a:bodyPr/>
+      <a:lstStyle/>
+      <a:style>
+        <a:lnRef idx="1">
+          <a:schemeClr val="accent1"/>
+        </a:lnRef>
+        <a:fillRef idx="3">
+          <a:schemeClr val="accent1"/>
+        </a:fillRef>
+        <a:effectRef idx="2">
+          <a:schemeClr val="accent1"/>
+        </a:effectRef>
+        <a:fontRef idx="minor">
+          <a:schemeClr val="lt1"/>
+        </a:fontRef>
+      </a:style>
+    </a:spDef>
+    <a:lnDef>
+      <a:spPr/>
+      <a:bodyPr/>
+      <a:lstStyle/>
+      <a:style>
+        <a:lnRef idx="2">
+          <a:schemeClr val="accent1"/>
+        </a:lnRef>
+        <a:fillRef idx="0">
+          <a:schemeClr val="accent1"/>
+        </a:fillRef>
+        <a:effectRef idx="1">
+          <a:schemeClr val="accent1"/>
+        </a:effectRef>
+        <a:fontRef idx="minor">
+          <a:schemeClr val="tx1"/>
+        </a:fontRef>
+      </a:style>
+    </a:lnDef>
+  </a:objectDefaults>
+  <a:extraClrSchemeLst/>
+</a:theme>
 </file>
</xml_diff>

<commit_message>
final version of ppt. i think
</commit_message>
<xml_diff>
--- a/Presentation1.pptx
+++ b/Presentation1.pptx
@@ -5,7 +5,7 @@
     <p:sldMasterId id="2147483708" r:id="rId1"/>
   </p:sldMasterIdLst>
   <p:notesMasterIdLst>
-    <p:notesMasterId r:id="rId10"/>
+    <p:notesMasterId r:id="rId11"/>
   </p:notesMasterIdLst>
   <p:sldIdLst>
     <p:sldId id="256" r:id="rId2"/>
@@ -14,8 +14,9 @@
     <p:sldId id="261" r:id="rId5"/>
     <p:sldId id="258" r:id="rId6"/>
     <p:sldId id="262" r:id="rId7"/>
-    <p:sldId id="259" r:id="rId8"/>
-    <p:sldId id="263" r:id="rId9"/>
+    <p:sldId id="264" r:id="rId8"/>
+    <p:sldId id="259" r:id="rId9"/>
+    <p:sldId id="263" r:id="rId10"/>
   </p:sldIdLst>
   <p:sldSz cx="5029200" cy="7772400"/>
   <p:notesSz cx="6858000" cy="9144000"/>
@@ -915,8 +916,12 @@
           <a:lstStyle/>
           <a:p>
             <a:r>
+              <a:rPr lang="en-US" dirty="0" smtClean="0"/>
+              <a:t>This page</a:t>
+            </a:r>
+            <a:r>
               <a:rPr lang="en-US" baseline="0" dirty="0" smtClean="0"/>
-              <a:t>This is what users will typically see when they enter the app. The Pet My Pet logo will be relocated to a small bar on the top to make room for the dog listing, along with a settings button for dog owners . When users open the app, the “Find dogs in your area” button will open a listing of dogs in their vicinity, showing the dog’s profile picture, their name under it, and next to that, their owner’s name, the distance of the dog away from the user, and the amount of “playtime” remaining. The “Start playtime button” is meant for the use of dog owners. Pressing it will activate a window that asks them to enter the amount of play time they plan to make their dog available to other users. If the user is not yet a dog owner, then it will show an option to become a registered dog owner, after which being pressed will take them through the process of setting up their dog’s profile.</a:t>
+              <a:t> will redirect back to the “What is your dog’s name? Upload a picture!” sequence.</a:t>
             </a:r>
             <a:endParaRPr lang="en-US" dirty="0"/>
           </a:p>
@@ -948,7 +953,208 @@
     </p:spTree>
     <p:extLst>
       <p:ext uri="{BB962C8B-B14F-4D97-AF65-F5344CB8AC3E}">
+        <p14:creationId xmlns:p14="http://schemas.microsoft.com/office/powerpoint/2010/main" val="477665738"/>
+      </p:ext>
+    </p:extLst>
+  </p:cSld>
+  <p:clrMapOvr>
+    <a:masterClrMapping/>
+  </p:clrMapOvr>
+</p:notes>
+</file>
+
+<file path=ppt/notesSlides/notesSlide6.xml><?xml version="1.0" encoding="utf-8"?>
+<p:notes xmlns:a="http://schemas.openxmlformats.org/drawingml/2006/main" xmlns:r="http://schemas.openxmlformats.org/officeDocument/2006/relationships" xmlns:p="http://schemas.openxmlformats.org/presentationml/2006/main">
+  <p:cSld>
+    <p:spTree>
+      <p:nvGrpSpPr>
+        <p:cNvPr id="1" name=""/>
+        <p:cNvGrpSpPr/>
+        <p:nvPr/>
+      </p:nvGrpSpPr>
+      <p:grpSpPr>
+        <a:xfrm>
+          <a:off x="0" y="0"/>
+          <a:ext cx="0" cy="0"/>
+          <a:chOff x="0" y="0"/>
+          <a:chExt cx="0" cy="0"/>
+        </a:xfrm>
+      </p:grpSpPr>
+      <p:sp>
+        <p:nvSpPr>
+          <p:cNvPr id="2" name="Slide Image Placeholder 1"/>
+          <p:cNvSpPr>
+            <a:spLocks noGrp="1" noRot="1" noChangeAspect="1"/>
+          </p:cNvSpPr>
+          <p:nvPr>
+            <p:ph type="sldImg"/>
+          </p:nvPr>
+        </p:nvSpPr>
+        <p:spPr>
+          <a:xfrm>
+            <a:off x="2320925" y="685800"/>
+            <a:ext cx="2216150" cy="3429000"/>
+          </a:xfrm>
+        </p:spPr>
+      </p:sp>
+      <p:sp>
+        <p:nvSpPr>
+          <p:cNvPr id="3" name="Notes Placeholder 2"/>
+          <p:cNvSpPr>
+            <a:spLocks noGrp="1"/>
+          </p:cNvSpPr>
+          <p:nvPr>
+            <p:ph type="body" idx="1"/>
+          </p:nvPr>
+        </p:nvSpPr>
+        <p:spPr/>
+        <p:txBody>
+          <a:bodyPr/>
+          <a:lstStyle/>
+          <a:p>
+            <a:r>
+              <a:rPr lang="en-US" baseline="0" dirty="0" smtClean="0"/>
+              <a:t>This is what users will typically see when they enter the </a:t>
+            </a:r>
+            <a:r>
+              <a:rPr lang="en-US" baseline="0" dirty="0" smtClean="0"/>
+              <a:t>app, after logging in. </a:t>
+            </a:r>
+            <a:r>
+              <a:rPr lang="en-US" baseline="0" dirty="0" smtClean="0"/>
+              <a:t>The Pet My Pet logo will be relocated to a small bar on the top to make room for the dog listing, along with a settings button for dog </a:t>
+            </a:r>
+            <a:r>
+              <a:rPr lang="en-US" baseline="0" dirty="0" smtClean="0"/>
+              <a:t>owners to manage their dogs’ profiles. </a:t>
+            </a:r>
+            <a:r>
+              <a:rPr lang="en-US" baseline="0" dirty="0" smtClean="0"/>
+              <a:t>When users open the app, the “Find dogs in your area” button will open a listing of dogs in their vicinity, showing the dog’s profile picture, their name under it, and next to that, their owner’s name, the distance of the dog away from the user, and the amount of “playtime” remaining. The “Start playtime button” is meant for the use of dog owners</a:t>
+            </a:r>
+            <a:r>
+              <a:rPr lang="en-US" baseline="0" dirty="0" smtClean="0"/>
+              <a:t>.</a:t>
+            </a:r>
+            <a:endParaRPr lang="en-US" dirty="0"/>
+          </a:p>
+        </p:txBody>
+      </p:sp>
+      <p:sp>
+        <p:nvSpPr>
+          <p:cNvPr id="4" name="Slide Number Placeholder 3"/>
+          <p:cNvSpPr>
+            <a:spLocks noGrp="1"/>
+          </p:cNvSpPr>
+          <p:nvPr>
+            <p:ph type="sldNum" sz="quarter" idx="10"/>
+          </p:nvPr>
+        </p:nvSpPr>
+        <p:spPr/>
+        <p:txBody>
+          <a:bodyPr/>
+          <a:lstStyle/>
+          <a:p>
+            <a:fld id="{5A5A9B6F-1E28-A941-A0BF-C40F2A12F7A9}" type="slidenum">
+              <a:rPr lang="en-US" smtClean="0"/>
+              <a:t>8</a:t>
+            </a:fld>
+            <a:endParaRPr lang="en-US"/>
+          </a:p>
+        </p:txBody>
+      </p:sp>
+    </p:spTree>
+    <p:extLst>
+      <p:ext uri="{BB962C8B-B14F-4D97-AF65-F5344CB8AC3E}">
         <p14:creationId xmlns:p14="http://schemas.microsoft.com/office/powerpoint/2010/main" val="3594850637"/>
+      </p:ext>
+    </p:extLst>
+  </p:cSld>
+  <p:clrMapOvr>
+    <a:masterClrMapping/>
+  </p:clrMapOvr>
+</p:notes>
+</file>
+
+<file path=ppt/notesSlides/notesSlide7.xml><?xml version="1.0" encoding="utf-8"?>
+<p:notes xmlns:a="http://schemas.openxmlformats.org/drawingml/2006/main" xmlns:r="http://schemas.openxmlformats.org/officeDocument/2006/relationships" xmlns:p="http://schemas.openxmlformats.org/presentationml/2006/main">
+  <p:cSld>
+    <p:spTree>
+      <p:nvGrpSpPr>
+        <p:cNvPr id="1" name=""/>
+        <p:cNvGrpSpPr/>
+        <p:nvPr/>
+      </p:nvGrpSpPr>
+      <p:grpSpPr>
+        <a:xfrm>
+          <a:off x="0" y="0"/>
+          <a:ext cx="0" cy="0"/>
+          <a:chOff x="0" y="0"/>
+          <a:chExt cx="0" cy="0"/>
+        </a:xfrm>
+      </p:grpSpPr>
+      <p:sp>
+        <p:nvSpPr>
+          <p:cNvPr id="2" name="Slide Image Placeholder 1"/>
+          <p:cNvSpPr>
+            <a:spLocks noGrp="1" noRot="1" noChangeAspect="1"/>
+          </p:cNvSpPr>
+          <p:nvPr>
+            <p:ph type="sldImg"/>
+          </p:nvPr>
+        </p:nvSpPr>
+        <p:spPr/>
+      </p:sp>
+      <p:sp>
+        <p:nvSpPr>
+          <p:cNvPr id="3" name="Notes Placeholder 2"/>
+          <p:cNvSpPr>
+            <a:spLocks noGrp="1"/>
+          </p:cNvSpPr>
+          <p:nvPr>
+            <p:ph type="body" idx="1"/>
+          </p:nvPr>
+        </p:nvSpPr>
+        <p:spPr/>
+        <p:txBody>
+          <a:bodyPr/>
+          <a:lstStyle/>
+          <a:p>
+            <a:r>
+              <a:rPr lang="en-US" baseline="0" dirty="0" smtClean="0"/>
+              <a:t>Pressing the “Start playtime” button will activate a window that asks the user to enter the amount of play time they plan to make their dog available to play with other users. If the user is not yet a dog owner, then it will show an option to become a registered dog owner, after which being pressed will take them through the process of setting up their dog’s profile.</a:t>
+            </a:r>
+            <a:endParaRPr lang="en-US" dirty="0"/>
+          </a:p>
+        </p:txBody>
+      </p:sp>
+      <p:sp>
+        <p:nvSpPr>
+          <p:cNvPr id="4" name="Slide Number Placeholder 3"/>
+          <p:cNvSpPr>
+            <a:spLocks noGrp="1"/>
+          </p:cNvSpPr>
+          <p:nvPr>
+            <p:ph type="sldNum" sz="quarter" idx="10"/>
+          </p:nvPr>
+        </p:nvSpPr>
+        <p:spPr/>
+        <p:txBody>
+          <a:bodyPr/>
+          <a:lstStyle/>
+          <a:p>
+            <a:fld id="{5A5A9B6F-1E28-A941-A0BF-C40F2A12F7A9}" type="slidenum">
+              <a:rPr lang="en-US" smtClean="0"/>
+              <a:t>9</a:t>
+            </a:fld>
+            <a:endParaRPr lang="en-US"/>
+          </a:p>
+        </p:txBody>
+      </p:sp>
+    </p:spTree>
+    <p:extLst>
+      <p:ext uri="{BB962C8B-B14F-4D97-AF65-F5344CB8AC3E}">
+        <p14:creationId xmlns:p14="http://schemas.microsoft.com/office/powerpoint/2010/main" val="3008343479"/>
       </p:ext>
     </p:extLst>
   </p:cSld>
@@ -5417,7 +5623,7 @@
         </p:nvSpPr>
         <p:spPr>
           <a:xfrm>
-            <a:off x="775266" y="3204550"/>
+            <a:off x="762566" y="3204550"/>
             <a:ext cx="3500581" cy="283924"/>
           </a:xfrm>
           <a:prstGeom prst="rect">
@@ -6012,7 +6218,7 @@
         </p:nvSpPr>
         <p:spPr>
           <a:xfrm>
-            <a:off x="775266" y="3204550"/>
+            <a:off x="762566" y="3204550"/>
             <a:ext cx="3500581" cy="283924"/>
           </a:xfrm>
           <a:prstGeom prst="rect">
@@ -6415,7 +6621,7 @@
         </p:nvSpPr>
         <p:spPr>
           <a:xfrm>
-            <a:off x="559" y="0"/>
+            <a:off x="0" y="0"/>
             <a:ext cx="5029200" cy="7772400"/>
           </a:xfrm>
           <a:prstGeom prst="rect">
@@ -6465,16 +6671,40 @@
           </a:p>
         </p:txBody>
       </p:sp>
-      <p:sp>
-        <p:nvSpPr>
-          <p:cNvPr id="21" name="Rounded Rectangle 20"/>
+      <p:pic>
+        <p:nvPicPr>
+          <p:cNvPr id="39" name="Picture 38"/>
+          <p:cNvPicPr>
+            <a:picLocks noChangeAspect="1"/>
+          </p:cNvPicPr>
+          <p:nvPr/>
+        </p:nvPicPr>
+        <p:blipFill>
+          <a:blip r:embed="rId3"/>
+          <a:stretch>
+            <a:fillRect/>
+          </a:stretch>
+        </p:blipFill>
+        <p:spPr>
+          <a:xfrm>
+            <a:off x="1214199" y="490140"/>
+            <a:ext cx="2638021" cy="2187627"/>
+          </a:xfrm>
+          <a:prstGeom prst="rect">
+            <a:avLst/>
+          </a:prstGeom>
+        </p:spPr>
+      </p:pic>
+      <p:sp>
+        <p:nvSpPr>
+          <p:cNvPr id="3" name="Rounded Rectangle 2"/>
           <p:cNvSpPr/>
           <p:nvPr/>
         </p:nvSpPr>
         <p:spPr>
           <a:xfrm>
-            <a:off x="308954" y="897466"/>
-            <a:ext cx="4301019" cy="5955824"/>
+            <a:off x="372985" y="2849390"/>
+            <a:ext cx="4301019" cy="4727631"/>
           </a:xfrm>
           <a:prstGeom prst="roundRect">
             <a:avLst/>
@@ -6511,16 +6741,59 @@
       </p:sp>
       <p:sp>
         <p:nvSpPr>
-          <p:cNvPr id="4" name="Rectangle 3"/>
+          <p:cNvPr id="2" name="TextBox 1"/>
+          <p:cNvSpPr txBox="1"/>
+          <p:nvPr/>
+        </p:nvSpPr>
+        <p:spPr>
+          <a:xfrm>
+            <a:off x="746523" y="3190881"/>
+            <a:ext cx="3500581" cy="283924"/>
+          </a:xfrm>
+          <a:prstGeom prst="rect">
+            <a:avLst/>
+          </a:prstGeom>
+          <a:noFill/>
+        </p:spPr>
+        <p:txBody>
+          <a:bodyPr wrap="square" rtlCol="0">
+            <a:spAutoFit/>
+          </a:bodyPr>
+          <a:lstStyle/>
+          <a:p>
+            <a:pPr algn="ctr"/>
+            <a:r>
+              <a:rPr lang="en-US" sz="1245" dirty="0" smtClean="0">
+                <a:solidFill>
+                  <a:schemeClr val="accent6">
+                    <a:lumMod val="50000"/>
+                  </a:schemeClr>
+                </a:solidFill>
+              </a:rPr>
+              <a:t>Would you like to add another dog’s profile?</a:t>
+            </a:r>
+            <a:endParaRPr lang="en-US" sz="1245" dirty="0">
+              <a:solidFill>
+                <a:schemeClr val="accent6">
+                  <a:lumMod val="50000"/>
+                </a:schemeClr>
+              </a:solidFill>
+            </a:endParaRPr>
+          </a:p>
+        </p:txBody>
+      </p:sp>
+      <p:sp>
+        <p:nvSpPr>
+          <p:cNvPr id="12" name="Rounded Rectangle 11"/>
           <p:cNvSpPr/>
           <p:nvPr/>
         </p:nvSpPr>
         <p:spPr>
           <a:xfrm>
-            <a:off x="0" y="6947673"/>
-            <a:ext cx="2508038" cy="821733"/>
-          </a:xfrm>
-          <a:prstGeom prst="rect">
+            <a:off x="1672766" y="3883368"/>
+            <a:ext cx="1648090" cy="520654"/>
+          </a:xfrm>
+          <a:prstGeom prst="roundRect">
             <a:avLst/>
           </a:prstGeom>
           <a:solidFill>
@@ -6534,13 +6807,15 @@
           </a:ln>
         </p:spPr>
         <p:style>
-          <a:lnRef idx="1">
-            <a:schemeClr val="accent1"/>
+          <a:lnRef idx="2">
+            <a:schemeClr val="accent1">
+              <a:shade val="50000"/>
+            </a:schemeClr>
           </a:lnRef>
-          <a:fillRef idx="3">
+          <a:fillRef idx="1">
             <a:schemeClr val="accent1"/>
           </a:fillRef>
-          <a:effectRef idx="2">
+          <a:effectRef idx="0">
             <a:schemeClr val="accent1"/>
           </a:effectRef>
           <a:fontRef idx="minor">
@@ -6548,42 +6823,7 @@
           </a:fontRef>
         </p:style>
         <p:txBody>
-          <a:bodyPr rot="0" spcFirstLastPara="0" vertOverflow="overflow" horzOverflow="overflow" vert="horz" wrap="square" lIns="91440" tIns="45721" rIns="91440" bIns="45721" numCol="1" spcCol="0" rtlCol="0" fromWordArt="0" anchor="ctr" anchorCtr="0" forceAA="0" compatLnSpc="1">
-            <a:prstTxWarp prst="textNoShape">
-              <a:avLst/>
-            </a:prstTxWarp>
-            <a:noAutofit/>
-          </a:bodyPr>
-          <a:lstStyle/>
-          <a:p>
-            <a:pPr algn="ctr"/>
-            <a:endParaRPr lang="en-US" sz="1245"/>
-          </a:p>
-        </p:txBody>
-      </p:sp>
-      <p:sp>
-        <p:nvSpPr>
-          <p:cNvPr id="18" name="TextBox 17"/>
-          <p:cNvSpPr txBox="1"/>
-          <p:nvPr/>
-        </p:nvSpPr>
-        <p:spPr>
-          <a:xfrm>
-            <a:off x="2987" y="7185448"/>
-            <a:ext cx="2515724" cy="283924"/>
-          </a:xfrm>
-          <a:prstGeom prst="rect">
-            <a:avLst/>
-          </a:prstGeom>
-          <a:noFill/>
-          <a:ln>
-            <a:noFill/>
-          </a:ln>
-        </p:spPr>
-        <p:txBody>
-          <a:bodyPr wrap="square" rtlCol="0">
-            <a:spAutoFit/>
-          </a:bodyPr>
+          <a:bodyPr rtlCol="0" anchor="ctr"/>
           <a:lstStyle/>
           <a:p>
             <a:pPr algn="ctr"/>
@@ -6595,163 +6835,21 @@
                   </a:schemeClr>
                 </a:solidFill>
               </a:rPr>
-              <a:t>Find dogs in your area</a:t>
-            </a:r>
-          </a:p>
-        </p:txBody>
-      </p:sp>
-      <p:sp>
-        <p:nvSpPr>
-          <p:cNvPr id="20" name="Rectangle 19"/>
+              <a:t>Yes</a:t>
+            </a:r>
+          </a:p>
+        </p:txBody>
+      </p:sp>
+      <p:sp>
+        <p:nvSpPr>
+          <p:cNvPr id="14" name="Rounded Rectangle 13"/>
           <p:cNvSpPr/>
           <p:nvPr/>
         </p:nvSpPr>
         <p:spPr>
           <a:xfrm>
-            <a:off x="2521697" y="6950667"/>
-            <a:ext cx="2508038" cy="821733"/>
-          </a:xfrm>
-          <a:prstGeom prst="rect">
-            <a:avLst/>
-          </a:prstGeom>
-          <a:solidFill>
-            <a:schemeClr val="bg1">
-              <a:lumMod val="95000"/>
-            </a:schemeClr>
-          </a:solidFill>
-          <a:ln>
-            <a:noFill/>
-          </a:ln>
-        </p:spPr>
-        <p:style>
-          <a:lnRef idx="1">
-            <a:schemeClr val="accent1"/>
-          </a:lnRef>
-          <a:fillRef idx="3">
-            <a:schemeClr val="accent1"/>
-          </a:fillRef>
-          <a:effectRef idx="2">
-            <a:schemeClr val="accent1"/>
-          </a:effectRef>
-          <a:fontRef idx="minor">
-            <a:schemeClr val="lt1"/>
-          </a:fontRef>
-        </p:style>
-        <p:txBody>
-          <a:bodyPr rot="0" spcFirstLastPara="0" vertOverflow="overflow" horzOverflow="overflow" vert="horz" wrap="square" lIns="91440" tIns="45721" rIns="91440" bIns="45721" numCol="1" spcCol="0" rtlCol="0" fromWordArt="0" anchor="ctr" anchorCtr="0" forceAA="0" compatLnSpc="1">
-            <a:prstTxWarp prst="textNoShape">
-              <a:avLst/>
-            </a:prstTxWarp>
-            <a:noAutofit/>
-          </a:bodyPr>
-          <a:lstStyle/>
-          <a:p>
-            <a:pPr algn="ctr"/>
-            <a:endParaRPr lang="en-US" sz="1245"/>
-          </a:p>
-        </p:txBody>
-      </p:sp>
-      <p:sp>
-        <p:nvSpPr>
-          <p:cNvPr id="19" name="TextBox 18"/>
-          <p:cNvSpPr txBox="1"/>
-          <p:nvPr/>
-        </p:nvSpPr>
-        <p:spPr>
-          <a:xfrm>
-            <a:off x="2511025" y="7185448"/>
-            <a:ext cx="2515724" cy="283924"/>
-          </a:xfrm>
-          <a:prstGeom prst="rect">
-            <a:avLst/>
-          </a:prstGeom>
-          <a:noFill/>
-          <a:ln>
-            <a:noFill/>
-          </a:ln>
-        </p:spPr>
-        <p:txBody>
-          <a:bodyPr wrap="square" rtlCol="0">
-            <a:spAutoFit/>
-          </a:bodyPr>
-          <a:lstStyle/>
-          <a:p>
-            <a:pPr algn="ctr"/>
-            <a:r>
-              <a:rPr lang="en-US" sz="1245" dirty="0">
-                <a:solidFill>
-                  <a:schemeClr val="accent6">
-                    <a:lumMod val="50000"/>
-                  </a:schemeClr>
-                </a:solidFill>
-              </a:rPr>
-              <a:t>Start playtime</a:t>
-            </a:r>
-          </a:p>
-        </p:txBody>
-      </p:sp>
-      <p:sp>
-        <p:nvSpPr>
-          <p:cNvPr id="29" name="Rounded Rectangle 28"/>
-          <p:cNvSpPr/>
-          <p:nvPr/>
-        </p:nvSpPr>
-        <p:spPr>
-          <a:xfrm>
-            <a:off x="4174068" y="1270001"/>
-            <a:ext cx="279399" cy="5215468"/>
-          </a:xfrm>
-          <a:prstGeom prst="roundRect">
-            <a:avLst/>
-          </a:prstGeom>
-          <a:solidFill>
-            <a:schemeClr val="accent6">
-              <a:lumMod val="40000"/>
-              <a:lumOff val="60000"/>
-            </a:schemeClr>
-          </a:solidFill>
-          <a:ln>
-            <a:noFill/>
-          </a:ln>
-        </p:spPr>
-        <p:style>
-          <a:lnRef idx="1">
-            <a:schemeClr val="accent1"/>
-          </a:lnRef>
-          <a:fillRef idx="3">
-            <a:schemeClr val="accent1"/>
-          </a:fillRef>
-          <a:effectRef idx="2">
-            <a:schemeClr val="accent1"/>
-          </a:effectRef>
-          <a:fontRef idx="minor">
-            <a:schemeClr val="lt1"/>
-          </a:fontRef>
-        </p:style>
-        <p:txBody>
-          <a:bodyPr rot="0" spcFirstLastPara="0" vertOverflow="overflow" horzOverflow="overflow" vert="horz" wrap="square" lIns="91440" tIns="45721" rIns="91440" bIns="45721" numCol="1" spcCol="0" rtlCol="0" fromWordArt="0" anchor="ctr" anchorCtr="0" forceAA="0" compatLnSpc="1">
-            <a:prstTxWarp prst="textNoShape">
-              <a:avLst/>
-            </a:prstTxWarp>
-            <a:noAutofit/>
-          </a:bodyPr>
-          <a:lstStyle/>
-          <a:p>
-            <a:pPr algn="ctr"/>
-            <a:endParaRPr lang="en-US" sz="1245"/>
-          </a:p>
-        </p:txBody>
-      </p:sp>
-      <p:sp>
-        <p:nvSpPr>
-          <p:cNvPr id="9" name="Rounded Rectangle 8"/>
-          <p:cNvSpPr/>
-          <p:nvPr/>
-        </p:nvSpPr>
-        <p:spPr>
-          <a:xfrm>
-            <a:off x="4237566" y="4246035"/>
-            <a:ext cx="152400" cy="1206501"/>
+            <a:off x="1709162" y="4747627"/>
+            <a:ext cx="1648090" cy="520654"/>
           </a:xfrm>
           <a:prstGeom prst="roundRect">
             <a:avLst/>
@@ -6767,13 +6865,15 @@
           </a:ln>
         </p:spPr>
         <p:style>
-          <a:lnRef idx="1">
-            <a:schemeClr val="accent1"/>
+          <a:lnRef idx="2">
+            <a:schemeClr val="accent1">
+              <a:shade val="50000"/>
+            </a:schemeClr>
           </a:lnRef>
-          <a:fillRef idx="3">
+          <a:fillRef idx="1">
             <a:schemeClr val="accent1"/>
           </a:fillRef>
-          <a:effectRef idx="2">
+          <a:effectRef idx="0">
             <a:schemeClr val="accent1"/>
           </a:effectRef>
           <a:fontRef idx="minor">
@@ -6781,116 +6881,7 @@
           </a:fontRef>
         </p:style>
         <p:txBody>
-          <a:bodyPr rot="0" spcFirstLastPara="0" vertOverflow="overflow" horzOverflow="overflow" vert="horz" wrap="square" lIns="91440" tIns="45721" rIns="91440" bIns="45721" numCol="1" spcCol="0" rtlCol="0" fromWordArt="0" anchor="ctr" anchorCtr="0" forceAA="0" compatLnSpc="1">
-            <a:prstTxWarp prst="textNoShape">
-              <a:avLst/>
-            </a:prstTxWarp>
-            <a:noAutofit/>
-          </a:bodyPr>
-          <a:lstStyle/>
-          <a:p>
-            <a:pPr algn="ctr"/>
-            <a:endParaRPr lang="en-US" sz="1245"/>
-          </a:p>
-        </p:txBody>
-      </p:sp>
-      <p:pic>
-        <p:nvPicPr>
-          <p:cNvPr id="10" name="Picture 9"/>
-          <p:cNvPicPr>
-            <a:picLocks noChangeAspect="1"/>
-          </p:cNvPicPr>
-          <p:nvPr/>
-        </p:nvPicPr>
-        <p:blipFill>
-          <a:blip r:embed="rId3"/>
-          <a:stretch>
-            <a:fillRect/>
-          </a:stretch>
-        </p:blipFill>
-        <p:spPr>
-          <a:xfrm>
-            <a:off x="704065" y="3586616"/>
-            <a:ext cx="1055668" cy="838201"/>
-          </a:xfrm>
-          <a:prstGeom prst="rect">
-            <a:avLst/>
-          </a:prstGeom>
-        </p:spPr>
-      </p:pic>
-      <p:pic>
-        <p:nvPicPr>
-          <p:cNvPr id="13" name="Picture 12"/>
-          <p:cNvPicPr>
-            <a:picLocks noChangeAspect="1"/>
-          </p:cNvPicPr>
-          <p:nvPr/>
-        </p:nvPicPr>
-        <p:blipFill>
-          <a:blip r:embed="rId4"/>
-          <a:stretch>
-            <a:fillRect/>
-          </a:stretch>
-        </p:blipFill>
-        <p:spPr>
-          <a:xfrm>
-            <a:off x="0" y="4080933"/>
-            <a:ext cx="2438400" cy="2438400"/>
-          </a:xfrm>
-          <a:prstGeom prst="rect">
-            <a:avLst/>
-          </a:prstGeom>
-        </p:spPr>
-      </p:pic>
-      <p:pic>
-        <p:nvPicPr>
-          <p:cNvPr id="16" name="Picture 15"/>
-          <p:cNvPicPr>
-            <a:picLocks noChangeAspect="1"/>
-          </p:cNvPicPr>
-          <p:nvPr/>
-        </p:nvPicPr>
-        <p:blipFill rotWithShape="1">
-          <a:blip r:embed="rId5"/>
-          <a:srcRect t="1" b="56170"/>
-          <a:stretch/>
-        </p:blipFill>
-        <p:spPr>
-          <a:xfrm>
-            <a:off x="711200" y="6123977"/>
-            <a:ext cx="960449" cy="356616"/>
-          </a:xfrm>
-          <a:prstGeom prst="rect">
-            <a:avLst/>
-          </a:prstGeom>
-          <a:scene3d>
-            <a:camera prst="orthographicFront">
-              <a:rot lat="0" lon="10800000" rev="0"/>
-            </a:camera>
-            <a:lightRig rig="threePt" dir="t"/>
-          </a:scene3d>
-        </p:spPr>
-      </p:pic>
-      <p:sp>
-        <p:nvSpPr>
-          <p:cNvPr id="17" name="TextBox 16"/>
-          <p:cNvSpPr txBox="1"/>
-          <p:nvPr/>
-        </p:nvSpPr>
-        <p:spPr>
-          <a:xfrm>
-            <a:off x="732364" y="4508500"/>
-            <a:ext cx="1016000" cy="283924"/>
-          </a:xfrm>
-          <a:prstGeom prst="rect">
-            <a:avLst/>
-          </a:prstGeom>
-          <a:noFill/>
-        </p:spPr>
-        <p:txBody>
-          <a:bodyPr wrap="square" rtlCol="0">
-            <a:spAutoFit/>
-          </a:bodyPr>
+          <a:bodyPr rtlCol="0" anchor="ctr"/>
           <a:lstStyle/>
           <a:p>
             <a:pPr algn="ctr"/>
@@ -6902,1052 +6893,15 @@
                   </a:schemeClr>
                 </a:solidFill>
               </a:rPr>
-              <a:t>Lucky</a:t>
-            </a:r>
-          </a:p>
-        </p:txBody>
-      </p:sp>
-      <p:sp>
-        <p:nvSpPr>
-          <p:cNvPr id="42" name="TextBox 41"/>
-          <p:cNvSpPr txBox="1"/>
-          <p:nvPr/>
-        </p:nvSpPr>
-        <p:spPr>
-          <a:xfrm>
-            <a:off x="728133" y="5744633"/>
-            <a:ext cx="1016000" cy="283924"/>
-          </a:xfrm>
-          <a:prstGeom prst="rect">
-            <a:avLst/>
-          </a:prstGeom>
-          <a:noFill/>
-        </p:spPr>
-        <p:txBody>
-          <a:bodyPr wrap="square" rtlCol="0">
-            <a:spAutoFit/>
-          </a:bodyPr>
-          <a:lstStyle/>
-          <a:p>
-            <a:pPr algn="ctr"/>
-            <a:r>
-              <a:rPr lang="en-US" sz="1245" dirty="0">
-                <a:solidFill>
-                  <a:srgbClr val="385723"/>
-                </a:solidFill>
-              </a:rPr>
-              <a:t>Ducky</a:t>
-            </a:r>
-          </a:p>
-        </p:txBody>
-      </p:sp>
-      <p:sp>
-        <p:nvSpPr>
-          <p:cNvPr id="26" name="TextBox 25"/>
-          <p:cNvSpPr txBox="1"/>
-          <p:nvPr/>
-        </p:nvSpPr>
-        <p:spPr>
-          <a:xfrm>
-            <a:off x="1854200" y="3687232"/>
-            <a:ext cx="2260601" cy="667106"/>
-          </a:xfrm>
-          <a:prstGeom prst="rect">
-            <a:avLst/>
-          </a:prstGeom>
-          <a:noFill/>
-        </p:spPr>
-        <p:txBody>
-          <a:bodyPr wrap="square" rtlCol="0">
-            <a:spAutoFit/>
-          </a:bodyPr>
-          <a:lstStyle/>
-          <a:p>
-            <a:r>
-              <a:rPr lang="en-US" sz="1245" dirty="0">
-                <a:solidFill>
-                  <a:srgbClr val="385723"/>
-                </a:solidFill>
-              </a:rPr>
-              <a:t>Owner: Nan</a:t>
-            </a:r>
-          </a:p>
-          <a:p>
-            <a:r>
-              <a:rPr lang="en-US" sz="1245" dirty="0">
-                <a:solidFill>
-                  <a:srgbClr val="385723"/>
-                </a:solidFill>
-              </a:rPr>
-              <a:t>Distance: 100 </a:t>
-            </a:r>
-            <a:r>
-              <a:rPr lang="en-US" sz="1245" dirty="0" err="1">
-                <a:solidFill>
-                  <a:srgbClr val="385723"/>
-                </a:solidFill>
-              </a:rPr>
-              <a:t>ft</a:t>
-            </a:r>
-            <a:endParaRPr lang="en-US" sz="1245" dirty="0">
-              <a:solidFill>
-                <a:srgbClr val="385723"/>
-              </a:solidFill>
-            </a:endParaRPr>
-          </a:p>
-          <a:p>
-            <a:r>
-              <a:rPr lang="en-US" sz="1245" dirty="0">
-                <a:solidFill>
-                  <a:srgbClr val="385723"/>
-                </a:solidFill>
-              </a:rPr>
-              <a:t>Playtime Left: 25 min</a:t>
-            </a:r>
-          </a:p>
-        </p:txBody>
-      </p:sp>
-      <p:sp>
-        <p:nvSpPr>
-          <p:cNvPr id="43" name="TextBox 42"/>
-          <p:cNvSpPr txBox="1"/>
-          <p:nvPr/>
-        </p:nvSpPr>
-        <p:spPr>
-          <a:xfrm>
-            <a:off x="1854200" y="4995337"/>
-            <a:ext cx="2260601" cy="667106"/>
-          </a:xfrm>
-          <a:prstGeom prst="rect">
-            <a:avLst/>
-          </a:prstGeom>
-          <a:noFill/>
-        </p:spPr>
-        <p:txBody>
-          <a:bodyPr wrap="square" rtlCol="0">
-            <a:spAutoFit/>
-          </a:bodyPr>
-          <a:lstStyle/>
-          <a:p>
-            <a:r>
-              <a:rPr lang="en-US" sz="1245" dirty="0">
-                <a:solidFill>
-                  <a:srgbClr val="385723"/>
-                </a:solidFill>
-              </a:rPr>
-              <a:t>Owner: Dan</a:t>
-            </a:r>
-          </a:p>
-          <a:p>
-            <a:r>
-              <a:rPr lang="en-US" sz="1245" dirty="0">
-                <a:solidFill>
-                  <a:srgbClr val="385723"/>
-                </a:solidFill>
-              </a:rPr>
-              <a:t>Distance: 500 </a:t>
-            </a:r>
-            <a:r>
-              <a:rPr lang="en-US" sz="1245" dirty="0" err="1">
-                <a:solidFill>
-                  <a:srgbClr val="385723"/>
-                </a:solidFill>
-              </a:rPr>
-              <a:t>ft</a:t>
-            </a:r>
-            <a:endParaRPr lang="en-US" sz="1245" dirty="0">
-              <a:solidFill>
-                <a:srgbClr val="385723"/>
-              </a:solidFill>
-            </a:endParaRPr>
-          </a:p>
-          <a:p>
-            <a:r>
-              <a:rPr lang="en-US" sz="1245" dirty="0">
-                <a:solidFill>
-                  <a:srgbClr val="385723"/>
-                </a:solidFill>
-              </a:rPr>
-              <a:t>Playtime Left: 160 min</a:t>
-            </a:r>
-          </a:p>
-        </p:txBody>
-      </p:sp>
-      <p:sp>
-        <p:nvSpPr>
-          <p:cNvPr id="44" name="TextBox 43"/>
-          <p:cNvSpPr txBox="1"/>
-          <p:nvPr/>
-        </p:nvSpPr>
-        <p:spPr>
-          <a:xfrm>
-            <a:off x="1854200" y="6197605"/>
-            <a:ext cx="2260601" cy="283924"/>
-          </a:xfrm>
-          <a:prstGeom prst="rect">
-            <a:avLst/>
-          </a:prstGeom>
-          <a:noFill/>
-        </p:spPr>
-        <p:txBody>
-          <a:bodyPr wrap="square" rtlCol="0">
-            <a:spAutoFit/>
-          </a:bodyPr>
-          <a:lstStyle/>
-          <a:p>
-            <a:r>
-              <a:rPr lang="en-US" sz="1245" dirty="0">
-                <a:solidFill>
-                  <a:srgbClr val="385723"/>
-                </a:solidFill>
-              </a:rPr>
-              <a:t>Owner: </a:t>
-            </a:r>
-            <a:r>
-              <a:rPr lang="en-US" sz="1245" dirty="0" smtClean="0">
-                <a:solidFill>
-                  <a:srgbClr val="385723"/>
-                </a:solidFill>
-              </a:rPr>
-              <a:t>Fran</a:t>
-            </a:r>
-            <a:endParaRPr lang="en-US" sz="1245" dirty="0">
-              <a:solidFill>
-                <a:srgbClr val="385723"/>
-              </a:solidFill>
-            </a:endParaRPr>
-          </a:p>
-        </p:txBody>
-      </p:sp>
-      <p:sp>
-        <p:nvSpPr>
-          <p:cNvPr id="22" name="Rectangle 21"/>
-          <p:cNvSpPr/>
-          <p:nvPr/>
-        </p:nvSpPr>
-        <p:spPr>
-          <a:xfrm>
-            <a:off x="0" y="0"/>
-            <a:ext cx="5029200" cy="821733"/>
-          </a:xfrm>
-          <a:prstGeom prst="rect">
-            <a:avLst/>
-          </a:prstGeom>
-          <a:solidFill>
-            <a:schemeClr val="accent6">
-              <a:lumMod val="60000"/>
-              <a:lumOff val="40000"/>
-            </a:schemeClr>
-          </a:solidFill>
-          <a:ln>
-            <a:noFill/>
-          </a:ln>
-        </p:spPr>
-        <p:style>
-          <a:lnRef idx="1">
-            <a:schemeClr val="accent1"/>
-          </a:lnRef>
-          <a:fillRef idx="3">
-            <a:schemeClr val="accent1"/>
-          </a:fillRef>
-          <a:effectRef idx="2">
-            <a:schemeClr val="accent1"/>
-          </a:effectRef>
-          <a:fontRef idx="minor">
-            <a:schemeClr val="lt1"/>
-          </a:fontRef>
-        </p:style>
-        <p:txBody>
-          <a:bodyPr rot="0" spcFirstLastPara="0" vertOverflow="overflow" horzOverflow="overflow" vert="horz" wrap="square" lIns="91440" tIns="45721" rIns="91440" bIns="45721" numCol="1" spcCol="0" rtlCol="0" fromWordArt="0" anchor="ctr" anchorCtr="0" forceAA="0" compatLnSpc="1">
-            <a:prstTxWarp prst="textNoShape">
-              <a:avLst/>
-            </a:prstTxWarp>
-            <a:noAutofit/>
-          </a:bodyPr>
-          <a:lstStyle/>
-          <a:p>
-            <a:pPr algn="ctr"/>
-            <a:endParaRPr lang="en-US" sz="1245"/>
-          </a:p>
-        </p:txBody>
-      </p:sp>
-      <p:pic>
-        <p:nvPicPr>
-          <p:cNvPr id="23" name="Picture 22"/>
-          <p:cNvPicPr>
-            <a:picLocks noChangeAspect="1"/>
-          </p:cNvPicPr>
-          <p:nvPr/>
-        </p:nvPicPr>
-        <p:blipFill rotWithShape="1">
-          <a:blip r:embed="rId3"/>
-          <a:srcRect t="21919" b="-21561"/>
-          <a:stretch/>
-        </p:blipFill>
-        <p:spPr>
-          <a:xfrm>
-            <a:off x="704065" y="1266751"/>
-            <a:ext cx="1055668" cy="838201"/>
-          </a:xfrm>
-          <a:prstGeom prst="rect">
-            <a:avLst/>
-          </a:prstGeom>
-        </p:spPr>
-      </p:pic>
-      <p:pic>
-        <p:nvPicPr>
-          <p:cNvPr id="24" name="Picture 23"/>
-          <p:cNvPicPr>
-            <a:picLocks noChangeAspect="1"/>
-          </p:cNvPicPr>
-          <p:nvPr/>
-        </p:nvPicPr>
-        <p:blipFill>
-          <a:blip r:embed="rId4"/>
-          <a:stretch>
-            <a:fillRect/>
-          </a:stretch>
-        </p:blipFill>
-        <p:spPr>
-          <a:xfrm>
-            <a:off x="0" y="1625600"/>
-            <a:ext cx="2438400" cy="2438400"/>
-          </a:xfrm>
-          <a:prstGeom prst="rect">
-            <a:avLst/>
-          </a:prstGeom>
-        </p:spPr>
-      </p:pic>
-      <p:sp>
-        <p:nvSpPr>
-          <p:cNvPr id="25" name="TextBox 24"/>
-          <p:cNvSpPr txBox="1"/>
-          <p:nvPr/>
-        </p:nvSpPr>
-        <p:spPr>
-          <a:xfrm>
-            <a:off x="732364" y="2053167"/>
-            <a:ext cx="1016000" cy="283924"/>
-          </a:xfrm>
-          <a:prstGeom prst="rect">
-            <a:avLst/>
-          </a:prstGeom>
-          <a:noFill/>
-        </p:spPr>
-        <p:txBody>
-          <a:bodyPr wrap="square" rtlCol="0">
-            <a:spAutoFit/>
-          </a:bodyPr>
-          <a:lstStyle/>
-          <a:p>
-            <a:pPr algn="ctr"/>
-            <a:r>
-              <a:rPr lang="en-US" sz="1245" dirty="0" err="1">
-                <a:solidFill>
-                  <a:schemeClr val="accent6">
-                    <a:lumMod val="50000"/>
-                  </a:schemeClr>
-                </a:solidFill>
-              </a:rPr>
-              <a:t>P</a:t>
-            </a:r>
-            <a:r>
-              <a:rPr lang="en-US" sz="1245" dirty="0" err="1" smtClean="0">
-                <a:solidFill>
-                  <a:schemeClr val="accent6">
-                    <a:lumMod val="50000"/>
-                  </a:schemeClr>
-                </a:solidFill>
-              </a:rPr>
-              <a:t>ucky</a:t>
-            </a:r>
-            <a:endParaRPr lang="en-US" sz="1245" dirty="0">
-              <a:solidFill>
-                <a:schemeClr val="accent6">
-                  <a:lumMod val="50000"/>
-                </a:schemeClr>
-              </a:solidFill>
-            </a:endParaRPr>
-          </a:p>
-        </p:txBody>
-      </p:sp>
-      <p:sp>
-        <p:nvSpPr>
-          <p:cNvPr id="27" name="TextBox 26"/>
-          <p:cNvSpPr txBox="1"/>
-          <p:nvPr/>
-        </p:nvSpPr>
-        <p:spPr>
-          <a:xfrm>
-            <a:off x="728133" y="3289300"/>
-            <a:ext cx="1016000" cy="283924"/>
-          </a:xfrm>
-          <a:prstGeom prst="rect">
-            <a:avLst/>
-          </a:prstGeom>
-          <a:noFill/>
-        </p:spPr>
-        <p:txBody>
-          <a:bodyPr wrap="square" rtlCol="0">
-            <a:spAutoFit/>
-          </a:bodyPr>
-          <a:lstStyle/>
-          <a:p>
-            <a:pPr algn="ctr"/>
-            <a:r>
-              <a:rPr lang="en-US" sz="1245" dirty="0">
-                <a:solidFill>
-                  <a:srgbClr val="385723"/>
-                </a:solidFill>
-              </a:rPr>
-              <a:t>M</a:t>
-            </a:r>
-            <a:r>
-              <a:rPr lang="en-US" sz="1245" dirty="0" smtClean="0">
-                <a:solidFill>
-                  <a:srgbClr val="385723"/>
-                </a:solidFill>
-              </a:rPr>
-              <a:t>ucky</a:t>
-            </a:r>
-            <a:endParaRPr lang="en-US" sz="1245" dirty="0">
-              <a:solidFill>
-                <a:srgbClr val="385723"/>
-              </a:solidFill>
-            </a:endParaRPr>
-          </a:p>
-        </p:txBody>
-      </p:sp>
-      <p:sp>
-        <p:nvSpPr>
-          <p:cNvPr id="28" name="TextBox 27"/>
-          <p:cNvSpPr txBox="1"/>
-          <p:nvPr/>
-        </p:nvSpPr>
-        <p:spPr>
-          <a:xfrm>
-            <a:off x="1854200" y="1231899"/>
-            <a:ext cx="2260601" cy="667106"/>
-          </a:xfrm>
-          <a:prstGeom prst="rect">
-            <a:avLst/>
-          </a:prstGeom>
-          <a:noFill/>
-        </p:spPr>
-        <p:txBody>
-          <a:bodyPr wrap="square" rtlCol="0">
-            <a:spAutoFit/>
-          </a:bodyPr>
-          <a:lstStyle/>
-          <a:p>
-            <a:r>
-              <a:rPr lang="en-US" sz="1245" dirty="0" smtClean="0">
-                <a:solidFill>
-                  <a:srgbClr val="385723"/>
-                </a:solidFill>
-              </a:rPr>
-              <a:t>Owner: Stan</a:t>
-            </a:r>
-          </a:p>
-          <a:p>
-            <a:r>
-              <a:rPr lang="en-US" sz="1245" dirty="0" smtClean="0">
-                <a:solidFill>
-                  <a:srgbClr val="385723"/>
-                </a:solidFill>
-              </a:rPr>
-              <a:t>Distance</a:t>
-            </a:r>
-            <a:r>
-              <a:rPr lang="en-US" sz="1245" dirty="0">
-                <a:solidFill>
-                  <a:srgbClr val="385723"/>
-                </a:solidFill>
-              </a:rPr>
-              <a:t>: 100 </a:t>
-            </a:r>
-            <a:r>
-              <a:rPr lang="en-US" sz="1245" dirty="0" err="1">
-                <a:solidFill>
-                  <a:srgbClr val="385723"/>
-                </a:solidFill>
-              </a:rPr>
-              <a:t>ft</a:t>
-            </a:r>
-            <a:endParaRPr lang="en-US" sz="1245" dirty="0">
-              <a:solidFill>
-                <a:srgbClr val="385723"/>
-              </a:solidFill>
-            </a:endParaRPr>
-          </a:p>
-          <a:p>
-            <a:r>
-              <a:rPr lang="en-US" sz="1245" dirty="0">
-                <a:solidFill>
-                  <a:srgbClr val="385723"/>
-                </a:solidFill>
-              </a:rPr>
-              <a:t>Playtime Left: 25 min</a:t>
-            </a:r>
-          </a:p>
-        </p:txBody>
-      </p:sp>
-      <p:sp>
-        <p:nvSpPr>
-          <p:cNvPr id="30" name="TextBox 29"/>
-          <p:cNvSpPr txBox="1"/>
-          <p:nvPr/>
-        </p:nvSpPr>
-        <p:spPr>
-          <a:xfrm>
-            <a:off x="1854200" y="2540004"/>
-            <a:ext cx="2260601" cy="667106"/>
-          </a:xfrm>
-          <a:prstGeom prst="rect">
-            <a:avLst/>
-          </a:prstGeom>
-          <a:noFill/>
-        </p:spPr>
-        <p:txBody>
-          <a:bodyPr wrap="square" rtlCol="0">
-            <a:spAutoFit/>
-          </a:bodyPr>
-          <a:lstStyle/>
-          <a:p>
-            <a:r>
-              <a:rPr lang="en-US" sz="1245" dirty="0">
-                <a:solidFill>
-                  <a:srgbClr val="385723"/>
-                </a:solidFill>
-              </a:rPr>
-              <a:t>Owner: </a:t>
-            </a:r>
-            <a:r>
-              <a:rPr lang="en-US" sz="1245" dirty="0" smtClean="0">
-                <a:solidFill>
-                  <a:srgbClr val="385723"/>
-                </a:solidFill>
-              </a:rPr>
-              <a:t>Chan</a:t>
-            </a:r>
-            <a:endParaRPr lang="en-US" sz="1245" dirty="0">
-              <a:solidFill>
-                <a:srgbClr val="385723"/>
-              </a:solidFill>
-            </a:endParaRPr>
-          </a:p>
-          <a:p>
-            <a:r>
-              <a:rPr lang="en-US" sz="1245" dirty="0">
-                <a:solidFill>
-                  <a:srgbClr val="385723"/>
-                </a:solidFill>
-              </a:rPr>
-              <a:t>Distance: 500 </a:t>
-            </a:r>
-            <a:r>
-              <a:rPr lang="en-US" sz="1245" dirty="0" err="1">
-                <a:solidFill>
-                  <a:srgbClr val="385723"/>
-                </a:solidFill>
-              </a:rPr>
-              <a:t>ft</a:t>
-            </a:r>
-            <a:endParaRPr lang="en-US" sz="1245" dirty="0">
-              <a:solidFill>
-                <a:srgbClr val="385723"/>
-              </a:solidFill>
-            </a:endParaRPr>
-          </a:p>
-          <a:p>
-            <a:r>
-              <a:rPr lang="en-US" sz="1245" dirty="0">
-                <a:solidFill>
-                  <a:srgbClr val="385723"/>
-                </a:solidFill>
-              </a:rPr>
-              <a:t>Playtime Left: 160 min</a:t>
-            </a:r>
-          </a:p>
-        </p:txBody>
-      </p:sp>
-      <p:sp>
-        <p:nvSpPr>
-          <p:cNvPr id="3" name="TextBox 2"/>
-          <p:cNvSpPr txBox="1"/>
-          <p:nvPr/>
-        </p:nvSpPr>
-        <p:spPr>
-          <a:xfrm>
-            <a:off x="660400" y="33867"/>
-            <a:ext cx="3691467" cy="584776"/>
-          </a:xfrm>
-          <a:prstGeom prst="rect">
-            <a:avLst/>
-          </a:prstGeom>
-          <a:noFill/>
-        </p:spPr>
-        <p:txBody>
-          <a:bodyPr wrap="square" rtlCol="0">
-            <a:spAutoFit/>
-          </a:bodyPr>
-          <a:lstStyle/>
-          <a:p>
-            <a:pPr algn="ctr"/>
-            <a:r>
-              <a:rPr lang="en-US" sz="3200" b="1" i="1" dirty="0">
-                <a:solidFill>
-                  <a:schemeClr val="bg1"/>
-                </a:solidFill>
-                <a:latin typeface="Georgia"/>
-                <a:cs typeface="Georgia"/>
-              </a:rPr>
-              <a:t>p</a:t>
-            </a:r>
-            <a:r>
-              <a:rPr lang="en-US" sz="3200" b="1" i="1" dirty="0" smtClean="0">
-                <a:solidFill>
-                  <a:schemeClr val="bg1"/>
-                </a:solidFill>
-                <a:latin typeface="Georgia"/>
-                <a:cs typeface="Georgia"/>
-              </a:rPr>
-              <a:t>et my pet</a:t>
-            </a:r>
-            <a:endParaRPr lang="en-US" sz="3200" b="1" i="1" dirty="0">
-              <a:solidFill>
-                <a:schemeClr val="bg1"/>
-              </a:solidFill>
-              <a:latin typeface="Georgia"/>
-              <a:cs typeface="Georgia"/>
-            </a:endParaRPr>
-          </a:p>
-        </p:txBody>
-      </p:sp>
-      <p:sp>
-        <p:nvSpPr>
-          <p:cNvPr id="31" name="Oval 30"/>
-          <p:cNvSpPr/>
-          <p:nvPr/>
-        </p:nvSpPr>
-        <p:spPr>
-          <a:xfrm>
-            <a:off x="4296152" y="152401"/>
-            <a:ext cx="502920" cy="502920"/>
-          </a:xfrm>
-          <a:prstGeom prst="ellipse">
-            <a:avLst/>
-          </a:prstGeom>
-          <a:solidFill>
-            <a:schemeClr val="accent6">
-              <a:lumMod val="50000"/>
-            </a:schemeClr>
-          </a:solidFill>
-          <a:ln w="57150" cmpd="sng">
-            <a:noFill/>
-          </a:ln>
-        </p:spPr>
-        <p:style>
-          <a:lnRef idx="1">
-            <a:schemeClr val="accent1"/>
-          </a:lnRef>
-          <a:fillRef idx="3">
-            <a:schemeClr val="accent1"/>
-          </a:fillRef>
-          <a:effectRef idx="2">
-            <a:schemeClr val="accent1"/>
-          </a:effectRef>
-          <a:fontRef idx="minor">
-            <a:schemeClr val="lt1"/>
-          </a:fontRef>
-        </p:style>
-        <p:txBody>
-          <a:bodyPr rtlCol="0" anchor="ctr"/>
-          <a:lstStyle/>
-          <a:p>
-            <a:pPr algn="ctr"/>
-            <a:endParaRPr lang="en-US" sz="1245"/>
-          </a:p>
-        </p:txBody>
-      </p:sp>
-      <p:sp>
-        <p:nvSpPr>
-          <p:cNvPr id="32" name="Oval 31"/>
-          <p:cNvSpPr/>
-          <p:nvPr/>
-        </p:nvSpPr>
-        <p:spPr>
-          <a:xfrm>
-            <a:off x="4431619" y="304801"/>
-            <a:ext cx="228600" cy="228600"/>
-          </a:xfrm>
-          <a:prstGeom prst="ellipse">
-            <a:avLst/>
-          </a:prstGeom>
-          <a:solidFill>
-            <a:schemeClr val="accent6">
-              <a:lumMod val="60000"/>
-              <a:lumOff val="40000"/>
-            </a:schemeClr>
-          </a:solidFill>
-          <a:ln w="57150" cmpd="sng">
-            <a:solidFill>
-              <a:schemeClr val="accent6">
-                <a:lumMod val="60000"/>
-                <a:lumOff val="40000"/>
-              </a:schemeClr>
-            </a:solidFill>
-          </a:ln>
-        </p:spPr>
-        <p:style>
-          <a:lnRef idx="1">
-            <a:schemeClr val="accent1"/>
-          </a:lnRef>
-          <a:fillRef idx="3">
-            <a:schemeClr val="accent1"/>
-          </a:fillRef>
-          <a:effectRef idx="2">
-            <a:schemeClr val="accent1"/>
-          </a:effectRef>
-          <a:fontRef idx="minor">
-            <a:schemeClr val="lt1"/>
-          </a:fontRef>
-        </p:style>
-        <p:txBody>
-          <a:bodyPr rtlCol="0" anchor="ctr"/>
-          <a:lstStyle/>
-          <a:p>
-            <a:pPr algn="ctr"/>
-            <a:endParaRPr lang="en-US" sz="1245"/>
-          </a:p>
-        </p:txBody>
-      </p:sp>
-      <p:sp>
-        <p:nvSpPr>
-          <p:cNvPr id="5" name="Rounded Rectangle 4"/>
-          <p:cNvSpPr/>
-          <p:nvPr/>
-        </p:nvSpPr>
-        <p:spPr>
-          <a:xfrm>
-            <a:off x="4470400" y="76200"/>
-            <a:ext cx="152400" cy="135467"/>
-          </a:xfrm>
-          <a:prstGeom prst="roundRect">
-            <a:avLst/>
-          </a:prstGeom>
-          <a:solidFill>
-            <a:schemeClr val="accent6">
-              <a:lumMod val="50000"/>
-            </a:schemeClr>
-          </a:solidFill>
-          <a:ln>
-            <a:noFill/>
-          </a:ln>
-        </p:spPr>
-        <p:style>
-          <a:lnRef idx="1">
-            <a:schemeClr val="accent1"/>
-          </a:lnRef>
-          <a:fillRef idx="3">
-            <a:schemeClr val="accent1"/>
-          </a:fillRef>
-          <a:effectRef idx="2">
-            <a:schemeClr val="accent1"/>
-          </a:effectRef>
-          <a:fontRef idx="minor">
-            <a:schemeClr val="lt1"/>
-          </a:fontRef>
-        </p:style>
-        <p:txBody>
-          <a:bodyPr rtlCol="0" anchor="ctr"/>
-          <a:lstStyle/>
-          <a:p>
-            <a:pPr algn="ctr"/>
-            <a:endParaRPr lang="en-US"/>
-          </a:p>
-        </p:txBody>
-      </p:sp>
-      <p:sp>
-        <p:nvSpPr>
-          <p:cNvPr id="33" name="Rounded Rectangle 32"/>
-          <p:cNvSpPr/>
-          <p:nvPr/>
-        </p:nvSpPr>
-        <p:spPr>
-          <a:xfrm rot="18900000">
-            <a:off x="4314699" y="169332"/>
-            <a:ext cx="152400" cy="135467"/>
-          </a:xfrm>
-          <a:prstGeom prst="roundRect">
-            <a:avLst/>
-          </a:prstGeom>
-          <a:solidFill>
-            <a:schemeClr val="accent6">
-              <a:lumMod val="50000"/>
-            </a:schemeClr>
-          </a:solidFill>
-          <a:ln>
-            <a:noFill/>
-          </a:ln>
-        </p:spPr>
-        <p:style>
-          <a:lnRef idx="1">
-            <a:schemeClr val="accent1"/>
-          </a:lnRef>
-          <a:fillRef idx="3">
-            <a:schemeClr val="accent1"/>
-          </a:fillRef>
-          <a:effectRef idx="2">
-            <a:schemeClr val="accent1"/>
-          </a:effectRef>
-          <a:fontRef idx="minor">
-            <a:schemeClr val="lt1"/>
-          </a:fontRef>
-        </p:style>
-        <p:txBody>
-          <a:bodyPr rtlCol="0" anchor="ctr"/>
-          <a:lstStyle/>
-          <a:p>
-            <a:pPr algn="ctr"/>
-            <a:endParaRPr lang="en-US" dirty="0"/>
-          </a:p>
-        </p:txBody>
-      </p:sp>
-      <p:sp>
-        <p:nvSpPr>
-          <p:cNvPr id="34" name="Rounded Rectangle 33"/>
-          <p:cNvSpPr/>
-          <p:nvPr/>
-        </p:nvSpPr>
-        <p:spPr>
-          <a:xfrm rot="14400000">
-            <a:off x="4258731" y="533403"/>
-            <a:ext cx="152400" cy="135467"/>
-          </a:xfrm>
-          <a:prstGeom prst="roundRect">
-            <a:avLst/>
-          </a:prstGeom>
-          <a:solidFill>
-            <a:schemeClr val="accent6">
-              <a:lumMod val="50000"/>
-            </a:schemeClr>
-          </a:solidFill>
-          <a:ln>
-            <a:noFill/>
-          </a:ln>
-        </p:spPr>
-        <p:style>
-          <a:lnRef idx="1">
-            <a:schemeClr val="accent1"/>
-          </a:lnRef>
-          <a:fillRef idx="3">
-            <a:schemeClr val="accent1"/>
-          </a:fillRef>
-          <a:effectRef idx="2">
-            <a:schemeClr val="accent1"/>
-          </a:effectRef>
-          <a:fontRef idx="minor">
-            <a:schemeClr val="lt1"/>
-          </a:fontRef>
-        </p:style>
-        <p:txBody>
-          <a:bodyPr rtlCol="0" anchor="ctr"/>
-          <a:lstStyle/>
-          <a:p>
-            <a:pPr algn="ctr"/>
-            <a:endParaRPr lang="en-US"/>
-          </a:p>
-        </p:txBody>
-      </p:sp>
-      <p:sp>
-        <p:nvSpPr>
-          <p:cNvPr id="35" name="Rounded Rectangle 34"/>
-          <p:cNvSpPr/>
-          <p:nvPr/>
-        </p:nvSpPr>
-        <p:spPr>
-          <a:xfrm rot="3600000">
-            <a:off x="4707466" y="177803"/>
-            <a:ext cx="152400" cy="135467"/>
-          </a:xfrm>
-          <a:prstGeom prst="roundRect">
-            <a:avLst/>
-          </a:prstGeom>
-          <a:solidFill>
-            <a:schemeClr val="accent6">
-              <a:lumMod val="50000"/>
-            </a:schemeClr>
-          </a:solidFill>
-          <a:ln>
-            <a:noFill/>
-          </a:ln>
-        </p:spPr>
-        <p:style>
-          <a:lnRef idx="1">
-            <a:schemeClr val="accent1"/>
-          </a:lnRef>
-          <a:fillRef idx="3">
-            <a:schemeClr val="accent1"/>
-          </a:fillRef>
-          <a:effectRef idx="2">
-            <a:schemeClr val="accent1"/>
-          </a:effectRef>
-          <a:fontRef idx="minor">
-            <a:schemeClr val="lt1"/>
-          </a:fontRef>
-        </p:style>
-        <p:txBody>
-          <a:bodyPr rtlCol="0" anchor="ctr"/>
-          <a:lstStyle/>
-          <a:p>
-            <a:pPr algn="ctr"/>
-            <a:endParaRPr lang="en-US"/>
-          </a:p>
-        </p:txBody>
-      </p:sp>
-      <p:sp>
-        <p:nvSpPr>
-          <p:cNvPr id="36" name="Rounded Rectangle 35"/>
-          <p:cNvSpPr/>
-          <p:nvPr/>
-        </p:nvSpPr>
-        <p:spPr>
-          <a:xfrm rot="7200000">
-            <a:off x="4707466" y="457199"/>
-            <a:ext cx="152400" cy="135467"/>
-          </a:xfrm>
-          <a:prstGeom prst="roundRect">
-            <a:avLst/>
-          </a:prstGeom>
-          <a:solidFill>
-            <a:schemeClr val="accent6">
-              <a:lumMod val="50000"/>
-            </a:schemeClr>
-          </a:solidFill>
-          <a:ln>
-            <a:noFill/>
-          </a:ln>
-        </p:spPr>
-        <p:style>
-          <a:lnRef idx="1">
-            <a:schemeClr val="accent1"/>
-          </a:lnRef>
-          <a:fillRef idx="3">
-            <a:schemeClr val="accent1"/>
-          </a:fillRef>
-          <a:effectRef idx="2">
-            <a:schemeClr val="accent1"/>
-          </a:effectRef>
-          <a:fontRef idx="minor">
-            <a:schemeClr val="lt1"/>
-          </a:fontRef>
-        </p:style>
-        <p:txBody>
-          <a:bodyPr rtlCol="0" anchor="ctr"/>
-          <a:lstStyle/>
-          <a:p>
-            <a:pPr algn="ctr"/>
-            <a:endParaRPr lang="en-US"/>
-          </a:p>
-        </p:txBody>
-      </p:sp>
-      <p:sp>
-        <p:nvSpPr>
-          <p:cNvPr id="37" name="Rounded Rectangle 36"/>
-          <p:cNvSpPr/>
-          <p:nvPr/>
-        </p:nvSpPr>
-        <p:spPr>
-          <a:xfrm>
-            <a:off x="4470400" y="584200"/>
-            <a:ext cx="152400" cy="135467"/>
-          </a:xfrm>
-          <a:prstGeom prst="roundRect">
-            <a:avLst/>
-          </a:prstGeom>
-          <a:solidFill>
-            <a:schemeClr val="accent6">
-              <a:lumMod val="50000"/>
-            </a:schemeClr>
-          </a:solidFill>
-          <a:ln>
-            <a:noFill/>
-          </a:ln>
-        </p:spPr>
-        <p:style>
-          <a:lnRef idx="1">
-            <a:schemeClr val="accent1"/>
-          </a:lnRef>
-          <a:fillRef idx="3">
-            <a:schemeClr val="accent1"/>
-          </a:fillRef>
-          <a:effectRef idx="2">
-            <a:schemeClr val="accent1"/>
-          </a:effectRef>
-          <a:fontRef idx="minor">
-            <a:schemeClr val="lt1"/>
-          </a:fontRef>
-        </p:style>
-        <p:txBody>
-          <a:bodyPr rtlCol="0" anchor="ctr"/>
-          <a:lstStyle/>
-          <a:p>
-            <a:pPr algn="ctr"/>
-            <a:endParaRPr lang="en-US"/>
-          </a:p>
-        </p:txBody>
-      </p:sp>
-      <p:sp>
-        <p:nvSpPr>
-          <p:cNvPr id="39" name="Rounded Rectangle 38"/>
-          <p:cNvSpPr/>
-          <p:nvPr/>
-        </p:nvSpPr>
-        <p:spPr>
-          <a:xfrm rot="16200000">
-            <a:off x="4230035" y="338666"/>
-            <a:ext cx="152400" cy="135467"/>
-          </a:xfrm>
-          <a:prstGeom prst="roundRect">
-            <a:avLst/>
-          </a:prstGeom>
-          <a:solidFill>
-            <a:schemeClr val="accent6">
-              <a:lumMod val="50000"/>
-            </a:schemeClr>
-          </a:solidFill>
-          <a:ln>
-            <a:noFill/>
-          </a:ln>
-        </p:spPr>
-        <p:style>
-          <a:lnRef idx="1">
-            <a:schemeClr val="accent1"/>
-          </a:lnRef>
-          <a:fillRef idx="3">
-            <a:schemeClr val="accent1"/>
-          </a:fillRef>
-          <a:effectRef idx="2">
-            <a:schemeClr val="accent1"/>
-          </a:effectRef>
-          <a:fontRef idx="minor">
-            <a:schemeClr val="lt1"/>
-          </a:fontRef>
-        </p:style>
-        <p:txBody>
-          <a:bodyPr rtlCol="0" anchor="ctr"/>
-          <a:lstStyle/>
-          <a:p>
-            <a:pPr algn="ctr"/>
-            <a:endParaRPr lang="en-US" dirty="0"/>
+              <a:t>No</a:t>
+            </a:r>
           </a:p>
         </p:txBody>
       </p:sp>
     </p:spTree>
     <p:extLst>
       <p:ext uri="{BB962C8B-B14F-4D97-AF65-F5344CB8AC3E}">
-        <p14:creationId xmlns:p14="http://schemas.microsoft.com/office/powerpoint/2010/main" val="1101328026"/>
+        <p14:creationId xmlns:p14="http://schemas.microsoft.com/office/powerpoint/2010/main" val="3856691337"/>
       </p:ext>
     </p:extLst>
   </p:cSld>
@@ -7976,51 +6930,13 @@
       </p:grpSpPr>
       <p:sp>
         <p:nvSpPr>
-          <p:cNvPr id="2" name="Title 1"/>
-          <p:cNvSpPr>
-            <a:spLocks noGrp="1"/>
-          </p:cNvSpPr>
-          <p:nvPr>
-            <p:ph type="title"/>
-          </p:nvPr>
-        </p:nvSpPr>
-        <p:spPr/>
-        <p:txBody>
-          <a:bodyPr/>
-          <a:lstStyle/>
-          <a:p>
-            <a:endParaRPr lang="en-US"/>
-          </a:p>
-        </p:txBody>
-      </p:sp>
-      <p:sp>
-        <p:nvSpPr>
-          <p:cNvPr id="3" name="Content Placeholder 2"/>
-          <p:cNvSpPr>
-            <a:spLocks noGrp="1"/>
-          </p:cNvSpPr>
-          <p:nvPr>
-            <p:ph idx="1"/>
-          </p:nvPr>
-        </p:nvSpPr>
-        <p:spPr/>
-        <p:txBody>
-          <a:bodyPr/>
-          <a:lstStyle/>
-          <a:p>
-            <a:endParaRPr lang="en-US"/>
-          </a:p>
-        </p:txBody>
-      </p:sp>
-      <p:sp>
-        <p:nvSpPr>
-          <p:cNvPr id="4" name="Rectangle 3"/>
+          <p:cNvPr id="38" name="Rectangle 37"/>
           <p:cNvSpPr/>
           <p:nvPr/>
         </p:nvSpPr>
         <p:spPr>
           <a:xfrm>
-            <a:off x="-7664" y="0"/>
+            <a:off x="559" y="0"/>
             <a:ext cx="5029200" cy="7772400"/>
           </a:xfrm>
           <a:prstGeom prst="rect">
@@ -8033,7 +6949,12 @@
             </a:schemeClr>
           </a:solidFill>
           <a:ln w="28575">
-            <a:noFill/>
+            <a:solidFill>
+              <a:schemeClr val="accent6">
+                <a:lumMod val="60000"/>
+                <a:lumOff val="40000"/>
+              </a:schemeClr>
+            </a:solidFill>
           </a:ln>
         </p:spPr>
         <p:style>
@@ -8067,6 +6988,1652 @@
       </p:sp>
       <p:sp>
         <p:nvSpPr>
+          <p:cNvPr id="21" name="Rounded Rectangle 20"/>
+          <p:cNvSpPr/>
+          <p:nvPr/>
+        </p:nvSpPr>
+        <p:spPr>
+          <a:xfrm>
+            <a:off x="308954" y="897466"/>
+            <a:ext cx="4301019" cy="5955824"/>
+          </a:xfrm>
+          <a:prstGeom prst="roundRect">
+            <a:avLst/>
+          </a:prstGeom>
+          <a:solidFill>
+            <a:schemeClr val="bg1"/>
+          </a:solidFill>
+          <a:ln>
+            <a:noFill/>
+          </a:ln>
+        </p:spPr>
+        <p:style>
+          <a:lnRef idx="1">
+            <a:schemeClr val="accent1"/>
+          </a:lnRef>
+          <a:fillRef idx="3">
+            <a:schemeClr val="accent1"/>
+          </a:fillRef>
+          <a:effectRef idx="2">
+            <a:schemeClr val="accent1"/>
+          </a:effectRef>
+          <a:fontRef idx="minor">
+            <a:schemeClr val="lt1"/>
+          </a:fontRef>
+        </p:style>
+        <p:txBody>
+          <a:bodyPr rtlCol="0" anchor="ctr"/>
+          <a:lstStyle/>
+          <a:p>
+            <a:pPr algn="ctr"/>
+            <a:endParaRPr lang="en-US" sz="1245"/>
+          </a:p>
+        </p:txBody>
+      </p:sp>
+      <p:sp>
+        <p:nvSpPr>
+          <p:cNvPr id="4" name="Rectangle 3"/>
+          <p:cNvSpPr/>
+          <p:nvPr/>
+        </p:nvSpPr>
+        <p:spPr>
+          <a:xfrm>
+            <a:off x="0" y="6947673"/>
+            <a:ext cx="2508038" cy="821733"/>
+          </a:xfrm>
+          <a:prstGeom prst="rect">
+            <a:avLst/>
+          </a:prstGeom>
+          <a:solidFill>
+            <a:schemeClr val="accent6">
+              <a:lumMod val="60000"/>
+              <a:lumOff val="40000"/>
+            </a:schemeClr>
+          </a:solidFill>
+          <a:ln>
+            <a:noFill/>
+          </a:ln>
+        </p:spPr>
+        <p:style>
+          <a:lnRef idx="1">
+            <a:schemeClr val="accent1"/>
+          </a:lnRef>
+          <a:fillRef idx="3">
+            <a:schemeClr val="accent1"/>
+          </a:fillRef>
+          <a:effectRef idx="2">
+            <a:schemeClr val="accent1"/>
+          </a:effectRef>
+          <a:fontRef idx="minor">
+            <a:schemeClr val="lt1"/>
+          </a:fontRef>
+        </p:style>
+        <p:txBody>
+          <a:bodyPr rot="0" spcFirstLastPara="0" vertOverflow="overflow" horzOverflow="overflow" vert="horz" wrap="square" lIns="91440" tIns="45721" rIns="91440" bIns="45721" numCol="1" spcCol="0" rtlCol="0" fromWordArt="0" anchor="ctr" anchorCtr="0" forceAA="0" compatLnSpc="1">
+            <a:prstTxWarp prst="textNoShape">
+              <a:avLst/>
+            </a:prstTxWarp>
+            <a:noAutofit/>
+          </a:bodyPr>
+          <a:lstStyle/>
+          <a:p>
+            <a:pPr algn="ctr"/>
+            <a:endParaRPr lang="en-US" sz="1245"/>
+          </a:p>
+        </p:txBody>
+      </p:sp>
+      <p:sp>
+        <p:nvSpPr>
+          <p:cNvPr id="18" name="TextBox 17"/>
+          <p:cNvSpPr txBox="1"/>
+          <p:nvPr/>
+        </p:nvSpPr>
+        <p:spPr>
+          <a:xfrm>
+            <a:off x="2987" y="7185448"/>
+            <a:ext cx="2515724" cy="283924"/>
+          </a:xfrm>
+          <a:prstGeom prst="rect">
+            <a:avLst/>
+          </a:prstGeom>
+          <a:noFill/>
+          <a:ln>
+            <a:noFill/>
+          </a:ln>
+        </p:spPr>
+        <p:txBody>
+          <a:bodyPr wrap="square" rtlCol="0">
+            <a:spAutoFit/>
+          </a:bodyPr>
+          <a:lstStyle/>
+          <a:p>
+            <a:pPr algn="ctr"/>
+            <a:r>
+              <a:rPr lang="en-US" sz="1245" dirty="0">
+                <a:solidFill>
+                  <a:schemeClr val="accent6">
+                    <a:lumMod val="50000"/>
+                  </a:schemeClr>
+                </a:solidFill>
+              </a:rPr>
+              <a:t>Find dogs in your area</a:t>
+            </a:r>
+          </a:p>
+        </p:txBody>
+      </p:sp>
+      <p:sp>
+        <p:nvSpPr>
+          <p:cNvPr id="20" name="Rectangle 19"/>
+          <p:cNvSpPr/>
+          <p:nvPr/>
+        </p:nvSpPr>
+        <p:spPr>
+          <a:xfrm>
+            <a:off x="2521697" y="6950667"/>
+            <a:ext cx="2508038" cy="821733"/>
+          </a:xfrm>
+          <a:prstGeom prst="rect">
+            <a:avLst/>
+          </a:prstGeom>
+          <a:solidFill>
+            <a:schemeClr val="bg1">
+              <a:lumMod val="95000"/>
+            </a:schemeClr>
+          </a:solidFill>
+          <a:ln>
+            <a:noFill/>
+          </a:ln>
+        </p:spPr>
+        <p:style>
+          <a:lnRef idx="1">
+            <a:schemeClr val="accent1"/>
+          </a:lnRef>
+          <a:fillRef idx="3">
+            <a:schemeClr val="accent1"/>
+          </a:fillRef>
+          <a:effectRef idx="2">
+            <a:schemeClr val="accent1"/>
+          </a:effectRef>
+          <a:fontRef idx="minor">
+            <a:schemeClr val="lt1"/>
+          </a:fontRef>
+        </p:style>
+        <p:txBody>
+          <a:bodyPr rot="0" spcFirstLastPara="0" vertOverflow="overflow" horzOverflow="overflow" vert="horz" wrap="square" lIns="91440" tIns="45721" rIns="91440" bIns="45721" numCol="1" spcCol="0" rtlCol="0" fromWordArt="0" anchor="ctr" anchorCtr="0" forceAA="0" compatLnSpc="1">
+            <a:prstTxWarp prst="textNoShape">
+              <a:avLst/>
+            </a:prstTxWarp>
+            <a:noAutofit/>
+          </a:bodyPr>
+          <a:lstStyle/>
+          <a:p>
+            <a:pPr algn="ctr"/>
+            <a:endParaRPr lang="en-US" sz="1245"/>
+          </a:p>
+        </p:txBody>
+      </p:sp>
+      <p:sp>
+        <p:nvSpPr>
+          <p:cNvPr id="19" name="TextBox 18"/>
+          <p:cNvSpPr txBox="1"/>
+          <p:nvPr/>
+        </p:nvSpPr>
+        <p:spPr>
+          <a:xfrm>
+            <a:off x="2511025" y="7185448"/>
+            <a:ext cx="2515724" cy="283924"/>
+          </a:xfrm>
+          <a:prstGeom prst="rect">
+            <a:avLst/>
+          </a:prstGeom>
+          <a:noFill/>
+          <a:ln>
+            <a:noFill/>
+          </a:ln>
+        </p:spPr>
+        <p:txBody>
+          <a:bodyPr wrap="square" rtlCol="0">
+            <a:spAutoFit/>
+          </a:bodyPr>
+          <a:lstStyle/>
+          <a:p>
+            <a:pPr algn="ctr"/>
+            <a:r>
+              <a:rPr lang="en-US" sz="1245" dirty="0">
+                <a:solidFill>
+                  <a:schemeClr val="accent6">
+                    <a:lumMod val="50000"/>
+                  </a:schemeClr>
+                </a:solidFill>
+              </a:rPr>
+              <a:t>Start playtime</a:t>
+            </a:r>
+          </a:p>
+        </p:txBody>
+      </p:sp>
+      <p:sp>
+        <p:nvSpPr>
+          <p:cNvPr id="29" name="Rounded Rectangle 28"/>
+          <p:cNvSpPr/>
+          <p:nvPr/>
+        </p:nvSpPr>
+        <p:spPr>
+          <a:xfrm>
+            <a:off x="4174068" y="1270001"/>
+            <a:ext cx="279399" cy="5215468"/>
+          </a:xfrm>
+          <a:prstGeom prst="roundRect">
+            <a:avLst/>
+          </a:prstGeom>
+          <a:solidFill>
+            <a:schemeClr val="accent6">
+              <a:lumMod val="40000"/>
+              <a:lumOff val="60000"/>
+            </a:schemeClr>
+          </a:solidFill>
+          <a:ln>
+            <a:noFill/>
+          </a:ln>
+        </p:spPr>
+        <p:style>
+          <a:lnRef idx="1">
+            <a:schemeClr val="accent1"/>
+          </a:lnRef>
+          <a:fillRef idx="3">
+            <a:schemeClr val="accent1"/>
+          </a:fillRef>
+          <a:effectRef idx="2">
+            <a:schemeClr val="accent1"/>
+          </a:effectRef>
+          <a:fontRef idx="minor">
+            <a:schemeClr val="lt1"/>
+          </a:fontRef>
+        </p:style>
+        <p:txBody>
+          <a:bodyPr rot="0" spcFirstLastPara="0" vertOverflow="overflow" horzOverflow="overflow" vert="horz" wrap="square" lIns="91440" tIns="45721" rIns="91440" bIns="45721" numCol="1" spcCol="0" rtlCol="0" fromWordArt="0" anchor="ctr" anchorCtr="0" forceAA="0" compatLnSpc="1">
+            <a:prstTxWarp prst="textNoShape">
+              <a:avLst/>
+            </a:prstTxWarp>
+            <a:noAutofit/>
+          </a:bodyPr>
+          <a:lstStyle/>
+          <a:p>
+            <a:pPr algn="ctr"/>
+            <a:endParaRPr lang="en-US" sz="1245"/>
+          </a:p>
+        </p:txBody>
+      </p:sp>
+      <p:sp>
+        <p:nvSpPr>
+          <p:cNvPr id="9" name="Rounded Rectangle 8"/>
+          <p:cNvSpPr/>
+          <p:nvPr/>
+        </p:nvSpPr>
+        <p:spPr>
+          <a:xfrm>
+            <a:off x="4237566" y="4246035"/>
+            <a:ext cx="152400" cy="1206501"/>
+          </a:xfrm>
+          <a:prstGeom prst="roundRect">
+            <a:avLst/>
+          </a:prstGeom>
+          <a:solidFill>
+            <a:schemeClr val="accent6">
+              <a:lumMod val="60000"/>
+              <a:lumOff val="40000"/>
+            </a:schemeClr>
+          </a:solidFill>
+          <a:ln>
+            <a:noFill/>
+          </a:ln>
+        </p:spPr>
+        <p:style>
+          <a:lnRef idx="1">
+            <a:schemeClr val="accent1"/>
+          </a:lnRef>
+          <a:fillRef idx="3">
+            <a:schemeClr val="accent1"/>
+          </a:fillRef>
+          <a:effectRef idx="2">
+            <a:schemeClr val="accent1"/>
+          </a:effectRef>
+          <a:fontRef idx="minor">
+            <a:schemeClr val="lt1"/>
+          </a:fontRef>
+        </p:style>
+        <p:txBody>
+          <a:bodyPr rot="0" spcFirstLastPara="0" vertOverflow="overflow" horzOverflow="overflow" vert="horz" wrap="square" lIns="91440" tIns="45721" rIns="91440" bIns="45721" numCol="1" spcCol="0" rtlCol="0" fromWordArt="0" anchor="ctr" anchorCtr="0" forceAA="0" compatLnSpc="1">
+            <a:prstTxWarp prst="textNoShape">
+              <a:avLst/>
+            </a:prstTxWarp>
+            <a:noAutofit/>
+          </a:bodyPr>
+          <a:lstStyle/>
+          <a:p>
+            <a:pPr algn="ctr"/>
+            <a:endParaRPr lang="en-US" sz="1245"/>
+          </a:p>
+        </p:txBody>
+      </p:sp>
+      <p:pic>
+        <p:nvPicPr>
+          <p:cNvPr id="10" name="Picture 9"/>
+          <p:cNvPicPr>
+            <a:picLocks noChangeAspect="1"/>
+          </p:cNvPicPr>
+          <p:nvPr/>
+        </p:nvPicPr>
+        <p:blipFill>
+          <a:blip r:embed="rId3"/>
+          <a:stretch>
+            <a:fillRect/>
+          </a:stretch>
+        </p:blipFill>
+        <p:spPr>
+          <a:xfrm>
+            <a:off x="704065" y="3586616"/>
+            <a:ext cx="1055668" cy="838201"/>
+          </a:xfrm>
+          <a:prstGeom prst="rect">
+            <a:avLst/>
+          </a:prstGeom>
+        </p:spPr>
+      </p:pic>
+      <p:pic>
+        <p:nvPicPr>
+          <p:cNvPr id="13" name="Picture 12"/>
+          <p:cNvPicPr>
+            <a:picLocks noChangeAspect="1"/>
+          </p:cNvPicPr>
+          <p:nvPr/>
+        </p:nvPicPr>
+        <p:blipFill>
+          <a:blip r:embed="rId4"/>
+          <a:stretch>
+            <a:fillRect/>
+          </a:stretch>
+        </p:blipFill>
+        <p:spPr>
+          <a:xfrm>
+            <a:off x="0" y="4080933"/>
+            <a:ext cx="2438400" cy="2438400"/>
+          </a:xfrm>
+          <a:prstGeom prst="rect">
+            <a:avLst/>
+          </a:prstGeom>
+        </p:spPr>
+      </p:pic>
+      <p:pic>
+        <p:nvPicPr>
+          <p:cNvPr id="16" name="Picture 15"/>
+          <p:cNvPicPr>
+            <a:picLocks noChangeAspect="1"/>
+          </p:cNvPicPr>
+          <p:nvPr/>
+        </p:nvPicPr>
+        <p:blipFill rotWithShape="1">
+          <a:blip r:embed="rId5"/>
+          <a:srcRect t="1" b="56170"/>
+          <a:stretch/>
+        </p:blipFill>
+        <p:spPr>
+          <a:xfrm>
+            <a:off x="711200" y="6123977"/>
+            <a:ext cx="960449" cy="356616"/>
+          </a:xfrm>
+          <a:prstGeom prst="rect">
+            <a:avLst/>
+          </a:prstGeom>
+          <a:scene3d>
+            <a:camera prst="orthographicFront">
+              <a:rot lat="0" lon="10800000" rev="0"/>
+            </a:camera>
+            <a:lightRig rig="threePt" dir="t"/>
+          </a:scene3d>
+        </p:spPr>
+      </p:pic>
+      <p:sp>
+        <p:nvSpPr>
+          <p:cNvPr id="17" name="TextBox 16"/>
+          <p:cNvSpPr txBox="1"/>
+          <p:nvPr/>
+        </p:nvSpPr>
+        <p:spPr>
+          <a:xfrm>
+            <a:off x="732364" y="4508500"/>
+            <a:ext cx="1016000" cy="283924"/>
+          </a:xfrm>
+          <a:prstGeom prst="rect">
+            <a:avLst/>
+          </a:prstGeom>
+          <a:noFill/>
+        </p:spPr>
+        <p:txBody>
+          <a:bodyPr wrap="square" rtlCol="0">
+            <a:spAutoFit/>
+          </a:bodyPr>
+          <a:lstStyle/>
+          <a:p>
+            <a:pPr algn="ctr"/>
+            <a:r>
+              <a:rPr lang="en-US" sz="1245" dirty="0">
+                <a:solidFill>
+                  <a:schemeClr val="accent6">
+                    <a:lumMod val="50000"/>
+                  </a:schemeClr>
+                </a:solidFill>
+              </a:rPr>
+              <a:t>Lucky</a:t>
+            </a:r>
+          </a:p>
+        </p:txBody>
+      </p:sp>
+      <p:sp>
+        <p:nvSpPr>
+          <p:cNvPr id="42" name="TextBox 41"/>
+          <p:cNvSpPr txBox="1"/>
+          <p:nvPr/>
+        </p:nvSpPr>
+        <p:spPr>
+          <a:xfrm>
+            <a:off x="728133" y="5744633"/>
+            <a:ext cx="1016000" cy="283924"/>
+          </a:xfrm>
+          <a:prstGeom prst="rect">
+            <a:avLst/>
+          </a:prstGeom>
+          <a:noFill/>
+        </p:spPr>
+        <p:txBody>
+          <a:bodyPr wrap="square" rtlCol="0">
+            <a:spAutoFit/>
+          </a:bodyPr>
+          <a:lstStyle/>
+          <a:p>
+            <a:pPr algn="ctr"/>
+            <a:r>
+              <a:rPr lang="en-US" sz="1245" dirty="0">
+                <a:solidFill>
+                  <a:srgbClr val="385723"/>
+                </a:solidFill>
+              </a:rPr>
+              <a:t>Ducky</a:t>
+            </a:r>
+          </a:p>
+        </p:txBody>
+      </p:sp>
+      <p:sp>
+        <p:nvSpPr>
+          <p:cNvPr id="26" name="TextBox 25"/>
+          <p:cNvSpPr txBox="1"/>
+          <p:nvPr/>
+        </p:nvSpPr>
+        <p:spPr>
+          <a:xfrm>
+            <a:off x="1854200" y="3687232"/>
+            <a:ext cx="2260601" cy="667106"/>
+          </a:xfrm>
+          <a:prstGeom prst="rect">
+            <a:avLst/>
+          </a:prstGeom>
+          <a:noFill/>
+        </p:spPr>
+        <p:txBody>
+          <a:bodyPr wrap="square" rtlCol="0">
+            <a:spAutoFit/>
+          </a:bodyPr>
+          <a:lstStyle/>
+          <a:p>
+            <a:r>
+              <a:rPr lang="en-US" sz="1245" dirty="0">
+                <a:solidFill>
+                  <a:srgbClr val="385723"/>
+                </a:solidFill>
+              </a:rPr>
+              <a:t>Owner: Nan</a:t>
+            </a:r>
+          </a:p>
+          <a:p>
+            <a:r>
+              <a:rPr lang="en-US" sz="1245" dirty="0">
+                <a:solidFill>
+                  <a:srgbClr val="385723"/>
+                </a:solidFill>
+              </a:rPr>
+              <a:t>Distance: 100 </a:t>
+            </a:r>
+            <a:r>
+              <a:rPr lang="en-US" sz="1245" dirty="0" err="1">
+                <a:solidFill>
+                  <a:srgbClr val="385723"/>
+                </a:solidFill>
+              </a:rPr>
+              <a:t>ft</a:t>
+            </a:r>
+            <a:endParaRPr lang="en-US" sz="1245" dirty="0">
+              <a:solidFill>
+                <a:srgbClr val="385723"/>
+              </a:solidFill>
+            </a:endParaRPr>
+          </a:p>
+          <a:p>
+            <a:r>
+              <a:rPr lang="en-US" sz="1245" dirty="0">
+                <a:solidFill>
+                  <a:srgbClr val="385723"/>
+                </a:solidFill>
+              </a:rPr>
+              <a:t>Playtime Left: 25 min</a:t>
+            </a:r>
+          </a:p>
+        </p:txBody>
+      </p:sp>
+      <p:sp>
+        <p:nvSpPr>
+          <p:cNvPr id="43" name="TextBox 42"/>
+          <p:cNvSpPr txBox="1"/>
+          <p:nvPr/>
+        </p:nvSpPr>
+        <p:spPr>
+          <a:xfrm>
+            <a:off x="1854200" y="4995337"/>
+            <a:ext cx="2260601" cy="667106"/>
+          </a:xfrm>
+          <a:prstGeom prst="rect">
+            <a:avLst/>
+          </a:prstGeom>
+          <a:noFill/>
+        </p:spPr>
+        <p:txBody>
+          <a:bodyPr wrap="square" rtlCol="0">
+            <a:spAutoFit/>
+          </a:bodyPr>
+          <a:lstStyle/>
+          <a:p>
+            <a:r>
+              <a:rPr lang="en-US" sz="1245" dirty="0">
+                <a:solidFill>
+                  <a:srgbClr val="385723"/>
+                </a:solidFill>
+              </a:rPr>
+              <a:t>Owner: Dan</a:t>
+            </a:r>
+          </a:p>
+          <a:p>
+            <a:r>
+              <a:rPr lang="en-US" sz="1245" dirty="0">
+                <a:solidFill>
+                  <a:srgbClr val="385723"/>
+                </a:solidFill>
+              </a:rPr>
+              <a:t>Distance: 500 </a:t>
+            </a:r>
+            <a:r>
+              <a:rPr lang="en-US" sz="1245" dirty="0" err="1">
+                <a:solidFill>
+                  <a:srgbClr val="385723"/>
+                </a:solidFill>
+              </a:rPr>
+              <a:t>ft</a:t>
+            </a:r>
+            <a:endParaRPr lang="en-US" sz="1245" dirty="0">
+              <a:solidFill>
+                <a:srgbClr val="385723"/>
+              </a:solidFill>
+            </a:endParaRPr>
+          </a:p>
+          <a:p>
+            <a:r>
+              <a:rPr lang="en-US" sz="1245" dirty="0">
+                <a:solidFill>
+                  <a:srgbClr val="385723"/>
+                </a:solidFill>
+              </a:rPr>
+              <a:t>Playtime Left: 160 min</a:t>
+            </a:r>
+          </a:p>
+        </p:txBody>
+      </p:sp>
+      <p:sp>
+        <p:nvSpPr>
+          <p:cNvPr id="44" name="TextBox 43"/>
+          <p:cNvSpPr txBox="1"/>
+          <p:nvPr/>
+        </p:nvSpPr>
+        <p:spPr>
+          <a:xfrm>
+            <a:off x="1854200" y="6197605"/>
+            <a:ext cx="2260601" cy="283924"/>
+          </a:xfrm>
+          <a:prstGeom prst="rect">
+            <a:avLst/>
+          </a:prstGeom>
+          <a:noFill/>
+        </p:spPr>
+        <p:txBody>
+          <a:bodyPr wrap="square" rtlCol="0">
+            <a:spAutoFit/>
+          </a:bodyPr>
+          <a:lstStyle/>
+          <a:p>
+            <a:r>
+              <a:rPr lang="en-US" sz="1245" dirty="0">
+                <a:solidFill>
+                  <a:srgbClr val="385723"/>
+                </a:solidFill>
+              </a:rPr>
+              <a:t>Owner: </a:t>
+            </a:r>
+            <a:r>
+              <a:rPr lang="en-US" sz="1245" dirty="0" smtClean="0">
+                <a:solidFill>
+                  <a:srgbClr val="385723"/>
+                </a:solidFill>
+              </a:rPr>
+              <a:t>Fran</a:t>
+            </a:r>
+            <a:endParaRPr lang="en-US" sz="1245" dirty="0">
+              <a:solidFill>
+                <a:srgbClr val="385723"/>
+              </a:solidFill>
+            </a:endParaRPr>
+          </a:p>
+        </p:txBody>
+      </p:sp>
+      <p:sp>
+        <p:nvSpPr>
+          <p:cNvPr id="22" name="Rectangle 21"/>
+          <p:cNvSpPr/>
+          <p:nvPr/>
+        </p:nvSpPr>
+        <p:spPr>
+          <a:xfrm>
+            <a:off x="0" y="0"/>
+            <a:ext cx="5029200" cy="821733"/>
+          </a:xfrm>
+          <a:prstGeom prst="rect">
+            <a:avLst/>
+          </a:prstGeom>
+          <a:solidFill>
+            <a:schemeClr val="accent6">
+              <a:lumMod val="60000"/>
+              <a:lumOff val="40000"/>
+            </a:schemeClr>
+          </a:solidFill>
+          <a:ln>
+            <a:noFill/>
+          </a:ln>
+        </p:spPr>
+        <p:style>
+          <a:lnRef idx="1">
+            <a:schemeClr val="accent1"/>
+          </a:lnRef>
+          <a:fillRef idx="3">
+            <a:schemeClr val="accent1"/>
+          </a:fillRef>
+          <a:effectRef idx="2">
+            <a:schemeClr val="accent1"/>
+          </a:effectRef>
+          <a:fontRef idx="minor">
+            <a:schemeClr val="lt1"/>
+          </a:fontRef>
+        </p:style>
+        <p:txBody>
+          <a:bodyPr rot="0" spcFirstLastPara="0" vertOverflow="overflow" horzOverflow="overflow" vert="horz" wrap="square" lIns="91440" tIns="45721" rIns="91440" bIns="45721" numCol="1" spcCol="0" rtlCol="0" fromWordArt="0" anchor="ctr" anchorCtr="0" forceAA="0" compatLnSpc="1">
+            <a:prstTxWarp prst="textNoShape">
+              <a:avLst/>
+            </a:prstTxWarp>
+            <a:noAutofit/>
+          </a:bodyPr>
+          <a:lstStyle/>
+          <a:p>
+            <a:pPr algn="ctr"/>
+            <a:endParaRPr lang="en-US" sz="1245"/>
+          </a:p>
+        </p:txBody>
+      </p:sp>
+      <p:pic>
+        <p:nvPicPr>
+          <p:cNvPr id="23" name="Picture 22"/>
+          <p:cNvPicPr>
+            <a:picLocks noChangeAspect="1"/>
+          </p:cNvPicPr>
+          <p:nvPr/>
+        </p:nvPicPr>
+        <p:blipFill rotWithShape="1">
+          <a:blip r:embed="rId3"/>
+          <a:srcRect t="21919" b="-21561"/>
+          <a:stretch/>
+        </p:blipFill>
+        <p:spPr>
+          <a:xfrm>
+            <a:off x="704065" y="1266751"/>
+            <a:ext cx="1055668" cy="838201"/>
+          </a:xfrm>
+          <a:prstGeom prst="rect">
+            <a:avLst/>
+          </a:prstGeom>
+        </p:spPr>
+      </p:pic>
+      <p:pic>
+        <p:nvPicPr>
+          <p:cNvPr id="24" name="Picture 23"/>
+          <p:cNvPicPr>
+            <a:picLocks noChangeAspect="1"/>
+          </p:cNvPicPr>
+          <p:nvPr/>
+        </p:nvPicPr>
+        <p:blipFill>
+          <a:blip r:embed="rId4"/>
+          <a:stretch>
+            <a:fillRect/>
+          </a:stretch>
+        </p:blipFill>
+        <p:spPr>
+          <a:xfrm>
+            <a:off x="0" y="1625600"/>
+            <a:ext cx="2438400" cy="2438400"/>
+          </a:xfrm>
+          <a:prstGeom prst="rect">
+            <a:avLst/>
+          </a:prstGeom>
+        </p:spPr>
+      </p:pic>
+      <p:sp>
+        <p:nvSpPr>
+          <p:cNvPr id="25" name="TextBox 24"/>
+          <p:cNvSpPr txBox="1"/>
+          <p:nvPr/>
+        </p:nvSpPr>
+        <p:spPr>
+          <a:xfrm>
+            <a:off x="732364" y="2053167"/>
+            <a:ext cx="1016000" cy="283924"/>
+          </a:xfrm>
+          <a:prstGeom prst="rect">
+            <a:avLst/>
+          </a:prstGeom>
+          <a:noFill/>
+        </p:spPr>
+        <p:txBody>
+          <a:bodyPr wrap="square" rtlCol="0">
+            <a:spAutoFit/>
+          </a:bodyPr>
+          <a:lstStyle/>
+          <a:p>
+            <a:pPr algn="ctr"/>
+            <a:r>
+              <a:rPr lang="en-US" sz="1245" dirty="0" err="1">
+                <a:solidFill>
+                  <a:schemeClr val="accent6">
+                    <a:lumMod val="50000"/>
+                  </a:schemeClr>
+                </a:solidFill>
+              </a:rPr>
+              <a:t>P</a:t>
+            </a:r>
+            <a:r>
+              <a:rPr lang="en-US" sz="1245" dirty="0" err="1" smtClean="0">
+                <a:solidFill>
+                  <a:schemeClr val="accent6">
+                    <a:lumMod val="50000"/>
+                  </a:schemeClr>
+                </a:solidFill>
+              </a:rPr>
+              <a:t>ucky</a:t>
+            </a:r>
+            <a:endParaRPr lang="en-US" sz="1245" dirty="0">
+              <a:solidFill>
+                <a:schemeClr val="accent6">
+                  <a:lumMod val="50000"/>
+                </a:schemeClr>
+              </a:solidFill>
+            </a:endParaRPr>
+          </a:p>
+        </p:txBody>
+      </p:sp>
+      <p:sp>
+        <p:nvSpPr>
+          <p:cNvPr id="27" name="TextBox 26"/>
+          <p:cNvSpPr txBox="1"/>
+          <p:nvPr/>
+        </p:nvSpPr>
+        <p:spPr>
+          <a:xfrm>
+            <a:off x="728133" y="3289300"/>
+            <a:ext cx="1016000" cy="283924"/>
+          </a:xfrm>
+          <a:prstGeom prst="rect">
+            <a:avLst/>
+          </a:prstGeom>
+          <a:noFill/>
+        </p:spPr>
+        <p:txBody>
+          <a:bodyPr wrap="square" rtlCol="0">
+            <a:spAutoFit/>
+          </a:bodyPr>
+          <a:lstStyle/>
+          <a:p>
+            <a:pPr algn="ctr"/>
+            <a:r>
+              <a:rPr lang="en-US" sz="1245" dirty="0">
+                <a:solidFill>
+                  <a:srgbClr val="385723"/>
+                </a:solidFill>
+              </a:rPr>
+              <a:t>M</a:t>
+            </a:r>
+            <a:r>
+              <a:rPr lang="en-US" sz="1245" dirty="0" smtClean="0">
+                <a:solidFill>
+                  <a:srgbClr val="385723"/>
+                </a:solidFill>
+              </a:rPr>
+              <a:t>ucky</a:t>
+            </a:r>
+            <a:endParaRPr lang="en-US" sz="1245" dirty="0">
+              <a:solidFill>
+                <a:srgbClr val="385723"/>
+              </a:solidFill>
+            </a:endParaRPr>
+          </a:p>
+        </p:txBody>
+      </p:sp>
+      <p:sp>
+        <p:nvSpPr>
+          <p:cNvPr id="28" name="TextBox 27"/>
+          <p:cNvSpPr txBox="1"/>
+          <p:nvPr/>
+        </p:nvSpPr>
+        <p:spPr>
+          <a:xfrm>
+            <a:off x="1854200" y="1231899"/>
+            <a:ext cx="2260601" cy="667106"/>
+          </a:xfrm>
+          <a:prstGeom prst="rect">
+            <a:avLst/>
+          </a:prstGeom>
+          <a:noFill/>
+        </p:spPr>
+        <p:txBody>
+          <a:bodyPr wrap="square" rtlCol="0">
+            <a:spAutoFit/>
+          </a:bodyPr>
+          <a:lstStyle/>
+          <a:p>
+            <a:r>
+              <a:rPr lang="en-US" sz="1245" dirty="0" smtClean="0">
+                <a:solidFill>
+                  <a:srgbClr val="385723"/>
+                </a:solidFill>
+              </a:rPr>
+              <a:t>Owner: Stan</a:t>
+            </a:r>
+          </a:p>
+          <a:p>
+            <a:r>
+              <a:rPr lang="en-US" sz="1245" dirty="0" smtClean="0">
+                <a:solidFill>
+                  <a:srgbClr val="385723"/>
+                </a:solidFill>
+              </a:rPr>
+              <a:t>Distance</a:t>
+            </a:r>
+            <a:r>
+              <a:rPr lang="en-US" sz="1245" dirty="0">
+                <a:solidFill>
+                  <a:srgbClr val="385723"/>
+                </a:solidFill>
+              </a:rPr>
+              <a:t>: 100 </a:t>
+            </a:r>
+            <a:r>
+              <a:rPr lang="en-US" sz="1245" dirty="0" err="1">
+                <a:solidFill>
+                  <a:srgbClr val="385723"/>
+                </a:solidFill>
+              </a:rPr>
+              <a:t>ft</a:t>
+            </a:r>
+            <a:endParaRPr lang="en-US" sz="1245" dirty="0">
+              <a:solidFill>
+                <a:srgbClr val="385723"/>
+              </a:solidFill>
+            </a:endParaRPr>
+          </a:p>
+          <a:p>
+            <a:r>
+              <a:rPr lang="en-US" sz="1245" dirty="0">
+                <a:solidFill>
+                  <a:srgbClr val="385723"/>
+                </a:solidFill>
+              </a:rPr>
+              <a:t>Playtime Left: 25 min</a:t>
+            </a:r>
+          </a:p>
+        </p:txBody>
+      </p:sp>
+      <p:sp>
+        <p:nvSpPr>
+          <p:cNvPr id="30" name="TextBox 29"/>
+          <p:cNvSpPr txBox="1"/>
+          <p:nvPr/>
+        </p:nvSpPr>
+        <p:spPr>
+          <a:xfrm>
+            <a:off x="1854200" y="2540004"/>
+            <a:ext cx="2260601" cy="667106"/>
+          </a:xfrm>
+          <a:prstGeom prst="rect">
+            <a:avLst/>
+          </a:prstGeom>
+          <a:noFill/>
+        </p:spPr>
+        <p:txBody>
+          <a:bodyPr wrap="square" rtlCol="0">
+            <a:spAutoFit/>
+          </a:bodyPr>
+          <a:lstStyle/>
+          <a:p>
+            <a:r>
+              <a:rPr lang="en-US" sz="1245" dirty="0">
+                <a:solidFill>
+                  <a:srgbClr val="385723"/>
+                </a:solidFill>
+              </a:rPr>
+              <a:t>Owner: </a:t>
+            </a:r>
+            <a:r>
+              <a:rPr lang="en-US" sz="1245" dirty="0" smtClean="0">
+                <a:solidFill>
+                  <a:srgbClr val="385723"/>
+                </a:solidFill>
+              </a:rPr>
+              <a:t>Chan</a:t>
+            </a:r>
+            <a:endParaRPr lang="en-US" sz="1245" dirty="0">
+              <a:solidFill>
+                <a:srgbClr val="385723"/>
+              </a:solidFill>
+            </a:endParaRPr>
+          </a:p>
+          <a:p>
+            <a:r>
+              <a:rPr lang="en-US" sz="1245" dirty="0">
+                <a:solidFill>
+                  <a:srgbClr val="385723"/>
+                </a:solidFill>
+              </a:rPr>
+              <a:t>Distance: 500 </a:t>
+            </a:r>
+            <a:r>
+              <a:rPr lang="en-US" sz="1245" dirty="0" err="1">
+                <a:solidFill>
+                  <a:srgbClr val="385723"/>
+                </a:solidFill>
+              </a:rPr>
+              <a:t>ft</a:t>
+            </a:r>
+            <a:endParaRPr lang="en-US" sz="1245" dirty="0">
+              <a:solidFill>
+                <a:srgbClr val="385723"/>
+              </a:solidFill>
+            </a:endParaRPr>
+          </a:p>
+          <a:p>
+            <a:r>
+              <a:rPr lang="en-US" sz="1245" dirty="0">
+                <a:solidFill>
+                  <a:srgbClr val="385723"/>
+                </a:solidFill>
+              </a:rPr>
+              <a:t>Playtime Left: 160 min</a:t>
+            </a:r>
+          </a:p>
+        </p:txBody>
+      </p:sp>
+      <p:sp>
+        <p:nvSpPr>
+          <p:cNvPr id="3" name="TextBox 2"/>
+          <p:cNvSpPr txBox="1"/>
+          <p:nvPr/>
+        </p:nvSpPr>
+        <p:spPr>
+          <a:xfrm>
+            <a:off x="660400" y="33867"/>
+            <a:ext cx="3691467" cy="584776"/>
+          </a:xfrm>
+          <a:prstGeom prst="rect">
+            <a:avLst/>
+          </a:prstGeom>
+          <a:noFill/>
+        </p:spPr>
+        <p:txBody>
+          <a:bodyPr wrap="square" rtlCol="0">
+            <a:spAutoFit/>
+          </a:bodyPr>
+          <a:lstStyle/>
+          <a:p>
+            <a:pPr algn="ctr"/>
+            <a:r>
+              <a:rPr lang="en-US" sz="3200" b="1" i="1" dirty="0">
+                <a:solidFill>
+                  <a:schemeClr val="bg1"/>
+                </a:solidFill>
+                <a:latin typeface="Georgia"/>
+                <a:cs typeface="Georgia"/>
+              </a:rPr>
+              <a:t>p</a:t>
+            </a:r>
+            <a:r>
+              <a:rPr lang="en-US" sz="3200" b="1" i="1" dirty="0" smtClean="0">
+                <a:solidFill>
+                  <a:schemeClr val="bg1"/>
+                </a:solidFill>
+                <a:latin typeface="Georgia"/>
+                <a:cs typeface="Georgia"/>
+              </a:rPr>
+              <a:t>et my pet</a:t>
+            </a:r>
+            <a:endParaRPr lang="en-US" sz="3200" b="1" i="1" dirty="0">
+              <a:solidFill>
+                <a:schemeClr val="bg1"/>
+              </a:solidFill>
+              <a:latin typeface="Georgia"/>
+              <a:cs typeface="Georgia"/>
+            </a:endParaRPr>
+          </a:p>
+        </p:txBody>
+      </p:sp>
+      <p:sp>
+        <p:nvSpPr>
+          <p:cNvPr id="31" name="Oval 30"/>
+          <p:cNvSpPr/>
+          <p:nvPr/>
+        </p:nvSpPr>
+        <p:spPr>
+          <a:xfrm>
+            <a:off x="4296152" y="152401"/>
+            <a:ext cx="502920" cy="502920"/>
+          </a:xfrm>
+          <a:prstGeom prst="ellipse">
+            <a:avLst/>
+          </a:prstGeom>
+          <a:solidFill>
+            <a:schemeClr val="accent6">
+              <a:lumMod val="50000"/>
+            </a:schemeClr>
+          </a:solidFill>
+          <a:ln w="57150" cmpd="sng">
+            <a:noFill/>
+          </a:ln>
+        </p:spPr>
+        <p:style>
+          <a:lnRef idx="1">
+            <a:schemeClr val="accent1"/>
+          </a:lnRef>
+          <a:fillRef idx="3">
+            <a:schemeClr val="accent1"/>
+          </a:fillRef>
+          <a:effectRef idx="2">
+            <a:schemeClr val="accent1"/>
+          </a:effectRef>
+          <a:fontRef idx="minor">
+            <a:schemeClr val="lt1"/>
+          </a:fontRef>
+        </p:style>
+        <p:txBody>
+          <a:bodyPr rtlCol="0" anchor="ctr"/>
+          <a:lstStyle/>
+          <a:p>
+            <a:pPr algn="ctr"/>
+            <a:endParaRPr lang="en-US" sz="1245"/>
+          </a:p>
+        </p:txBody>
+      </p:sp>
+      <p:sp>
+        <p:nvSpPr>
+          <p:cNvPr id="32" name="Oval 31"/>
+          <p:cNvSpPr/>
+          <p:nvPr/>
+        </p:nvSpPr>
+        <p:spPr>
+          <a:xfrm>
+            <a:off x="4431619" y="304801"/>
+            <a:ext cx="228600" cy="228600"/>
+          </a:xfrm>
+          <a:prstGeom prst="ellipse">
+            <a:avLst/>
+          </a:prstGeom>
+          <a:solidFill>
+            <a:schemeClr val="accent6">
+              <a:lumMod val="60000"/>
+              <a:lumOff val="40000"/>
+            </a:schemeClr>
+          </a:solidFill>
+          <a:ln w="57150" cmpd="sng">
+            <a:solidFill>
+              <a:schemeClr val="accent6">
+                <a:lumMod val="60000"/>
+                <a:lumOff val="40000"/>
+              </a:schemeClr>
+            </a:solidFill>
+          </a:ln>
+        </p:spPr>
+        <p:style>
+          <a:lnRef idx="1">
+            <a:schemeClr val="accent1"/>
+          </a:lnRef>
+          <a:fillRef idx="3">
+            <a:schemeClr val="accent1"/>
+          </a:fillRef>
+          <a:effectRef idx="2">
+            <a:schemeClr val="accent1"/>
+          </a:effectRef>
+          <a:fontRef idx="minor">
+            <a:schemeClr val="lt1"/>
+          </a:fontRef>
+        </p:style>
+        <p:txBody>
+          <a:bodyPr rtlCol="0" anchor="ctr"/>
+          <a:lstStyle/>
+          <a:p>
+            <a:pPr algn="ctr"/>
+            <a:endParaRPr lang="en-US" sz="1245"/>
+          </a:p>
+        </p:txBody>
+      </p:sp>
+      <p:sp>
+        <p:nvSpPr>
+          <p:cNvPr id="5" name="Rounded Rectangle 4"/>
+          <p:cNvSpPr/>
+          <p:nvPr/>
+        </p:nvSpPr>
+        <p:spPr>
+          <a:xfrm>
+            <a:off x="4470400" y="101599"/>
+            <a:ext cx="152400" cy="135467"/>
+          </a:xfrm>
+          <a:prstGeom prst="roundRect">
+            <a:avLst/>
+          </a:prstGeom>
+          <a:solidFill>
+            <a:schemeClr val="accent6">
+              <a:lumMod val="50000"/>
+            </a:schemeClr>
+          </a:solidFill>
+          <a:ln>
+            <a:noFill/>
+          </a:ln>
+        </p:spPr>
+        <p:style>
+          <a:lnRef idx="1">
+            <a:schemeClr val="accent1"/>
+          </a:lnRef>
+          <a:fillRef idx="3">
+            <a:schemeClr val="accent1"/>
+          </a:fillRef>
+          <a:effectRef idx="2">
+            <a:schemeClr val="accent1"/>
+          </a:effectRef>
+          <a:fontRef idx="minor">
+            <a:schemeClr val="lt1"/>
+          </a:fontRef>
+        </p:style>
+        <p:txBody>
+          <a:bodyPr rtlCol="0" anchor="ctr"/>
+          <a:lstStyle/>
+          <a:p>
+            <a:pPr algn="ctr"/>
+            <a:endParaRPr lang="en-US"/>
+          </a:p>
+        </p:txBody>
+      </p:sp>
+      <p:sp>
+        <p:nvSpPr>
+          <p:cNvPr id="33" name="Rounded Rectangle 32"/>
+          <p:cNvSpPr/>
+          <p:nvPr/>
+        </p:nvSpPr>
+        <p:spPr>
+          <a:xfrm rot="18900000">
+            <a:off x="4314699" y="169332"/>
+            <a:ext cx="152400" cy="135467"/>
+          </a:xfrm>
+          <a:prstGeom prst="roundRect">
+            <a:avLst/>
+          </a:prstGeom>
+          <a:solidFill>
+            <a:schemeClr val="accent6">
+              <a:lumMod val="50000"/>
+            </a:schemeClr>
+          </a:solidFill>
+          <a:ln>
+            <a:noFill/>
+          </a:ln>
+        </p:spPr>
+        <p:style>
+          <a:lnRef idx="1">
+            <a:schemeClr val="accent1"/>
+          </a:lnRef>
+          <a:fillRef idx="3">
+            <a:schemeClr val="accent1"/>
+          </a:fillRef>
+          <a:effectRef idx="2">
+            <a:schemeClr val="accent1"/>
+          </a:effectRef>
+          <a:fontRef idx="minor">
+            <a:schemeClr val="lt1"/>
+          </a:fontRef>
+        </p:style>
+        <p:txBody>
+          <a:bodyPr rtlCol="0" anchor="ctr"/>
+          <a:lstStyle/>
+          <a:p>
+            <a:pPr algn="ctr"/>
+            <a:endParaRPr lang="en-US" dirty="0"/>
+          </a:p>
+        </p:txBody>
+      </p:sp>
+      <p:sp>
+        <p:nvSpPr>
+          <p:cNvPr id="34" name="Rounded Rectangle 33"/>
+          <p:cNvSpPr/>
+          <p:nvPr/>
+        </p:nvSpPr>
+        <p:spPr>
+          <a:xfrm rot="13500000">
+            <a:off x="4309533" y="491071"/>
+            <a:ext cx="152400" cy="135467"/>
+          </a:xfrm>
+          <a:prstGeom prst="roundRect">
+            <a:avLst/>
+          </a:prstGeom>
+          <a:solidFill>
+            <a:schemeClr val="accent6">
+              <a:lumMod val="50000"/>
+            </a:schemeClr>
+          </a:solidFill>
+          <a:ln>
+            <a:noFill/>
+          </a:ln>
+        </p:spPr>
+        <p:style>
+          <a:lnRef idx="1">
+            <a:schemeClr val="accent1"/>
+          </a:lnRef>
+          <a:fillRef idx="3">
+            <a:schemeClr val="accent1"/>
+          </a:fillRef>
+          <a:effectRef idx="2">
+            <a:schemeClr val="accent1"/>
+          </a:effectRef>
+          <a:fontRef idx="minor">
+            <a:schemeClr val="lt1"/>
+          </a:fontRef>
+        </p:style>
+        <p:txBody>
+          <a:bodyPr rtlCol="0" anchor="ctr"/>
+          <a:lstStyle/>
+          <a:p>
+            <a:pPr algn="ctr"/>
+            <a:endParaRPr lang="en-US"/>
+          </a:p>
+        </p:txBody>
+      </p:sp>
+      <p:sp>
+        <p:nvSpPr>
+          <p:cNvPr id="35" name="Rounded Rectangle 34"/>
+          <p:cNvSpPr/>
+          <p:nvPr/>
+        </p:nvSpPr>
+        <p:spPr>
+          <a:xfrm rot="2700000">
+            <a:off x="4631265" y="160871"/>
+            <a:ext cx="152400" cy="135467"/>
+          </a:xfrm>
+          <a:prstGeom prst="roundRect">
+            <a:avLst/>
+          </a:prstGeom>
+          <a:solidFill>
+            <a:schemeClr val="accent6">
+              <a:lumMod val="50000"/>
+            </a:schemeClr>
+          </a:solidFill>
+          <a:ln>
+            <a:noFill/>
+          </a:ln>
+        </p:spPr>
+        <p:style>
+          <a:lnRef idx="1">
+            <a:schemeClr val="accent1"/>
+          </a:lnRef>
+          <a:fillRef idx="3">
+            <a:schemeClr val="accent1"/>
+          </a:fillRef>
+          <a:effectRef idx="2">
+            <a:schemeClr val="accent1"/>
+          </a:effectRef>
+          <a:fontRef idx="minor">
+            <a:schemeClr val="lt1"/>
+          </a:fontRef>
+        </p:style>
+        <p:txBody>
+          <a:bodyPr rtlCol="0" anchor="ctr"/>
+          <a:lstStyle/>
+          <a:p>
+            <a:pPr algn="ctr"/>
+            <a:endParaRPr lang="en-US"/>
+          </a:p>
+        </p:txBody>
+      </p:sp>
+      <p:sp>
+        <p:nvSpPr>
+          <p:cNvPr id="36" name="Rounded Rectangle 35"/>
+          <p:cNvSpPr/>
+          <p:nvPr/>
+        </p:nvSpPr>
+        <p:spPr>
+          <a:xfrm rot="8100000">
+            <a:off x="4622795" y="499534"/>
+            <a:ext cx="152400" cy="135467"/>
+          </a:xfrm>
+          <a:prstGeom prst="roundRect">
+            <a:avLst/>
+          </a:prstGeom>
+          <a:solidFill>
+            <a:schemeClr val="accent6">
+              <a:lumMod val="50000"/>
+            </a:schemeClr>
+          </a:solidFill>
+          <a:ln>
+            <a:noFill/>
+          </a:ln>
+        </p:spPr>
+        <p:style>
+          <a:lnRef idx="1">
+            <a:schemeClr val="accent1"/>
+          </a:lnRef>
+          <a:fillRef idx="3">
+            <a:schemeClr val="accent1"/>
+          </a:fillRef>
+          <a:effectRef idx="2">
+            <a:schemeClr val="accent1"/>
+          </a:effectRef>
+          <a:fontRef idx="minor">
+            <a:schemeClr val="lt1"/>
+          </a:fontRef>
+        </p:style>
+        <p:txBody>
+          <a:bodyPr rtlCol="0" anchor="ctr"/>
+          <a:lstStyle/>
+          <a:p>
+            <a:pPr algn="ctr"/>
+            <a:endParaRPr lang="en-US"/>
+          </a:p>
+        </p:txBody>
+      </p:sp>
+      <p:sp>
+        <p:nvSpPr>
+          <p:cNvPr id="37" name="Rounded Rectangle 36"/>
+          <p:cNvSpPr/>
+          <p:nvPr/>
+        </p:nvSpPr>
+        <p:spPr>
+          <a:xfrm>
+            <a:off x="4470400" y="567267"/>
+            <a:ext cx="152400" cy="135467"/>
+          </a:xfrm>
+          <a:prstGeom prst="roundRect">
+            <a:avLst/>
+          </a:prstGeom>
+          <a:solidFill>
+            <a:schemeClr val="accent6">
+              <a:lumMod val="50000"/>
+            </a:schemeClr>
+          </a:solidFill>
+          <a:ln>
+            <a:noFill/>
+          </a:ln>
+        </p:spPr>
+        <p:style>
+          <a:lnRef idx="1">
+            <a:schemeClr val="accent1"/>
+          </a:lnRef>
+          <a:fillRef idx="3">
+            <a:schemeClr val="accent1"/>
+          </a:fillRef>
+          <a:effectRef idx="2">
+            <a:schemeClr val="accent1"/>
+          </a:effectRef>
+          <a:fontRef idx="minor">
+            <a:schemeClr val="lt1"/>
+          </a:fontRef>
+        </p:style>
+        <p:txBody>
+          <a:bodyPr rtlCol="0" anchor="ctr"/>
+          <a:lstStyle/>
+          <a:p>
+            <a:pPr algn="ctr"/>
+            <a:endParaRPr lang="en-US"/>
+          </a:p>
+        </p:txBody>
+      </p:sp>
+      <p:sp>
+        <p:nvSpPr>
+          <p:cNvPr id="39" name="Rounded Rectangle 38"/>
+          <p:cNvSpPr/>
+          <p:nvPr/>
+        </p:nvSpPr>
+        <p:spPr>
+          <a:xfrm rot="16200000">
+            <a:off x="4238504" y="338666"/>
+            <a:ext cx="152400" cy="135467"/>
+          </a:xfrm>
+          <a:prstGeom prst="roundRect">
+            <a:avLst/>
+          </a:prstGeom>
+          <a:solidFill>
+            <a:schemeClr val="accent6">
+              <a:lumMod val="50000"/>
+            </a:schemeClr>
+          </a:solidFill>
+          <a:ln>
+            <a:noFill/>
+          </a:ln>
+        </p:spPr>
+        <p:style>
+          <a:lnRef idx="1">
+            <a:schemeClr val="accent1"/>
+          </a:lnRef>
+          <a:fillRef idx="3">
+            <a:schemeClr val="accent1"/>
+          </a:fillRef>
+          <a:effectRef idx="2">
+            <a:schemeClr val="accent1"/>
+          </a:effectRef>
+          <a:fontRef idx="minor">
+            <a:schemeClr val="lt1"/>
+          </a:fontRef>
+        </p:style>
+        <p:txBody>
+          <a:bodyPr rtlCol="0" anchor="ctr"/>
+          <a:lstStyle/>
+          <a:p>
+            <a:pPr algn="ctr"/>
+            <a:endParaRPr lang="en-US" dirty="0"/>
+          </a:p>
+        </p:txBody>
+      </p:sp>
+      <p:sp>
+        <p:nvSpPr>
+          <p:cNvPr id="40" name="Rounded Rectangle 39"/>
+          <p:cNvSpPr/>
+          <p:nvPr/>
+        </p:nvSpPr>
+        <p:spPr>
+          <a:xfrm rot="16200000">
+            <a:off x="4704172" y="338665"/>
+            <a:ext cx="152400" cy="135467"/>
+          </a:xfrm>
+          <a:prstGeom prst="roundRect">
+            <a:avLst/>
+          </a:prstGeom>
+          <a:solidFill>
+            <a:schemeClr val="accent6">
+              <a:lumMod val="50000"/>
+            </a:schemeClr>
+          </a:solidFill>
+          <a:ln>
+            <a:noFill/>
+          </a:ln>
+        </p:spPr>
+        <p:style>
+          <a:lnRef idx="1">
+            <a:schemeClr val="accent1"/>
+          </a:lnRef>
+          <a:fillRef idx="3">
+            <a:schemeClr val="accent1"/>
+          </a:fillRef>
+          <a:effectRef idx="2">
+            <a:schemeClr val="accent1"/>
+          </a:effectRef>
+          <a:fontRef idx="minor">
+            <a:schemeClr val="lt1"/>
+          </a:fontRef>
+        </p:style>
+        <p:txBody>
+          <a:bodyPr rtlCol="0" anchor="ctr"/>
+          <a:lstStyle/>
+          <a:p>
+            <a:pPr algn="ctr"/>
+            <a:endParaRPr lang="en-US" dirty="0"/>
+          </a:p>
+        </p:txBody>
+      </p:sp>
+    </p:spTree>
+    <p:extLst>
+      <p:ext uri="{BB962C8B-B14F-4D97-AF65-F5344CB8AC3E}">
+        <p14:creationId xmlns:p14="http://schemas.microsoft.com/office/powerpoint/2010/main" val="1101328026"/>
+      </p:ext>
+    </p:extLst>
+  </p:cSld>
+  <p:clrMapOvr>
+    <a:masterClrMapping/>
+  </p:clrMapOvr>
+</p:sld>
+</file>
+
+<file path=ppt/slides/slide9.xml><?xml version="1.0" encoding="utf-8"?>
+<p:sld xmlns:a="http://schemas.openxmlformats.org/drawingml/2006/main" xmlns:r="http://schemas.openxmlformats.org/officeDocument/2006/relationships" xmlns:p="http://schemas.openxmlformats.org/presentationml/2006/main">
+  <p:cSld>
+    <p:spTree>
+      <p:nvGrpSpPr>
+        <p:cNvPr id="1" name=""/>
+        <p:cNvGrpSpPr/>
+        <p:nvPr/>
+      </p:nvGrpSpPr>
+      <p:grpSpPr>
+        <a:xfrm>
+          <a:off x="0" y="0"/>
+          <a:ext cx="0" cy="0"/>
+          <a:chOff x="0" y="0"/>
+          <a:chExt cx="0" cy="0"/>
+        </a:xfrm>
+      </p:grpSpPr>
+      <p:sp>
+        <p:nvSpPr>
+          <p:cNvPr id="2" name="Title 1"/>
+          <p:cNvSpPr>
+            <a:spLocks noGrp="1"/>
+          </p:cNvSpPr>
+          <p:nvPr>
+            <p:ph type="title"/>
+          </p:nvPr>
+        </p:nvSpPr>
+        <p:spPr/>
+        <p:txBody>
+          <a:bodyPr/>
+          <a:lstStyle/>
+          <a:p>
+            <a:endParaRPr lang="en-US"/>
+          </a:p>
+        </p:txBody>
+      </p:sp>
+      <p:sp>
+        <p:nvSpPr>
+          <p:cNvPr id="3" name="Content Placeholder 2"/>
+          <p:cNvSpPr>
+            <a:spLocks noGrp="1"/>
+          </p:cNvSpPr>
+          <p:nvPr>
+            <p:ph idx="1"/>
+          </p:nvPr>
+        </p:nvSpPr>
+        <p:spPr/>
+        <p:txBody>
+          <a:bodyPr/>
+          <a:lstStyle/>
+          <a:p>
+            <a:endParaRPr lang="en-US"/>
+          </a:p>
+        </p:txBody>
+      </p:sp>
+      <p:sp>
+        <p:nvSpPr>
+          <p:cNvPr id="4" name="Rectangle 3"/>
+          <p:cNvSpPr/>
+          <p:nvPr/>
+        </p:nvSpPr>
+        <p:spPr>
+          <a:xfrm>
+            <a:off x="-7664" y="0"/>
+            <a:ext cx="5029200" cy="7772400"/>
+          </a:xfrm>
+          <a:prstGeom prst="rect">
+            <a:avLst/>
+          </a:prstGeom>
+          <a:solidFill>
+            <a:schemeClr val="accent6">
+              <a:lumMod val="20000"/>
+              <a:lumOff val="80000"/>
+            </a:schemeClr>
+          </a:solidFill>
+          <a:ln w="28575">
+            <a:noFill/>
+          </a:ln>
+        </p:spPr>
+        <p:style>
+          <a:lnRef idx="2">
+            <a:schemeClr val="accent6"/>
+          </a:lnRef>
+          <a:fillRef idx="1">
+            <a:schemeClr val="lt1"/>
+          </a:fillRef>
+          <a:effectRef idx="0">
+            <a:schemeClr val="accent6"/>
+          </a:effectRef>
+          <a:fontRef idx="minor">
+            <a:schemeClr val="dk1"/>
+          </a:fontRef>
+        </p:style>
+        <p:txBody>
+          <a:bodyPr rtlCol="0" anchor="ctr"/>
+          <a:lstStyle/>
+          <a:p>
+            <a:pPr algn="ctr"/>
+            <a:endParaRPr lang="en-US" sz="1245" dirty="0">
+              <a:ln w="28575">
+                <a:solidFill>
+                  <a:schemeClr val="tx1"/>
+                </a:solidFill>
+              </a:ln>
+            </a:endParaRPr>
+          </a:p>
+        </p:txBody>
+      </p:sp>
+      <p:sp>
+        <p:nvSpPr>
           <p:cNvPr id="14" name="Rounded Rectangle 13"/>
           <p:cNvSpPr/>
           <p:nvPr/>
@@ -8546,6 +9113,472 @@
               <a:latin typeface="Georgia"/>
               <a:cs typeface="Georgia"/>
             </a:endParaRPr>
+          </a:p>
+        </p:txBody>
+      </p:sp>
+      <p:sp>
+        <p:nvSpPr>
+          <p:cNvPr id="21" name="Oval 20"/>
+          <p:cNvSpPr/>
+          <p:nvPr/>
+        </p:nvSpPr>
+        <p:spPr>
+          <a:xfrm>
+            <a:off x="4296152" y="152401"/>
+            <a:ext cx="502920" cy="502920"/>
+          </a:xfrm>
+          <a:prstGeom prst="ellipse">
+            <a:avLst/>
+          </a:prstGeom>
+          <a:solidFill>
+            <a:schemeClr val="accent6">
+              <a:lumMod val="50000"/>
+            </a:schemeClr>
+          </a:solidFill>
+          <a:ln w="57150" cmpd="sng">
+            <a:noFill/>
+          </a:ln>
+        </p:spPr>
+        <p:style>
+          <a:lnRef idx="1">
+            <a:schemeClr val="accent1"/>
+          </a:lnRef>
+          <a:fillRef idx="3">
+            <a:schemeClr val="accent1"/>
+          </a:fillRef>
+          <a:effectRef idx="2">
+            <a:schemeClr val="accent1"/>
+          </a:effectRef>
+          <a:fontRef idx="minor">
+            <a:schemeClr val="lt1"/>
+          </a:fontRef>
+        </p:style>
+        <p:txBody>
+          <a:bodyPr rtlCol="0" anchor="ctr"/>
+          <a:lstStyle/>
+          <a:p>
+            <a:pPr algn="ctr"/>
+            <a:endParaRPr lang="en-US" sz="1245"/>
+          </a:p>
+        </p:txBody>
+      </p:sp>
+      <p:sp>
+        <p:nvSpPr>
+          <p:cNvPr id="22" name="Oval 21"/>
+          <p:cNvSpPr/>
+          <p:nvPr/>
+        </p:nvSpPr>
+        <p:spPr>
+          <a:xfrm>
+            <a:off x="4431619" y="304801"/>
+            <a:ext cx="228600" cy="228600"/>
+          </a:xfrm>
+          <a:prstGeom prst="ellipse">
+            <a:avLst/>
+          </a:prstGeom>
+          <a:solidFill>
+            <a:schemeClr val="accent6">
+              <a:lumMod val="60000"/>
+              <a:lumOff val="40000"/>
+            </a:schemeClr>
+          </a:solidFill>
+          <a:ln w="57150" cmpd="sng">
+            <a:solidFill>
+              <a:schemeClr val="accent6">
+                <a:lumMod val="60000"/>
+                <a:lumOff val="40000"/>
+              </a:schemeClr>
+            </a:solidFill>
+          </a:ln>
+        </p:spPr>
+        <p:style>
+          <a:lnRef idx="1">
+            <a:schemeClr val="accent1"/>
+          </a:lnRef>
+          <a:fillRef idx="3">
+            <a:schemeClr val="accent1"/>
+          </a:fillRef>
+          <a:effectRef idx="2">
+            <a:schemeClr val="accent1"/>
+          </a:effectRef>
+          <a:fontRef idx="minor">
+            <a:schemeClr val="lt1"/>
+          </a:fontRef>
+        </p:style>
+        <p:txBody>
+          <a:bodyPr rtlCol="0" anchor="ctr"/>
+          <a:lstStyle/>
+          <a:p>
+            <a:pPr algn="ctr"/>
+            <a:endParaRPr lang="en-US" sz="1245"/>
+          </a:p>
+        </p:txBody>
+      </p:sp>
+      <p:sp>
+        <p:nvSpPr>
+          <p:cNvPr id="23" name="Rounded Rectangle 22"/>
+          <p:cNvSpPr/>
+          <p:nvPr/>
+        </p:nvSpPr>
+        <p:spPr>
+          <a:xfrm rot="18900000">
+            <a:off x="4314699" y="169332"/>
+            <a:ext cx="152400" cy="135467"/>
+          </a:xfrm>
+          <a:prstGeom prst="roundRect">
+            <a:avLst/>
+          </a:prstGeom>
+          <a:solidFill>
+            <a:schemeClr val="accent6">
+              <a:lumMod val="50000"/>
+            </a:schemeClr>
+          </a:solidFill>
+          <a:ln>
+            <a:noFill/>
+          </a:ln>
+        </p:spPr>
+        <p:style>
+          <a:lnRef idx="1">
+            <a:schemeClr val="accent1"/>
+          </a:lnRef>
+          <a:fillRef idx="3">
+            <a:schemeClr val="accent1"/>
+          </a:fillRef>
+          <a:effectRef idx="2">
+            <a:schemeClr val="accent1"/>
+          </a:effectRef>
+          <a:fontRef idx="minor">
+            <a:schemeClr val="lt1"/>
+          </a:fontRef>
+        </p:style>
+        <p:txBody>
+          <a:bodyPr rtlCol="0" anchor="ctr"/>
+          <a:lstStyle/>
+          <a:p>
+            <a:pPr algn="ctr"/>
+            <a:endParaRPr lang="en-US" dirty="0"/>
+          </a:p>
+        </p:txBody>
+      </p:sp>
+      <p:sp>
+        <p:nvSpPr>
+          <p:cNvPr id="24" name="Rounded Rectangle 23"/>
+          <p:cNvSpPr/>
+          <p:nvPr/>
+        </p:nvSpPr>
+        <p:spPr>
+          <a:xfrm rot="13500000">
+            <a:off x="4309533" y="491071"/>
+            <a:ext cx="152400" cy="135467"/>
+          </a:xfrm>
+          <a:prstGeom prst="roundRect">
+            <a:avLst/>
+          </a:prstGeom>
+          <a:solidFill>
+            <a:schemeClr val="accent6">
+              <a:lumMod val="50000"/>
+            </a:schemeClr>
+          </a:solidFill>
+          <a:ln>
+            <a:noFill/>
+          </a:ln>
+        </p:spPr>
+        <p:style>
+          <a:lnRef idx="1">
+            <a:schemeClr val="accent1"/>
+          </a:lnRef>
+          <a:fillRef idx="3">
+            <a:schemeClr val="accent1"/>
+          </a:fillRef>
+          <a:effectRef idx="2">
+            <a:schemeClr val="accent1"/>
+          </a:effectRef>
+          <a:fontRef idx="minor">
+            <a:schemeClr val="lt1"/>
+          </a:fontRef>
+        </p:style>
+        <p:txBody>
+          <a:bodyPr rtlCol="0" anchor="ctr"/>
+          <a:lstStyle/>
+          <a:p>
+            <a:pPr algn="ctr"/>
+            <a:endParaRPr lang="en-US"/>
+          </a:p>
+        </p:txBody>
+      </p:sp>
+      <p:sp>
+        <p:nvSpPr>
+          <p:cNvPr id="25" name="Rounded Rectangle 24"/>
+          <p:cNvSpPr/>
+          <p:nvPr/>
+        </p:nvSpPr>
+        <p:spPr>
+          <a:xfrm rot="2700000">
+            <a:off x="4631265" y="160871"/>
+            <a:ext cx="152400" cy="135467"/>
+          </a:xfrm>
+          <a:prstGeom prst="roundRect">
+            <a:avLst/>
+          </a:prstGeom>
+          <a:solidFill>
+            <a:schemeClr val="accent6">
+              <a:lumMod val="50000"/>
+            </a:schemeClr>
+          </a:solidFill>
+          <a:ln>
+            <a:noFill/>
+          </a:ln>
+        </p:spPr>
+        <p:style>
+          <a:lnRef idx="1">
+            <a:schemeClr val="accent1"/>
+          </a:lnRef>
+          <a:fillRef idx="3">
+            <a:schemeClr val="accent1"/>
+          </a:fillRef>
+          <a:effectRef idx="2">
+            <a:schemeClr val="accent1"/>
+          </a:effectRef>
+          <a:fontRef idx="minor">
+            <a:schemeClr val="lt1"/>
+          </a:fontRef>
+        </p:style>
+        <p:txBody>
+          <a:bodyPr rtlCol="0" anchor="ctr"/>
+          <a:lstStyle/>
+          <a:p>
+            <a:pPr algn="ctr"/>
+            <a:endParaRPr lang="en-US"/>
+          </a:p>
+        </p:txBody>
+      </p:sp>
+      <p:sp>
+        <p:nvSpPr>
+          <p:cNvPr id="26" name="Rounded Rectangle 25"/>
+          <p:cNvSpPr/>
+          <p:nvPr/>
+        </p:nvSpPr>
+        <p:spPr>
+          <a:xfrm rot="8100000">
+            <a:off x="4622795" y="499534"/>
+            <a:ext cx="152400" cy="135467"/>
+          </a:xfrm>
+          <a:prstGeom prst="roundRect">
+            <a:avLst/>
+          </a:prstGeom>
+          <a:solidFill>
+            <a:schemeClr val="accent6">
+              <a:lumMod val="50000"/>
+            </a:schemeClr>
+          </a:solidFill>
+          <a:ln>
+            <a:noFill/>
+          </a:ln>
+        </p:spPr>
+        <p:style>
+          <a:lnRef idx="1">
+            <a:schemeClr val="accent1"/>
+          </a:lnRef>
+          <a:fillRef idx="3">
+            <a:schemeClr val="accent1"/>
+          </a:fillRef>
+          <a:effectRef idx="2">
+            <a:schemeClr val="accent1"/>
+          </a:effectRef>
+          <a:fontRef idx="minor">
+            <a:schemeClr val="lt1"/>
+          </a:fontRef>
+        </p:style>
+        <p:txBody>
+          <a:bodyPr rtlCol="0" anchor="ctr"/>
+          <a:lstStyle/>
+          <a:p>
+            <a:pPr algn="ctr"/>
+            <a:endParaRPr lang="en-US"/>
+          </a:p>
+        </p:txBody>
+      </p:sp>
+      <p:sp>
+        <p:nvSpPr>
+          <p:cNvPr id="27" name="Rounded Rectangle 26"/>
+          <p:cNvSpPr/>
+          <p:nvPr/>
+        </p:nvSpPr>
+        <p:spPr>
+          <a:xfrm rot="16200000">
+            <a:off x="4238504" y="338666"/>
+            <a:ext cx="152400" cy="135467"/>
+          </a:xfrm>
+          <a:prstGeom prst="roundRect">
+            <a:avLst/>
+          </a:prstGeom>
+          <a:solidFill>
+            <a:schemeClr val="accent6">
+              <a:lumMod val="50000"/>
+            </a:schemeClr>
+          </a:solidFill>
+          <a:ln>
+            <a:noFill/>
+          </a:ln>
+        </p:spPr>
+        <p:style>
+          <a:lnRef idx="1">
+            <a:schemeClr val="accent1"/>
+          </a:lnRef>
+          <a:fillRef idx="3">
+            <a:schemeClr val="accent1"/>
+          </a:fillRef>
+          <a:effectRef idx="2">
+            <a:schemeClr val="accent1"/>
+          </a:effectRef>
+          <a:fontRef idx="minor">
+            <a:schemeClr val="lt1"/>
+          </a:fontRef>
+        </p:style>
+        <p:txBody>
+          <a:bodyPr rtlCol="0" anchor="ctr"/>
+          <a:lstStyle/>
+          <a:p>
+            <a:pPr algn="ctr"/>
+            <a:endParaRPr lang="en-US" dirty="0"/>
+          </a:p>
+        </p:txBody>
+      </p:sp>
+      <p:sp>
+        <p:nvSpPr>
+          <p:cNvPr id="28" name="Rounded Rectangle 27"/>
+          <p:cNvSpPr/>
+          <p:nvPr/>
+        </p:nvSpPr>
+        <p:spPr>
+          <a:xfrm rot="16200000">
+            <a:off x="4704172" y="338665"/>
+            <a:ext cx="152400" cy="135467"/>
+          </a:xfrm>
+          <a:prstGeom prst="roundRect">
+            <a:avLst/>
+          </a:prstGeom>
+          <a:solidFill>
+            <a:schemeClr val="accent6">
+              <a:lumMod val="50000"/>
+            </a:schemeClr>
+          </a:solidFill>
+          <a:ln>
+            <a:noFill/>
+          </a:ln>
+        </p:spPr>
+        <p:style>
+          <a:lnRef idx="1">
+            <a:schemeClr val="accent1"/>
+          </a:lnRef>
+          <a:fillRef idx="3">
+            <a:schemeClr val="accent1"/>
+          </a:fillRef>
+          <a:effectRef idx="2">
+            <a:schemeClr val="accent1"/>
+          </a:effectRef>
+          <a:fontRef idx="minor">
+            <a:schemeClr val="lt1"/>
+          </a:fontRef>
+        </p:style>
+        <p:txBody>
+          <a:bodyPr rtlCol="0" anchor="ctr"/>
+          <a:lstStyle/>
+          <a:p>
+            <a:pPr algn="ctr"/>
+            <a:endParaRPr lang="en-US" dirty="0"/>
+          </a:p>
+        </p:txBody>
+      </p:sp>
+      <p:sp>
+        <p:nvSpPr>
+          <p:cNvPr id="29" name="Rounded Rectangle 28"/>
+          <p:cNvSpPr/>
+          <p:nvPr/>
+        </p:nvSpPr>
+        <p:spPr>
+          <a:xfrm>
+            <a:off x="4470400" y="101599"/>
+            <a:ext cx="152400" cy="135467"/>
+          </a:xfrm>
+          <a:prstGeom prst="roundRect">
+            <a:avLst/>
+          </a:prstGeom>
+          <a:solidFill>
+            <a:schemeClr val="accent6">
+              <a:lumMod val="50000"/>
+            </a:schemeClr>
+          </a:solidFill>
+          <a:ln>
+            <a:noFill/>
+          </a:ln>
+        </p:spPr>
+        <p:style>
+          <a:lnRef idx="1">
+            <a:schemeClr val="accent1"/>
+          </a:lnRef>
+          <a:fillRef idx="3">
+            <a:schemeClr val="accent1"/>
+          </a:fillRef>
+          <a:effectRef idx="2">
+            <a:schemeClr val="accent1"/>
+          </a:effectRef>
+          <a:fontRef idx="minor">
+            <a:schemeClr val="lt1"/>
+          </a:fontRef>
+        </p:style>
+        <p:txBody>
+          <a:bodyPr rtlCol="0" anchor="ctr"/>
+          <a:lstStyle/>
+          <a:p>
+            <a:pPr algn="ctr"/>
+            <a:endParaRPr lang="en-US"/>
+          </a:p>
+        </p:txBody>
+      </p:sp>
+      <p:sp>
+        <p:nvSpPr>
+          <p:cNvPr id="30" name="Rounded Rectangle 29"/>
+          <p:cNvSpPr/>
+          <p:nvPr/>
+        </p:nvSpPr>
+        <p:spPr>
+          <a:xfrm>
+            <a:off x="4470400" y="567267"/>
+            <a:ext cx="152400" cy="135467"/>
+          </a:xfrm>
+          <a:prstGeom prst="roundRect">
+            <a:avLst/>
+          </a:prstGeom>
+          <a:solidFill>
+            <a:schemeClr val="accent6">
+              <a:lumMod val="50000"/>
+            </a:schemeClr>
+          </a:solidFill>
+          <a:ln>
+            <a:noFill/>
+          </a:ln>
+        </p:spPr>
+        <p:style>
+          <a:lnRef idx="1">
+            <a:schemeClr val="accent1"/>
+          </a:lnRef>
+          <a:fillRef idx="3">
+            <a:schemeClr val="accent1"/>
+          </a:fillRef>
+          <a:effectRef idx="2">
+            <a:schemeClr val="accent1"/>
+          </a:effectRef>
+          <a:fontRef idx="minor">
+            <a:schemeClr val="lt1"/>
+          </a:fontRef>
+        </p:style>
+        <p:txBody>
+          <a:bodyPr rtlCol="0" anchor="ctr"/>
+          <a:lstStyle/>
+          <a:p>
+            <a:pPr algn="ctr"/>
+            <a:endParaRPr lang="en-US"/>
           </a:p>
         </p:txBody>
       </p:sp>

</xml_diff>

<commit_message>
tried some gradle stuff?
</commit_message>
<xml_diff>
--- a/Presentation1.pptx
+++ b/Presentation1.pptx
@@ -117,7 +117,7 @@
   </p:defaultTextStyle>
   <p:extLst>
     <p:ext uri="{EFAFB233-063F-42B5-8137-9DF3F51BA10A}">
-      <p15:sldGuideLst xmlns:p15="http://schemas.microsoft.com/office/powerpoint/2012/main" xmlns="">
+      <p15:sldGuideLst xmlns="" xmlns:p15="http://schemas.microsoft.com/office/powerpoint/2012/main">
         <p15:guide id="1" orient="horz" pos="2448" userDrawn="1">
           <p15:clr>
             <a:srgbClr val="A4A3A4"/>
@@ -216,7 +216,7 @@
           <a:p>
             <a:fld id="{5167892E-B727-A544-A25A-A6BD23AEA75B}" type="datetimeFigureOut">
               <a:rPr lang="en-US" smtClean="0"/>
-              <a:t>10/3/15</a:t>
+              <a:t>10/4/15</a:t>
             </a:fld>
             <a:endParaRPr lang="en-US"/>
           </a:p>
@@ -539,11 +539,7 @@
             </a:r>
             <a:r>
               <a:rPr lang="en-US" baseline="0" dirty="0" smtClean="0"/>
-              <a:t> may either login or create a new account</a:t>
-            </a:r>
-            <a:r>
-              <a:rPr lang="en-US" baseline="0" dirty="0" smtClean="0"/>
-              <a:t>. The Register button is clearly differentiated from the login button.</a:t>
+              <a:t> may either login or create a new account. The Register button is clearly differentiated from the login button.</a:t>
             </a:r>
             <a:endParaRPr lang="en-US" dirty="0"/>
           </a:p>
@@ -1014,27 +1010,7 @@
           <a:p>
             <a:r>
               <a:rPr lang="en-US" baseline="0" dirty="0" smtClean="0"/>
-              <a:t>This is what users will typically see when they enter the </a:t>
-            </a:r>
-            <a:r>
-              <a:rPr lang="en-US" baseline="0" dirty="0" smtClean="0"/>
-              <a:t>app, after logging in. </a:t>
-            </a:r>
-            <a:r>
-              <a:rPr lang="en-US" baseline="0" dirty="0" smtClean="0"/>
-              <a:t>The Pet My Pet logo will be relocated to a small bar on the top to make room for the dog listing, along with a settings button for dog </a:t>
-            </a:r>
-            <a:r>
-              <a:rPr lang="en-US" baseline="0" dirty="0" smtClean="0"/>
-              <a:t>owners to manage their dogs’ profiles. </a:t>
-            </a:r>
-            <a:r>
-              <a:rPr lang="en-US" baseline="0" dirty="0" smtClean="0"/>
-              <a:t>When users open the app, the “Find dogs in your area” button will open a listing of dogs in their vicinity, showing the dog’s profile picture, their name under it, and next to that, their owner’s name, the distance of the dog away from the user, and the amount of “playtime” remaining. The “Start playtime button” is meant for the use of dog owners</a:t>
-            </a:r>
-            <a:r>
-              <a:rPr lang="en-US" baseline="0" dirty="0" smtClean="0"/>
-              <a:t>.</a:t>
+              <a:t>This is what users will typically see when they enter the app, after logging in. The Pet My Pet logo will be relocated to a small bar on the top to make room for the dog listing, along with a settings button for dog owners to manage their dogs’ profiles. When users open the app, the “Find dogs in your area” button will open a listing of dogs in their vicinity, showing the dog’s profile picture, their name under it, and next to that, their owner’s name, the distance of the dog away from the user, and the amount of “playtime” remaining. The “Start playtime button” is meant for the use of dog owners.</a:t>
             </a:r>
             <a:endParaRPr lang="en-US" dirty="0"/>
           </a:p>
@@ -1295,7 +1271,7 @@
           <a:p>
             <a:fld id="{A571C8A6-8591-4EB8-AF3A-CCD2BBB113E4}" type="datetimeFigureOut">
               <a:rPr lang="en-US" smtClean="0"/>
-              <a:t>10/3/15</a:t>
+              <a:t>10/4/15</a:t>
             </a:fld>
             <a:endParaRPr lang="en-US"/>
           </a:p>
@@ -1465,7 +1441,7 @@
           <a:p>
             <a:fld id="{A571C8A6-8591-4EB8-AF3A-CCD2BBB113E4}" type="datetimeFigureOut">
               <a:rPr lang="en-US" smtClean="0"/>
-              <a:t>10/3/15</a:t>
+              <a:t>10/4/15</a:t>
             </a:fld>
             <a:endParaRPr lang="en-US"/>
           </a:p>
@@ -1645,7 +1621,7 @@
           <a:p>
             <a:fld id="{A571C8A6-8591-4EB8-AF3A-CCD2BBB113E4}" type="datetimeFigureOut">
               <a:rPr lang="en-US" smtClean="0"/>
-              <a:t>10/3/15</a:t>
+              <a:t>10/4/15</a:t>
             </a:fld>
             <a:endParaRPr lang="en-US"/>
           </a:p>
@@ -1815,7 +1791,7 @@
           <a:p>
             <a:fld id="{A571C8A6-8591-4EB8-AF3A-CCD2BBB113E4}" type="datetimeFigureOut">
               <a:rPr lang="en-US" smtClean="0"/>
-              <a:t>10/3/15</a:t>
+              <a:t>10/4/15</a:t>
             </a:fld>
             <a:endParaRPr lang="en-US"/>
           </a:p>
@@ -2059,7 +2035,7 @@
           <a:p>
             <a:fld id="{A571C8A6-8591-4EB8-AF3A-CCD2BBB113E4}" type="datetimeFigureOut">
               <a:rPr lang="en-US" smtClean="0"/>
-              <a:t>10/3/15</a:t>
+              <a:t>10/4/15</a:t>
             </a:fld>
             <a:endParaRPr lang="en-US"/>
           </a:p>
@@ -2291,7 +2267,7 @@
           <a:p>
             <a:fld id="{A571C8A6-8591-4EB8-AF3A-CCD2BBB113E4}" type="datetimeFigureOut">
               <a:rPr lang="en-US" smtClean="0"/>
-              <a:t>10/3/15</a:t>
+              <a:t>10/4/15</a:t>
             </a:fld>
             <a:endParaRPr lang="en-US"/>
           </a:p>
@@ -2658,7 +2634,7 @@
           <a:p>
             <a:fld id="{A571C8A6-8591-4EB8-AF3A-CCD2BBB113E4}" type="datetimeFigureOut">
               <a:rPr lang="en-US" smtClean="0"/>
-              <a:t>10/3/15</a:t>
+              <a:t>10/4/15</a:t>
             </a:fld>
             <a:endParaRPr lang="en-US"/>
           </a:p>
@@ -2776,7 +2752,7 @@
           <a:p>
             <a:fld id="{A571C8A6-8591-4EB8-AF3A-CCD2BBB113E4}" type="datetimeFigureOut">
               <a:rPr lang="en-US" smtClean="0"/>
-              <a:t>10/3/15</a:t>
+              <a:t>10/4/15</a:t>
             </a:fld>
             <a:endParaRPr lang="en-US"/>
           </a:p>
@@ -2871,7 +2847,7 @@
           <a:p>
             <a:fld id="{A571C8A6-8591-4EB8-AF3A-CCD2BBB113E4}" type="datetimeFigureOut">
               <a:rPr lang="en-US" smtClean="0"/>
-              <a:t>10/3/15</a:t>
+              <a:t>10/4/15</a:t>
             </a:fld>
             <a:endParaRPr lang="en-US"/>
           </a:p>
@@ -3148,7 +3124,7 @@
           <a:p>
             <a:fld id="{A571C8A6-8591-4EB8-AF3A-CCD2BBB113E4}" type="datetimeFigureOut">
               <a:rPr lang="en-US" smtClean="0"/>
-              <a:t>10/3/15</a:t>
+              <a:t>10/4/15</a:t>
             </a:fld>
             <a:endParaRPr lang="en-US"/>
           </a:p>
@@ -3405,7 +3381,7 @@
           <a:p>
             <a:fld id="{A571C8A6-8591-4EB8-AF3A-CCD2BBB113E4}" type="datetimeFigureOut">
               <a:rPr lang="en-US" smtClean="0"/>
-              <a:t>10/3/15</a:t>
+              <a:t>10/4/15</a:t>
             </a:fld>
             <a:endParaRPr lang="en-US"/>
           </a:p>
@@ -3618,7 +3594,7 @@
           <a:p>
             <a:fld id="{A571C8A6-8591-4EB8-AF3A-CCD2BBB113E4}" type="datetimeFigureOut">
               <a:rPr lang="en-US" smtClean="0"/>
-              <a:t>10/3/15</a:t>
+              <a:t>10/4/15</a:t>
             </a:fld>
             <a:endParaRPr lang="en-US"/>
           </a:p>
@@ -6994,7 +6970,7 @@
         </p:nvSpPr>
         <p:spPr>
           <a:xfrm>
-            <a:off x="308954" y="897466"/>
+            <a:off x="372454" y="897466"/>
             <a:ext cx="4301019" cy="5955824"/>
           </a:xfrm>
           <a:prstGeom prst="roundRect">
@@ -8634,13 +8610,13 @@
       </p:sp>
       <p:sp>
         <p:nvSpPr>
-          <p:cNvPr id="14" name="Rounded Rectangle 13"/>
+          <p:cNvPr id="31" name="Rounded Rectangle 30"/>
           <p:cNvSpPr/>
           <p:nvPr/>
         </p:nvSpPr>
         <p:spPr>
           <a:xfrm>
-            <a:off x="308954" y="897466"/>
+            <a:off x="372454" y="897466"/>
             <a:ext cx="4301019" cy="5955824"/>
           </a:xfrm>
           <a:prstGeom prst="roundRect">
@@ -9850,7 +9826,7 @@
   <a:extraClrSchemeLst/>
   <a:extLst>
     <a:ext uri="{05A4C25C-085E-4340-85A3-A5531E510DB2}">
-      <thm15:themeFamily xmlns:thm15="http://schemas.microsoft.com/office/thememl/2012/main" xmlns="" name="Office Theme" id="{62F939B6-93AF-4DB8-9C6B-D6C7DFDC589F}" vid="{4A3C46E8-61CC-4603-A589-7422A47A8E4A}"/>
+      <thm15:themeFamily xmlns="" xmlns:thm15="http://schemas.microsoft.com/office/thememl/2012/main" name="Office Theme" id="{62F939B6-93AF-4DB8-9C6B-D6C7DFDC589F}" vid="{4A3C46E8-61CC-4603-A589-7422A47A8E4A}"/>
     </a:ext>
   </a:extLst>
 </a:theme>

</xml_diff>